<commit_message>
Updated with some of the feedback from the trial lesson.
</commit_message>
<xml_diff>
--- a/Lessons/Lesson_I/Lesson_I_Questions.pptx
+++ b/Lessons/Lesson_I/Lesson_I_Questions.pptx
@@ -16,7 +16,7 @@
     <p:sldId id="263" r:id="rId11"/>
   </p:sldIdLst>
   <p:sldSz cx="9144000" cy="5143500"/>
-  <p:notesSz cx="6858000" cy="9144000"/>
+  <p:notesSz cx="7559675" cy="10691812"/>
 </p:presentation>
 </file>
 
@@ -61,7 +61,7 @@
       </p:grpSpPr>
       <p:sp>
         <p:nvSpPr>
-          <p:cNvPr id="25" name="PlaceHolder 1"/>
+          <p:cNvPr id="23" name="PlaceHolder 1"/>
           <p:cNvSpPr>
             <a:spLocks noGrp="1"/>
           </p:cNvSpPr>
@@ -71,8 +71,8 @@
         </p:nvSpPr>
         <p:spPr>
           <a:xfrm>
-            <a:off x="457200" y="205920"/>
-            <a:ext cx="8229240" cy="856800"/>
+            <a:off x="457200" y="205200"/>
+            <a:ext cx="8229240" cy="858600"/>
           </a:xfrm>
           <a:prstGeom prst="rect">
             <a:avLst/>
@@ -81,13 +81,14 @@
         <p:txBody>
           <a:bodyPr lIns="0" rIns="0" tIns="0" bIns="0" anchor="ctr"/>
           <a:p>
-            <a:endParaRPr/>
-          </a:p>
-        </p:txBody>
-      </p:sp>
-      <p:sp>
-        <p:nvSpPr>
-          <p:cNvPr id="26" name="PlaceHolder 2"/>
+            <a:pPr algn="ctr"/>
+            <a:endParaRPr/>
+          </a:p>
+        </p:txBody>
+      </p:sp>
+      <p:sp>
+        <p:nvSpPr>
+          <p:cNvPr id="24" name="PlaceHolder 2"/>
           <p:cNvSpPr>
             <a:spLocks noGrp="1"/>
           </p:cNvSpPr>
@@ -97,8 +98,8 @@
         </p:nvSpPr>
         <p:spPr>
           <a:xfrm>
-            <a:off x="457200" y="1200240"/>
-            <a:ext cx="8229240" cy="1776600"/>
+            <a:off x="457200" y="1203480"/>
+            <a:ext cx="8229240" cy="1422720"/>
           </a:xfrm>
           <a:prstGeom prst="rect">
             <a:avLst/>
@@ -113,7 +114,7 @@
       </p:sp>
       <p:sp>
         <p:nvSpPr>
-          <p:cNvPr id="27" name="PlaceHolder 3"/>
+          <p:cNvPr id="25" name="PlaceHolder 3"/>
           <p:cNvSpPr>
             <a:spLocks noGrp="1"/>
           </p:cNvSpPr>
@@ -123,8 +124,8 @@
         </p:nvSpPr>
         <p:spPr>
           <a:xfrm>
-            <a:off x="457200" y="3146040"/>
-            <a:ext cx="8229240" cy="1776600"/>
+            <a:off x="457200" y="2761920"/>
+            <a:ext cx="8229240" cy="1422720"/>
           </a:xfrm>
           <a:prstGeom prst="rect">
             <a:avLst/>
@@ -161,7 +162,7 @@
       </p:grpSpPr>
       <p:sp>
         <p:nvSpPr>
-          <p:cNvPr id="28" name="PlaceHolder 1"/>
+          <p:cNvPr id="26" name="PlaceHolder 1"/>
           <p:cNvSpPr>
             <a:spLocks noGrp="1"/>
           </p:cNvSpPr>
@@ -171,8 +172,8 @@
         </p:nvSpPr>
         <p:spPr>
           <a:xfrm>
-            <a:off x="457200" y="205920"/>
-            <a:ext cx="8229240" cy="856800"/>
+            <a:off x="457200" y="205200"/>
+            <a:ext cx="8229240" cy="858600"/>
           </a:xfrm>
           <a:prstGeom prst="rect">
             <a:avLst/>
@@ -181,13 +182,14 @@
         <p:txBody>
           <a:bodyPr lIns="0" rIns="0" tIns="0" bIns="0" anchor="ctr"/>
           <a:p>
-            <a:endParaRPr/>
-          </a:p>
-        </p:txBody>
-      </p:sp>
-      <p:sp>
-        <p:nvSpPr>
-          <p:cNvPr id="29" name="PlaceHolder 2"/>
+            <a:pPr algn="ctr"/>
+            <a:endParaRPr/>
+          </a:p>
+        </p:txBody>
+      </p:sp>
+      <p:sp>
+        <p:nvSpPr>
+          <p:cNvPr id="27" name="PlaceHolder 2"/>
           <p:cNvSpPr>
             <a:spLocks noGrp="1"/>
           </p:cNvSpPr>
@@ -197,8 +199,8 @@
         </p:nvSpPr>
         <p:spPr>
           <a:xfrm>
-            <a:off x="457200" y="1200240"/>
-            <a:ext cx="4015800" cy="1776600"/>
+            <a:off x="457200" y="1203480"/>
+            <a:ext cx="4015800" cy="1422720"/>
           </a:xfrm>
           <a:prstGeom prst="rect">
             <a:avLst/>
@@ -213,7 +215,7 @@
       </p:sp>
       <p:sp>
         <p:nvSpPr>
-          <p:cNvPr id="30" name="PlaceHolder 3"/>
+          <p:cNvPr id="28" name="PlaceHolder 3"/>
           <p:cNvSpPr>
             <a:spLocks noGrp="1"/>
           </p:cNvSpPr>
@@ -223,8 +225,8 @@
         </p:nvSpPr>
         <p:spPr>
           <a:xfrm>
-            <a:off x="4674240" y="1200240"/>
-            <a:ext cx="4015800" cy="1776600"/>
+            <a:off x="4674240" y="1203480"/>
+            <a:ext cx="4015800" cy="1422720"/>
           </a:xfrm>
           <a:prstGeom prst="rect">
             <a:avLst/>
@@ -239,7 +241,7 @@
       </p:sp>
       <p:sp>
         <p:nvSpPr>
-          <p:cNvPr id="31" name="PlaceHolder 4"/>
+          <p:cNvPr id="29" name="PlaceHolder 4"/>
           <p:cNvSpPr>
             <a:spLocks noGrp="1"/>
           </p:cNvSpPr>
@@ -249,8 +251,8 @@
         </p:nvSpPr>
         <p:spPr>
           <a:xfrm>
-            <a:off x="4674240" y="3146040"/>
-            <a:ext cx="4015800" cy="1776600"/>
+            <a:off x="4674240" y="2761920"/>
+            <a:ext cx="4015800" cy="1422720"/>
           </a:xfrm>
           <a:prstGeom prst="rect">
             <a:avLst/>
@@ -265,7 +267,7 @@
       </p:sp>
       <p:sp>
         <p:nvSpPr>
-          <p:cNvPr id="32" name="PlaceHolder 5"/>
+          <p:cNvPr id="30" name="PlaceHolder 5"/>
           <p:cNvSpPr>
             <a:spLocks noGrp="1"/>
           </p:cNvSpPr>
@@ -275,8 +277,8 @@
         </p:nvSpPr>
         <p:spPr>
           <a:xfrm>
-            <a:off x="457200" y="3146040"/>
-            <a:ext cx="4015800" cy="1776600"/>
+            <a:off x="457200" y="2761920"/>
+            <a:ext cx="4015800" cy="1422720"/>
           </a:xfrm>
           <a:prstGeom prst="rect">
             <a:avLst/>
@@ -313,7 +315,7 @@
       </p:grpSpPr>
       <p:sp>
         <p:nvSpPr>
-          <p:cNvPr id="33" name="PlaceHolder 1"/>
+          <p:cNvPr id="31" name="PlaceHolder 1"/>
           <p:cNvSpPr>
             <a:spLocks noGrp="1"/>
           </p:cNvSpPr>
@@ -323,8 +325,8 @@
         </p:nvSpPr>
         <p:spPr>
           <a:xfrm>
-            <a:off x="457200" y="205920"/>
-            <a:ext cx="8229240" cy="856800"/>
+            <a:off x="457200" y="205200"/>
+            <a:ext cx="8229240" cy="858600"/>
           </a:xfrm>
           <a:prstGeom prst="rect">
             <a:avLst/>
@@ -333,13 +335,14 @@
         <p:txBody>
           <a:bodyPr lIns="0" rIns="0" tIns="0" bIns="0" anchor="ctr"/>
           <a:p>
-            <a:endParaRPr/>
-          </a:p>
-        </p:txBody>
-      </p:sp>
-      <p:sp>
-        <p:nvSpPr>
-          <p:cNvPr id="34" name="PlaceHolder 2"/>
+            <a:pPr algn="ctr"/>
+            <a:endParaRPr/>
+          </a:p>
+        </p:txBody>
+      </p:sp>
+      <p:sp>
+        <p:nvSpPr>
+          <p:cNvPr id="32" name="PlaceHolder 2"/>
           <p:cNvSpPr>
             <a:spLocks noGrp="1"/>
           </p:cNvSpPr>
@@ -349,8 +352,8 @@
         </p:nvSpPr>
         <p:spPr>
           <a:xfrm>
-            <a:off x="457200" y="1200240"/>
-            <a:ext cx="8229240" cy="3725280"/>
+            <a:off x="457200" y="1203480"/>
+            <a:ext cx="8229240" cy="2982960"/>
           </a:xfrm>
           <a:prstGeom prst="rect">
             <a:avLst/>
@@ -365,7 +368,7 @@
       </p:sp>
       <p:sp>
         <p:nvSpPr>
-          <p:cNvPr id="35" name="PlaceHolder 3"/>
+          <p:cNvPr id="33" name="PlaceHolder 3"/>
           <p:cNvSpPr>
             <a:spLocks noGrp="1"/>
           </p:cNvSpPr>
@@ -375,8 +378,8 @@
         </p:nvSpPr>
         <p:spPr>
           <a:xfrm>
-            <a:off x="457200" y="1200240"/>
-            <a:ext cx="8229240" cy="3725280"/>
+            <a:off x="457200" y="1203480"/>
+            <a:ext cx="8229240" cy="2982960"/>
           </a:xfrm>
           <a:prstGeom prst="rect">
             <a:avLst/>
@@ -391,7 +394,7 @@
       </p:sp>
       <p:pic>
         <p:nvPicPr>
-          <p:cNvPr id="36" name="" descr=""/>
+          <p:cNvPr id="34" name="" descr=""/>
           <p:cNvPicPr/>
           <p:nvPr/>
         </p:nvPicPr>
@@ -401,8 +404,8 @@
         </p:blipFill>
         <p:spPr>
           <a:xfrm>
-            <a:off x="2237040" y="1200240"/>
-            <a:ext cx="4669200" cy="3725280"/>
+            <a:off x="2702160" y="1203480"/>
+            <a:ext cx="3738600" cy="2982960"/>
           </a:xfrm>
           <a:prstGeom prst="rect">
             <a:avLst/>
@@ -414,7 +417,7 @@
       </p:pic>
       <p:pic>
         <p:nvPicPr>
-          <p:cNvPr id="37" name="" descr=""/>
+          <p:cNvPr id="35" name="" descr=""/>
           <p:cNvPicPr/>
           <p:nvPr/>
         </p:nvPicPr>
@@ -424,8 +427,8 @@
         </p:blipFill>
         <p:spPr>
           <a:xfrm>
-            <a:off x="2237040" y="1200240"/>
-            <a:ext cx="4669200" cy="3725280"/>
+            <a:off x="2702160" y="1203480"/>
+            <a:ext cx="3738600" cy="2982960"/>
           </a:xfrm>
           <a:prstGeom prst="rect">
             <a:avLst/>
@@ -481,7 +484,7 @@
       </p:grpSpPr>
       <p:sp>
         <p:nvSpPr>
-          <p:cNvPr id="41" name="PlaceHolder 1"/>
+          <p:cNvPr id="38" name="PlaceHolder 1"/>
           <p:cNvSpPr>
             <a:spLocks noGrp="1"/>
           </p:cNvSpPr>
@@ -491,8 +494,8 @@
         </p:nvSpPr>
         <p:spPr>
           <a:xfrm>
-            <a:off x="457200" y="205920"/>
-            <a:ext cx="8229240" cy="856800"/>
+            <a:off x="457200" y="205200"/>
+            <a:ext cx="8229240" cy="858600"/>
           </a:xfrm>
           <a:prstGeom prst="rect">
             <a:avLst/>
@@ -501,13 +504,14 @@
         <p:txBody>
           <a:bodyPr lIns="0" rIns="0" tIns="0" bIns="0" anchor="ctr"/>
           <a:p>
-            <a:endParaRPr/>
-          </a:p>
-        </p:txBody>
-      </p:sp>
-      <p:sp>
-        <p:nvSpPr>
-          <p:cNvPr id="42" name="PlaceHolder 2"/>
+            <a:pPr algn="ctr"/>
+            <a:endParaRPr/>
+          </a:p>
+        </p:txBody>
+      </p:sp>
+      <p:sp>
+        <p:nvSpPr>
+          <p:cNvPr id="39" name="PlaceHolder 2"/>
           <p:cNvSpPr>
             <a:spLocks noGrp="1"/>
           </p:cNvSpPr>
@@ -517,8 +521,8 @@
         </p:nvSpPr>
         <p:spPr>
           <a:xfrm>
-            <a:off x="457200" y="1200240"/>
-            <a:ext cx="8229240" cy="3725280"/>
+            <a:off x="457200" y="1203480"/>
+            <a:ext cx="8229240" cy="2982960"/>
           </a:xfrm>
           <a:prstGeom prst="rect">
             <a:avLst/>
@@ -556,7 +560,7 @@
       </p:grpSpPr>
       <p:sp>
         <p:nvSpPr>
-          <p:cNvPr id="43" name="PlaceHolder 1"/>
+          <p:cNvPr id="40" name="PlaceHolder 1"/>
           <p:cNvSpPr>
             <a:spLocks noGrp="1"/>
           </p:cNvSpPr>
@@ -566,8 +570,8 @@
         </p:nvSpPr>
         <p:spPr>
           <a:xfrm>
-            <a:off x="457200" y="205920"/>
-            <a:ext cx="8229240" cy="856800"/>
+            <a:off x="457200" y="205200"/>
+            <a:ext cx="8229240" cy="858600"/>
           </a:xfrm>
           <a:prstGeom prst="rect">
             <a:avLst/>
@@ -576,13 +580,14 @@
         <p:txBody>
           <a:bodyPr lIns="0" rIns="0" tIns="0" bIns="0" anchor="ctr"/>
           <a:p>
-            <a:endParaRPr/>
-          </a:p>
-        </p:txBody>
-      </p:sp>
-      <p:sp>
-        <p:nvSpPr>
-          <p:cNvPr id="44" name="PlaceHolder 2"/>
+            <a:pPr algn="ctr"/>
+            <a:endParaRPr/>
+          </a:p>
+        </p:txBody>
+      </p:sp>
+      <p:sp>
+        <p:nvSpPr>
+          <p:cNvPr id="41" name="PlaceHolder 2"/>
           <p:cNvSpPr>
             <a:spLocks noGrp="1"/>
           </p:cNvSpPr>
@@ -592,8 +597,8 @@
         </p:nvSpPr>
         <p:spPr>
           <a:xfrm>
-            <a:off x="457200" y="1200240"/>
-            <a:ext cx="8229240" cy="3725280"/>
+            <a:off x="457200" y="1203480"/>
+            <a:ext cx="8229240" cy="2982960"/>
           </a:xfrm>
           <a:prstGeom prst="rect">
             <a:avLst/>
@@ -630,7 +635,7 @@
       </p:grpSpPr>
       <p:sp>
         <p:nvSpPr>
-          <p:cNvPr id="45" name="PlaceHolder 1"/>
+          <p:cNvPr id="42" name="PlaceHolder 1"/>
           <p:cNvSpPr>
             <a:spLocks noGrp="1"/>
           </p:cNvSpPr>
@@ -640,8 +645,8 @@
         </p:nvSpPr>
         <p:spPr>
           <a:xfrm>
-            <a:off x="457200" y="205920"/>
-            <a:ext cx="8229240" cy="856800"/>
+            <a:off x="457200" y="205200"/>
+            <a:ext cx="8229240" cy="858600"/>
           </a:xfrm>
           <a:prstGeom prst="rect">
             <a:avLst/>
@@ -650,13 +655,14 @@
         <p:txBody>
           <a:bodyPr lIns="0" rIns="0" tIns="0" bIns="0" anchor="ctr"/>
           <a:p>
-            <a:endParaRPr/>
-          </a:p>
-        </p:txBody>
-      </p:sp>
-      <p:sp>
-        <p:nvSpPr>
-          <p:cNvPr id="46" name="PlaceHolder 2"/>
+            <a:pPr algn="ctr"/>
+            <a:endParaRPr/>
+          </a:p>
+        </p:txBody>
+      </p:sp>
+      <p:sp>
+        <p:nvSpPr>
+          <p:cNvPr id="43" name="PlaceHolder 2"/>
           <p:cNvSpPr>
             <a:spLocks noGrp="1"/>
           </p:cNvSpPr>
@@ -666,8 +672,8 @@
         </p:nvSpPr>
         <p:spPr>
           <a:xfrm>
-            <a:off x="457200" y="1200240"/>
-            <a:ext cx="4015800" cy="3725280"/>
+            <a:off x="457200" y="1203480"/>
+            <a:ext cx="4015800" cy="2982960"/>
           </a:xfrm>
           <a:prstGeom prst="rect">
             <a:avLst/>
@@ -682,7 +688,7 @@
       </p:sp>
       <p:sp>
         <p:nvSpPr>
-          <p:cNvPr id="47" name="PlaceHolder 3"/>
+          <p:cNvPr id="44" name="PlaceHolder 3"/>
           <p:cNvSpPr>
             <a:spLocks noGrp="1"/>
           </p:cNvSpPr>
@@ -692,8 +698,8 @@
         </p:nvSpPr>
         <p:spPr>
           <a:xfrm>
-            <a:off x="4674240" y="1200240"/>
-            <a:ext cx="4015800" cy="3725280"/>
+            <a:off x="4674240" y="1203480"/>
+            <a:ext cx="4015800" cy="2982960"/>
           </a:xfrm>
           <a:prstGeom prst="rect">
             <a:avLst/>
@@ -730,7 +736,7 @@
       </p:grpSpPr>
       <p:sp>
         <p:nvSpPr>
-          <p:cNvPr id="48" name="PlaceHolder 1"/>
+          <p:cNvPr id="45" name="PlaceHolder 1"/>
           <p:cNvSpPr>
             <a:spLocks noGrp="1"/>
           </p:cNvSpPr>
@@ -740,8 +746,8 @@
         </p:nvSpPr>
         <p:spPr>
           <a:xfrm>
-            <a:off x="457200" y="205920"/>
-            <a:ext cx="8229240" cy="856800"/>
+            <a:off x="457200" y="205200"/>
+            <a:ext cx="8229240" cy="858600"/>
           </a:xfrm>
           <a:prstGeom prst="rect">
             <a:avLst/>
@@ -750,6 +756,7 @@
         <p:txBody>
           <a:bodyPr lIns="0" rIns="0" tIns="0" bIns="0" anchor="ctr"/>
           <a:p>
+            <a:pPr algn="ctr"/>
             <a:endParaRPr/>
           </a:p>
         </p:txBody>
@@ -778,7 +785,7 @@
       </p:grpSpPr>
       <p:sp>
         <p:nvSpPr>
-          <p:cNvPr id="49" name="PlaceHolder 1"/>
+          <p:cNvPr id="46" name="PlaceHolder 1"/>
           <p:cNvSpPr>
             <a:spLocks noGrp="1"/>
           </p:cNvSpPr>
@@ -788,8 +795,8 @@
         </p:nvSpPr>
         <p:spPr>
           <a:xfrm>
-            <a:off x="457200" y="205920"/>
-            <a:ext cx="8229240" cy="3972960"/>
+            <a:off x="457200" y="205200"/>
+            <a:ext cx="8229240" cy="3981240"/>
           </a:xfrm>
           <a:prstGeom prst="rect">
             <a:avLst/>
@@ -827,7 +834,7 @@
       </p:grpSpPr>
       <p:sp>
         <p:nvSpPr>
-          <p:cNvPr id="50" name="PlaceHolder 1"/>
+          <p:cNvPr id="47" name="PlaceHolder 1"/>
           <p:cNvSpPr>
             <a:spLocks noGrp="1"/>
           </p:cNvSpPr>
@@ -837,8 +844,8 @@
         </p:nvSpPr>
         <p:spPr>
           <a:xfrm>
-            <a:off x="457200" y="205920"/>
-            <a:ext cx="8229240" cy="856800"/>
+            <a:off x="457200" y="205200"/>
+            <a:ext cx="8229240" cy="858600"/>
           </a:xfrm>
           <a:prstGeom prst="rect">
             <a:avLst/>
@@ -847,13 +854,14 @@
         <p:txBody>
           <a:bodyPr lIns="0" rIns="0" tIns="0" bIns="0" anchor="ctr"/>
           <a:p>
-            <a:endParaRPr/>
-          </a:p>
-        </p:txBody>
-      </p:sp>
-      <p:sp>
-        <p:nvSpPr>
-          <p:cNvPr id="51" name="PlaceHolder 2"/>
+            <a:pPr algn="ctr"/>
+            <a:endParaRPr/>
+          </a:p>
+        </p:txBody>
+      </p:sp>
+      <p:sp>
+        <p:nvSpPr>
+          <p:cNvPr id="48" name="PlaceHolder 2"/>
           <p:cNvSpPr>
             <a:spLocks noGrp="1"/>
           </p:cNvSpPr>
@@ -863,8 +871,8 @@
         </p:nvSpPr>
         <p:spPr>
           <a:xfrm>
-            <a:off x="457200" y="1200240"/>
-            <a:ext cx="4015800" cy="1776600"/>
+            <a:off x="457200" y="1203480"/>
+            <a:ext cx="4015800" cy="1422720"/>
           </a:xfrm>
           <a:prstGeom prst="rect">
             <a:avLst/>
@@ -879,7 +887,7 @@
       </p:sp>
       <p:sp>
         <p:nvSpPr>
-          <p:cNvPr id="52" name="PlaceHolder 3"/>
+          <p:cNvPr id="49" name="PlaceHolder 3"/>
           <p:cNvSpPr>
             <a:spLocks noGrp="1"/>
           </p:cNvSpPr>
@@ -889,8 +897,8 @@
         </p:nvSpPr>
         <p:spPr>
           <a:xfrm>
-            <a:off x="457200" y="3146040"/>
-            <a:ext cx="4015800" cy="1776600"/>
+            <a:off x="457200" y="2761920"/>
+            <a:ext cx="4015800" cy="1422720"/>
           </a:xfrm>
           <a:prstGeom prst="rect">
             <a:avLst/>
@@ -905,7 +913,7 @@
       </p:sp>
       <p:sp>
         <p:nvSpPr>
-          <p:cNvPr id="53" name="PlaceHolder 4"/>
+          <p:cNvPr id="50" name="PlaceHolder 4"/>
           <p:cNvSpPr>
             <a:spLocks noGrp="1"/>
           </p:cNvSpPr>
@@ -915,8 +923,8 @@
         </p:nvSpPr>
         <p:spPr>
           <a:xfrm>
-            <a:off x="4674240" y="1200240"/>
-            <a:ext cx="4015800" cy="3725280"/>
+            <a:off x="4674240" y="1203480"/>
+            <a:ext cx="4015800" cy="2982960"/>
           </a:xfrm>
           <a:prstGeom prst="rect">
             <a:avLst/>
@@ -953,7 +961,7 @@
       </p:grpSpPr>
       <p:sp>
         <p:nvSpPr>
-          <p:cNvPr id="4" name="PlaceHolder 1"/>
+          <p:cNvPr id="2" name="PlaceHolder 1"/>
           <p:cNvSpPr>
             <a:spLocks noGrp="1"/>
           </p:cNvSpPr>
@@ -963,8 +971,8 @@
         </p:nvSpPr>
         <p:spPr>
           <a:xfrm>
-            <a:off x="457200" y="205920"/>
-            <a:ext cx="8229240" cy="856800"/>
+            <a:off x="457200" y="205200"/>
+            <a:ext cx="8229240" cy="858600"/>
           </a:xfrm>
           <a:prstGeom prst="rect">
             <a:avLst/>
@@ -973,13 +981,14 @@
         <p:txBody>
           <a:bodyPr lIns="0" rIns="0" tIns="0" bIns="0" anchor="ctr"/>
           <a:p>
-            <a:endParaRPr/>
-          </a:p>
-        </p:txBody>
-      </p:sp>
-      <p:sp>
-        <p:nvSpPr>
-          <p:cNvPr id="5" name="PlaceHolder 2"/>
+            <a:pPr algn="ctr"/>
+            <a:endParaRPr/>
+          </a:p>
+        </p:txBody>
+      </p:sp>
+      <p:sp>
+        <p:nvSpPr>
+          <p:cNvPr id="3" name="PlaceHolder 2"/>
           <p:cNvSpPr>
             <a:spLocks noGrp="1"/>
           </p:cNvSpPr>
@@ -989,8 +998,8 @@
         </p:nvSpPr>
         <p:spPr>
           <a:xfrm>
-            <a:off x="457200" y="1200240"/>
-            <a:ext cx="8229240" cy="3725280"/>
+            <a:off x="457200" y="1203480"/>
+            <a:ext cx="8229240" cy="2982960"/>
           </a:xfrm>
           <a:prstGeom prst="rect">
             <a:avLst/>
@@ -1028,7 +1037,7 @@
       </p:grpSpPr>
       <p:sp>
         <p:nvSpPr>
-          <p:cNvPr id="54" name="PlaceHolder 1"/>
+          <p:cNvPr id="51" name="PlaceHolder 1"/>
           <p:cNvSpPr>
             <a:spLocks noGrp="1"/>
           </p:cNvSpPr>
@@ -1038,8 +1047,8 @@
         </p:nvSpPr>
         <p:spPr>
           <a:xfrm>
-            <a:off x="457200" y="205920"/>
-            <a:ext cx="8229240" cy="856800"/>
+            <a:off x="457200" y="205200"/>
+            <a:ext cx="8229240" cy="858600"/>
           </a:xfrm>
           <a:prstGeom prst="rect">
             <a:avLst/>
@@ -1048,13 +1057,14 @@
         <p:txBody>
           <a:bodyPr lIns="0" rIns="0" tIns="0" bIns="0" anchor="ctr"/>
           <a:p>
-            <a:endParaRPr/>
-          </a:p>
-        </p:txBody>
-      </p:sp>
-      <p:sp>
-        <p:nvSpPr>
-          <p:cNvPr id="55" name="PlaceHolder 2"/>
+            <a:pPr algn="ctr"/>
+            <a:endParaRPr/>
+          </a:p>
+        </p:txBody>
+      </p:sp>
+      <p:sp>
+        <p:nvSpPr>
+          <p:cNvPr id="52" name="PlaceHolder 2"/>
           <p:cNvSpPr>
             <a:spLocks noGrp="1"/>
           </p:cNvSpPr>
@@ -1064,8 +1074,8 @@
         </p:nvSpPr>
         <p:spPr>
           <a:xfrm>
-            <a:off x="457200" y="1200240"/>
-            <a:ext cx="4015800" cy="3725280"/>
+            <a:off x="457200" y="1203480"/>
+            <a:ext cx="4015800" cy="2982960"/>
           </a:xfrm>
           <a:prstGeom prst="rect">
             <a:avLst/>
@@ -1080,7 +1090,7 @@
       </p:sp>
       <p:sp>
         <p:nvSpPr>
-          <p:cNvPr id="56" name="PlaceHolder 3"/>
+          <p:cNvPr id="53" name="PlaceHolder 3"/>
           <p:cNvSpPr>
             <a:spLocks noGrp="1"/>
           </p:cNvSpPr>
@@ -1090,8 +1100,8 @@
         </p:nvSpPr>
         <p:spPr>
           <a:xfrm>
-            <a:off x="4674240" y="1200240"/>
-            <a:ext cx="4015800" cy="1776600"/>
+            <a:off x="4674240" y="1203480"/>
+            <a:ext cx="4015800" cy="1422720"/>
           </a:xfrm>
           <a:prstGeom prst="rect">
             <a:avLst/>
@@ -1106,7 +1116,7 @@
       </p:sp>
       <p:sp>
         <p:nvSpPr>
-          <p:cNvPr id="57" name="PlaceHolder 4"/>
+          <p:cNvPr id="54" name="PlaceHolder 4"/>
           <p:cNvSpPr>
             <a:spLocks noGrp="1"/>
           </p:cNvSpPr>
@@ -1116,8 +1126,8 @@
         </p:nvSpPr>
         <p:spPr>
           <a:xfrm>
-            <a:off x="4674240" y="3146040"/>
-            <a:ext cx="4015800" cy="1776600"/>
+            <a:off x="4674240" y="2761920"/>
+            <a:ext cx="4015800" cy="1422720"/>
           </a:xfrm>
           <a:prstGeom prst="rect">
             <a:avLst/>
@@ -1154,7 +1164,7 @@
       </p:grpSpPr>
       <p:sp>
         <p:nvSpPr>
-          <p:cNvPr id="58" name="PlaceHolder 1"/>
+          <p:cNvPr id="55" name="PlaceHolder 1"/>
           <p:cNvSpPr>
             <a:spLocks noGrp="1"/>
           </p:cNvSpPr>
@@ -1164,8 +1174,8 @@
         </p:nvSpPr>
         <p:spPr>
           <a:xfrm>
-            <a:off x="457200" y="205920"/>
-            <a:ext cx="8229240" cy="856800"/>
+            <a:off x="457200" y="205200"/>
+            <a:ext cx="8229240" cy="858600"/>
           </a:xfrm>
           <a:prstGeom prst="rect">
             <a:avLst/>
@@ -1174,13 +1184,14 @@
         <p:txBody>
           <a:bodyPr lIns="0" rIns="0" tIns="0" bIns="0" anchor="ctr"/>
           <a:p>
-            <a:endParaRPr/>
-          </a:p>
-        </p:txBody>
-      </p:sp>
-      <p:sp>
-        <p:nvSpPr>
-          <p:cNvPr id="59" name="PlaceHolder 2"/>
+            <a:pPr algn="ctr"/>
+            <a:endParaRPr/>
+          </a:p>
+        </p:txBody>
+      </p:sp>
+      <p:sp>
+        <p:nvSpPr>
+          <p:cNvPr id="56" name="PlaceHolder 2"/>
           <p:cNvSpPr>
             <a:spLocks noGrp="1"/>
           </p:cNvSpPr>
@@ -1190,8 +1201,8 @@
         </p:nvSpPr>
         <p:spPr>
           <a:xfrm>
-            <a:off x="457200" y="1200240"/>
-            <a:ext cx="4015800" cy="1776600"/>
+            <a:off x="457200" y="1203480"/>
+            <a:ext cx="4015800" cy="1422720"/>
           </a:xfrm>
           <a:prstGeom prst="rect">
             <a:avLst/>
@@ -1206,7 +1217,7 @@
       </p:sp>
       <p:sp>
         <p:nvSpPr>
-          <p:cNvPr id="60" name="PlaceHolder 3"/>
+          <p:cNvPr id="57" name="PlaceHolder 3"/>
           <p:cNvSpPr>
             <a:spLocks noGrp="1"/>
           </p:cNvSpPr>
@@ -1216,8 +1227,8 @@
         </p:nvSpPr>
         <p:spPr>
           <a:xfrm>
-            <a:off x="4674240" y="1200240"/>
-            <a:ext cx="4015800" cy="1776600"/>
+            <a:off x="4674240" y="1203480"/>
+            <a:ext cx="4015800" cy="1422720"/>
           </a:xfrm>
           <a:prstGeom prst="rect">
             <a:avLst/>
@@ -1232,7 +1243,7 @@
       </p:sp>
       <p:sp>
         <p:nvSpPr>
-          <p:cNvPr id="61" name="PlaceHolder 4"/>
+          <p:cNvPr id="58" name="PlaceHolder 4"/>
           <p:cNvSpPr>
             <a:spLocks noGrp="1"/>
           </p:cNvSpPr>
@@ -1242,8 +1253,8 @@
         </p:nvSpPr>
         <p:spPr>
           <a:xfrm>
-            <a:off x="457200" y="3146040"/>
-            <a:ext cx="8229240" cy="1776600"/>
+            <a:off x="457200" y="2761920"/>
+            <a:ext cx="8229240" cy="1422720"/>
           </a:xfrm>
           <a:prstGeom prst="rect">
             <a:avLst/>
@@ -1280,7 +1291,7 @@
       </p:grpSpPr>
       <p:sp>
         <p:nvSpPr>
-          <p:cNvPr id="62" name="PlaceHolder 1"/>
+          <p:cNvPr id="59" name="PlaceHolder 1"/>
           <p:cNvSpPr>
             <a:spLocks noGrp="1"/>
           </p:cNvSpPr>
@@ -1290,8 +1301,8 @@
         </p:nvSpPr>
         <p:spPr>
           <a:xfrm>
-            <a:off x="457200" y="205920"/>
-            <a:ext cx="8229240" cy="856800"/>
+            <a:off x="457200" y="205200"/>
+            <a:ext cx="8229240" cy="858600"/>
           </a:xfrm>
           <a:prstGeom prst="rect">
             <a:avLst/>
@@ -1300,13 +1311,14 @@
         <p:txBody>
           <a:bodyPr lIns="0" rIns="0" tIns="0" bIns="0" anchor="ctr"/>
           <a:p>
-            <a:endParaRPr/>
-          </a:p>
-        </p:txBody>
-      </p:sp>
-      <p:sp>
-        <p:nvSpPr>
-          <p:cNvPr id="63" name="PlaceHolder 2"/>
+            <a:pPr algn="ctr"/>
+            <a:endParaRPr/>
+          </a:p>
+        </p:txBody>
+      </p:sp>
+      <p:sp>
+        <p:nvSpPr>
+          <p:cNvPr id="60" name="PlaceHolder 2"/>
           <p:cNvSpPr>
             <a:spLocks noGrp="1"/>
           </p:cNvSpPr>
@@ -1316,8 +1328,8 @@
         </p:nvSpPr>
         <p:spPr>
           <a:xfrm>
-            <a:off x="457200" y="1200240"/>
-            <a:ext cx="8229240" cy="1776600"/>
+            <a:off x="457200" y="1203480"/>
+            <a:ext cx="8229240" cy="1422720"/>
           </a:xfrm>
           <a:prstGeom prst="rect">
             <a:avLst/>
@@ -1332,7 +1344,7 @@
       </p:sp>
       <p:sp>
         <p:nvSpPr>
-          <p:cNvPr id="64" name="PlaceHolder 3"/>
+          <p:cNvPr id="61" name="PlaceHolder 3"/>
           <p:cNvSpPr>
             <a:spLocks noGrp="1"/>
           </p:cNvSpPr>
@@ -1342,8 +1354,8 @@
         </p:nvSpPr>
         <p:spPr>
           <a:xfrm>
-            <a:off x="457200" y="3146040"/>
-            <a:ext cx="8229240" cy="1776600"/>
+            <a:off x="457200" y="2761920"/>
+            <a:ext cx="8229240" cy="1422720"/>
           </a:xfrm>
           <a:prstGeom prst="rect">
             <a:avLst/>
@@ -1380,7 +1392,7 @@
       </p:grpSpPr>
       <p:sp>
         <p:nvSpPr>
-          <p:cNvPr id="65" name="PlaceHolder 1"/>
+          <p:cNvPr id="62" name="PlaceHolder 1"/>
           <p:cNvSpPr>
             <a:spLocks noGrp="1"/>
           </p:cNvSpPr>
@@ -1390,8 +1402,8 @@
         </p:nvSpPr>
         <p:spPr>
           <a:xfrm>
-            <a:off x="457200" y="205920"/>
-            <a:ext cx="8229240" cy="856800"/>
+            <a:off x="457200" y="205200"/>
+            <a:ext cx="8229240" cy="858600"/>
           </a:xfrm>
           <a:prstGeom prst="rect">
             <a:avLst/>
@@ -1400,13 +1412,14 @@
         <p:txBody>
           <a:bodyPr lIns="0" rIns="0" tIns="0" bIns="0" anchor="ctr"/>
           <a:p>
-            <a:endParaRPr/>
-          </a:p>
-        </p:txBody>
-      </p:sp>
-      <p:sp>
-        <p:nvSpPr>
-          <p:cNvPr id="66" name="PlaceHolder 2"/>
+            <a:pPr algn="ctr"/>
+            <a:endParaRPr/>
+          </a:p>
+        </p:txBody>
+      </p:sp>
+      <p:sp>
+        <p:nvSpPr>
+          <p:cNvPr id="63" name="PlaceHolder 2"/>
           <p:cNvSpPr>
             <a:spLocks noGrp="1"/>
           </p:cNvSpPr>
@@ -1416,8 +1429,8 @@
         </p:nvSpPr>
         <p:spPr>
           <a:xfrm>
-            <a:off x="457200" y="1200240"/>
-            <a:ext cx="4015800" cy="1776600"/>
+            <a:off x="457200" y="1203480"/>
+            <a:ext cx="4015800" cy="1422720"/>
           </a:xfrm>
           <a:prstGeom prst="rect">
             <a:avLst/>
@@ -1432,7 +1445,7 @@
       </p:sp>
       <p:sp>
         <p:nvSpPr>
-          <p:cNvPr id="67" name="PlaceHolder 3"/>
+          <p:cNvPr id="64" name="PlaceHolder 3"/>
           <p:cNvSpPr>
             <a:spLocks noGrp="1"/>
           </p:cNvSpPr>
@@ -1442,8 +1455,8 @@
         </p:nvSpPr>
         <p:spPr>
           <a:xfrm>
-            <a:off x="4674240" y="1200240"/>
-            <a:ext cx="4015800" cy="1776600"/>
+            <a:off x="4674240" y="1203480"/>
+            <a:ext cx="4015800" cy="1422720"/>
           </a:xfrm>
           <a:prstGeom prst="rect">
             <a:avLst/>
@@ -1458,7 +1471,7 @@
       </p:sp>
       <p:sp>
         <p:nvSpPr>
-          <p:cNvPr id="68" name="PlaceHolder 4"/>
+          <p:cNvPr id="65" name="PlaceHolder 4"/>
           <p:cNvSpPr>
             <a:spLocks noGrp="1"/>
           </p:cNvSpPr>
@@ -1468,8 +1481,8 @@
         </p:nvSpPr>
         <p:spPr>
           <a:xfrm>
-            <a:off x="4674240" y="3146040"/>
-            <a:ext cx="4015800" cy="1776600"/>
+            <a:off x="4674240" y="2761920"/>
+            <a:ext cx="4015800" cy="1422720"/>
           </a:xfrm>
           <a:prstGeom prst="rect">
             <a:avLst/>
@@ -1484,7 +1497,7 @@
       </p:sp>
       <p:sp>
         <p:nvSpPr>
-          <p:cNvPr id="69" name="PlaceHolder 5"/>
+          <p:cNvPr id="66" name="PlaceHolder 5"/>
           <p:cNvSpPr>
             <a:spLocks noGrp="1"/>
           </p:cNvSpPr>
@@ -1494,8 +1507,8 @@
         </p:nvSpPr>
         <p:spPr>
           <a:xfrm>
-            <a:off x="457200" y="3146040"/>
-            <a:ext cx="4015800" cy="1776600"/>
+            <a:off x="457200" y="2761920"/>
+            <a:ext cx="4015800" cy="1422720"/>
           </a:xfrm>
           <a:prstGeom prst="rect">
             <a:avLst/>
@@ -1532,7 +1545,7 @@
       </p:grpSpPr>
       <p:sp>
         <p:nvSpPr>
-          <p:cNvPr id="70" name="PlaceHolder 1"/>
+          <p:cNvPr id="67" name="PlaceHolder 1"/>
           <p:cNvSpPr>
             <a:spLocks noGrp="1"/>
           </p:cNvSpPr>
@@ -1542,8 +1555,8 @@
         </p:nvSpPr>
         <p:spPr>
           <a:xfrm>
-            <a:off x="457200" y="205920"/>
-            <a:ext cx="8229240" cy="856800"/>
+            <a:off x="457200" y="205200"/>
+            <a:ext cx="8229240" cy="858600"/>
           </a:xfrm>
           <a:prstGeom prst="rect">
             <a:avLst/>
@@ -1552,13 +1565,14 @@
         <p:txBody>
           <a:bodyPr lIns="0" rIns="0" tIns="0" bIns="0" anchor="ctr"/>
           <a:p>
-            <a:endParaRPr/>
-          </a:p>
-        </p:txBody>
-      </p:sp>
-      <p:sp>
-        <p:nvSpPr>
-          <p:cNvPr id="71" name="PlaceHolder 2"/>
+            <a:pPr algn="ctr"/>
+            <a:endParaRPr/>
+          </a:p>
+        </p:txBody>
+      </p:sp>
+      <p:sp>
+        <p:nvSpPr>
+          <p:cNvPr id="68" name="PlaceHolder 2"/>
           <p:cNvSpPr>
             <a:spLocks noGrp="1"/>
           </p:cNvSpPr>
@@ -1568,8 +1582,8 @@
         </p:nvSpPr>
         <p:spPr>
           <a:xfrm>
-            <a:off x="457200" y="1200240"/>
-            <a:ext cx="8229240" cy="3725280"/>
+            <a:off x="457200" y="1203480"/>
+            <a:ext cx="8229240" cy="2982960"/>
           </a:xfrm>
           <a:prstGeom prst="rect">
             <a:avLst/>
@@ -1584,7 +1598,7 @@
       </p:sp>
       <p:sp>
         <p:nvSpPr>
-          <p:cNvPr id="72" name="PlaceHolder 3"/>
+          <p:cNvPr id="69" name="PlaceHolder 3"/>
           <p:cNvSpPr>
             <a:spLocks noGrp="1"/>
           </p:cNvSpPr>
@@ -1594,8 +1608,8 @@
         </p:nvSpPr>
         <p:spPr>
           <a:xfrm>
-            <a:off x="457200" y="1200240"/>
-            <a:ext cx="8229240" cy="3725280"/>
+            <a:off x="457200" y="1203480"/>
+            <a:ext cx="8229240" cy="2982960"/>
           </a:xfrm>
           <a:prstGeom prst="rect">
             <a:avLst/>
@@ -1610,7 +1624,7 @@
       </p:sp>
       <p:pic>
         <p:nvPicPr>
-          <p:cNvPr id="73" name="" descr=""/>
+          <p:cNvPr id="70" name="" descr=""/>
           <p:cNvPicPr/>
           <p:nvPr/>
         </p:nvPicPr>
@@ -1620,8 +1634,8 @@
         </p:blipFill>
         <p:spPr>
           <a:xfrm>
-            <a:off x="2237040" y="1200240"/>
-            <a:ext cx="4669200" cy="3725280"/>
+            <a:off x="2702160" y="1203480"/>
+            <a:ext cx="3738600" cy="2982960"/>
           </a:xfrm>
           <a:prstGeom prst="rect">
             <a:avLst/>
@@ -1633,7 +1647,7 @@
       </p:pic>
       <p:pic>
         <p:nvPicPr>
-          <p:cNvPr id="74" name="" descr=""/>
+          <p:cNvPr id="71" name="" descr=""/>
           <p:cNvPicPr/>
           <p:nvPr/>
         </p:nvPicPr>
@@ -1643,8 +1657,8 @@
         </p:blipFill>
         <p:spPr>
           <a:xfrm>
-            <a:off x="2237040" y="1200240"/>
-            <a:ext cx="4669200" cy="3725280"/>
+            <a:off x="2702160" y="1203480"/>
+            <a:ext cx="3738600" cy="2982960"/>
           </a:xfrm>
           <a:prstGeom prst="rect">
             <a:avLst/>
@@ -1678,7 +1692,7 @@
       </p:grpSpPr>
       <p:sp>
         <p:nvSpPr>
-          <p:cNvPr id="6" name="PlaceHolder 1"/>
+          <p:cNvPr id="4" name="PlaceHolder 1"/>
           <p:cNvSpPr>
             <a:spLocks noGrp="1"/>
           </p:cNvSpPr>
@@ -1688,8 +1702,8 @@
         </p:nvSpPr>
         <p:spPr>
           <a:xfrm>
-            <a:off x="457200" y="205920"/>
-            <a:ext cx="8229240" cy="856800"/>
+            <a:off x="457200" y="205200"/>
+            <a:ext cx="8229240" cy="858600"/>
           </a:xfrm>
           <a:prstGeom prst="rect">
             <a:avLst/>
@@ -1698,13 +1712,14 @@
         <p:txBody>
           <a:bodyPr lIns="0" rIns="0" tIns="0" bIns="0" anchor="ctr"/>
           <a:p>
-            <a:endParaRPr/>
-          </a:p>
-        </p:txBody>
-      </p:sp>
-      <p:sp>
-        <p:nvSpPr>
-          <p:cNvPr id="7" name="PlaceHolder 2"/>
+            <a:pPr algn="ctr"/>
+            <a:endParaRPr/>
+          </a:p>
+        </p:txBody>
+      </p:sp>
+      <p:sp>
+        <p:nvSpPr>
+          <p:cNvPr id="5" name="PlaceHolder 2"/>
           <p:cNvSpPr>
             <a:spLocks noGrp="1"/>
           </p:cNvSpPr>
@@ -1714,8 +1729,8 @@
         </p:nvSpPr>
         <p:spPr>
           <a:xfrm>
-            <a:off x="457200" y="1200240"/>
-            <a:ext cx="8229240" cy="3725280"/>
+            <a:off x="457200" y="1203480"/>
+            <a:ext cx="8229240" cy="2982960"/>
           </a:xfrm>
           <a:prstGeom prst="rect">
             <a:avLst/>
@@ -1752,7 +1767,7 @@
       </p:grpSpPr>
       <p:sp>
         <p:nvSpPr>
-          <p:cNvPr id="8" name="PlaceHolder 1"/>
+          <p:cNvPr id="6" name="PlaceHolder 1"/>
           <p:cNvSpPr>
             <a:spLocks noGrp="1"/>
           </p:cNvSpPr>
@@ -1762,8 +1777,8 @@
         </p:nvSpPr>
         <p:spPr>
           <a:xfrm>
-            <a:off x="457200" y="205920"/>
-            <a:ext cx="8229240" cy="856800"/>
+            <a:off x="457200" y="205200"/>
+            <a:ext cx="8229240" cy="858600"/>
           </a:xfrm>
           <a:prstGeom prst="rect">
             <a:avLst/>
@@ -1772,13 +1787,14 @@
         <p:txBody>
           <a:bodyPr lIns="0" rIns="0" tIns="0" bIns="0" anchor="ctr"/>
           <a:p>
-            <a:endParaRPr/>
-          </a:p>
-        </p:txBody>
-      </p:sp>
-      <p:sp>
-        <p:nvSpPr>
-          <p:cNvPr id="9" name="PlaceHolder 2"/>
+            <a:pPr algn="ctr"/>
+            <a:endParaRPr/>
+          </a:p>
+        </p:txBody>
+      </p:sp>
+      <p:sp>
+        <p:nvSpPr>
+          <p:cNvPr id="7" name="PlaceHolder 2"/>
           <p:cNvSpPr>
             <a:spLocks noGrp="1"/>
           </p:cNvSpPr>
@@ -1788,8 +1804,8 @@
         </p:nvSpPr>
         <p:spPr>
           <a:xfrm>
-            <a:off x="457200" y="1200240"/>
-            <a:ext cx="4015800" cy="3725280"/>
+            <a:off x="457200" y="1203480"/>
+            <a:ext cx="4015800" cy="2982960"/>
           </a:xfrm>
           <a:prstGeom prst="rect">
             <a:avLst/>
@@ -1804,7 +1820,7 @@
       </p:sp>
       <p:sp>
         <p:nvSpPr>
-          <p:cNvPr id="10" name="PlaceHolder 3"/>
+          <p:cNvPr id="8" name="PlaceHolder 3"/>
           <p:cNvSpPr>
             <a:spLocks noGrp="1"/>
           </p:cNvSpPr>
@@ -1814,8 +1830,8 @@
         </p:nvSpPr>
         <p:spPr>
           <a:xfrm>
-            <a:off x="4674240" y="1200240"/>
-            <a:ext cx="4015800" cy="3725280"/>
+            <a:off x="4674240" y="1203480"/>
+            <a:ext cx="4015800" cy="2982960"/>
           </a:xfrm>
           <a:prstGeom prst="rect">
             <a:avLst/>
@@ -1852,7 +1868,7 @@
       </p:grpSpPr>
       <p:sp>
         <p:nvSpPr>
-          <p:cNvPr id="11" name="PlaceHolder 1"/>
+          <p:cNvPr id="9" name="PlaceHolder 1"/>
           <p:cNvSpPr>
             <a:spLocks noGrp="1"/>
           </p:cNvSpPr>
@@ -1862,8 +1878,8 @@
         </p:nvSpPr>
         <p:spPr>
           <a:xfrm>
-            <a:off x="457200" y="205920"/>
-            <a:ext cx="8229240" cy="856800"/>
+            <a:off x="457200" y="205200"/>
+            <a:ext cx="8229240" cy="858600"/>
           </a:xfrm>
           <a:prstGeom prst="rect">
             <a:avLst/>
@@ -1872,6 +1888,7 @@
         <p:txBody>
           <a:bodyPr lIns="0" rIns="0" tIns="0" bIns="0" anchor="ctr"/>
           <a:p>
+            <a:pPr algn="ctr"/>
             <a:endParaRPr/>
           </a:p>
         </p:txBody>
@@ -1900,7 +1917,7 @@
       </p:grpSpPr>
       <p:sp>
         <p:nvSpPr>
-          <p:cNvPr id="12" name="PlaceHolder 1"/>
+          <p:cNvPr id="10" name="PlaceHolder 1"/>
           <p:cNvSpPr>
             <a:spLocks noGrp="1"/>
           </p:cNvSpPr>
@@ -1910,8 +1927,8 @@
         </p:nvSpPr>
         <p:spPr>
           <a:xfrm>
-            <a:off x="457200" y="205920"/>
-            <a:ext cx="8229240" cy="3972960"/>
+            <a:off x="457200" y="205200"/>
+            <a:ext cx="8229240" cy="3981240"/>
           </a:xfrm>
           <a:prstGeom prst="rect">
             <a:avLst/>
@@ -1949,7 +1966,7 @@
       </p:grpSpPr>
       <p:sp>
         <p:nvSpPr>
-          <p:cNvPr id="13" name="PlaceHolder 1"/>
+          <p:cNvPr id="11" name="PlaceHolder 1"/>
           <p:cNvSpPr>
             <a:spLocks noGrp="1"/>
           </p:cNvSpPr>
@@ -1959,8 +1976,8 @@
         </p:nvSpPr>
         <p:spPr>
           <a:xfrm>
-            <a:off x="457200" y="205920"/>
-            <a:ext cx="8229240" cy="856800"/>
+            <a:off x="457200" y="205200"/>
+            <a:ext cx="8229240" cy="858600"/>
           </a:xfrm>
           <a:prstGeom prst="rect">
             <a:avLst/>
@@ -1969,13 +1986,14 @@
         <p:txBody>
           <a:bodyPr lIns="0" rIns="0" tIns="0" bIns="0" anchor="ctr"/>
           <a:p>
-            <a:endParaRPr/>
-          </a:p>
-        </p:txBody>
-      </p:sp>
-      <p:sp>
-        <p:nvSpPr>
-          <p:cNvPr id="14" name="PlaceHolder 2"/>
+            <a:pPr algn="ctr"/>
+            <a:endParaRPr/>
+          </a:p>
+        </p:txBody>
+      </p:sp>
+      <p:sp>
+        <p:nvSpPr>
+          <p:cNvPr id="12" name="PlaceHolder 2"/>
           <p:cNvSpPr>
             <a:spLocks noGrp="1"/>
           </p:cNvSpPr>
@@ -1985,8 +2003,8 @@
         </p:nvSpPr>
         <p:spPr>
           <a:xfrm>
-            <a:off x="457200" y="1200240"/>
-            <a:ext cx="4015800" cy="1776600"/>
+            <a:off x="457200" y="1203480"/>
+            <a:ext cx="4015800" cy="1422720"/>
           </a:xfrm>
           <a:prstGeom prst="rect">
             <a:avLst/>
@@ -2001,7 +2019,7 @@
       </p:sp>
       <p:sp>
         <p:nvSpPr>
-          <p:cNvPr id="15" name="PlaceHolder 3"/>
+          <p:cNvPr id="13" name="PlaceHolder 3"/>
           <p:cNvSpPr>
             <a:spLocks noGrp="1"/>
           </p:cNvSpPr>
@@ -2011,8 +2029,8 @@
         </p:nvSpPr>
         <p:spPr>
           <a:xfrm>
-            <a:off x="457200" y="3146040"/>
-            <a:ext cx="4015800" cy="1776600"/>
+            <a:off x="457200" y="2761920"/>
+            <a:ext cx="4015800" cy="1422720"/>
           </a:xfrm>
           <a:prstGeom prst="rect">
             <a:avLst/>
@@ -2027,7 +2045,7 @@
       </p:sp>
       <p:sp>
         <p:nvSpPr>
-          <p:cNvPr id="16" name="PlaceHolder 4"/>
+          <p:cNvPr id="14" name="PlaceHolder 4"/>
           <p:cNvSpPr>
             <a:spLocks noGrp="1"/>
           </p:cNvSpPr>
@@ -2037,8 +2055,8 @@
         </p:nvSpPr>
         <p:spPr>
           <a:xfrm>
-            <a:off x="4674240" y="1200240"/>
-            <a:ext cx="4015800" cy="3725280"/>
+            <a:off x="4674240" y="1203480"/>
+            <a:ext cx="4015800" cy="2982960"/>
           </a:xfrm>
           <a:prstGeom prst="rect">
             <a:avLst/>
@@ -2075,7 +2093,7 @@
       </p:grpSpPr>
       <p:sp>
         <p:nvSpPr>
-          <p:cNvPr id="17" name="PlaceHolder 1"/>
+          <p:cNvPr id="15" name="PlaceHolder 1"/>
           <p:cNvSpPr>
             <a:spLocks noGrp="1"/>
           </p:cNvSpPr>
@@ -2085,8 +2103,8 @@
         </p:nvSpPr>
         <p:spPr>
           <a:xfrm>
-            <a:off x="457200" y="205920"/>
-            <a:ext cx="8229240" cy="856800"/>
+            <a:off x="457200" y="205200"/>
+            <a:ext cx="8229240" cy="858600"/>
           </a:xfrm>
           <a:prstGeom prst="rect">
             <a:avLst/>
@@ -2095,13 +2113,14 @@
         <p:txBody>
           <a:bodyPr lIns="0" rIns="0" tIns="0" bIns="0" anchor="ctr"/>
           <a:p>
-            <a:endParaRPr/>
-          </a:p>
-        </p:txBody>
-      </p:sp>
-      <p:sp>
-        <p:nvSpPr>
-          <p:cNvPr id="18" name="PlaceHolder 2"/>
+            <a:pPr algn="ctr"/>
+            <a:endParaRPr/>
+          </a:p>
+        </p:txBody>
+      </p:sp>
+      <p:sp>
+        <p:nvSpPr>
+          <p:cNvPr id="16" name="PlaceHolder 2"/>
           <p:cNvSpPr>
             <a:spLocks noGrp="1"/>
           </p:cNvSpPr>
@@ -2111,8 +2130,8 @@
         </p:nvSpPr>
         <p:spPr>
           <a:xfrm>
-            <a:off x="457200" y="1200240"/>
-            <a:ext cx="4015800" cy="3725280"/>
+            <a:off x="457200" y="1203480"/>
+            <a:ext cx="4015800" cy="2982960"/>
           </a:xfrm>
           <a:prstGeom prst="rect">
             <a:avLst/>
@@ -2127,7 +2146,7 @@
       </p:sp>
       <p:sp>
         <p:nvSpPr>
-          <p:cNvPr id="19" name="PlaceHolder 3"/>
+          <p:cNvPr id="17" name="PlaceHolder 3"/>
           <p:cNvSpPr>
             <a:spLocks noGrp="1"/>
           </p:cNvSpPr>
@@ -2137,8 +2156,8 @@
         </p:nvSpPr>
         <p:spPr>
           <a:xfrm>
-            <a:off x="4674240" y="1200240"/>
-            <a:ext cx="4015800" cy="1776600"/>
+            <a:off x="4674240" y="1203480"/>
+            <a:ext cx="4015800" cy="1422720"/>
           </a:xfrm>
           <a:prstGeom prst="rect">
             <a:avLst/>
@@ -2153,7 +2172,7 @@
       </p:sp>
       <p:sp>
         <p:nvSpPr>
-          <p:cNvPr id="20" name="PlaceHolder 4"/>
+          <p:cNvPr id="18" name="PlaceHolder 4"/>
           <p:cNvSpPr>
             <a:spLocks noGrp="1"/>
           </p:cNvSpPr>
@@ -2163,8 +2182,8 @@
         </p:nvSpPr>
         <p:spPr>
           <a:xfrm>
-            <a:off x="4674240" y="3146040"/>
-            <a:ext cx="4015800" cy="1776600"/>
+            <a:off x="4674240" y="2761920"/>
+            <a:ext cx="4015800" cy="1422720"/>
           </a:xfrm>
           <a:prstGeom prst="rect">
             <a:avLst/>
@@ -2201,7 +2220,7 @@
       </p:grpSpPr>
       <p:sp>
         <p:nvSpPr>
-          <p:cNvPr id="21" name="PlaceHolder 1"/>
+          <p:cNvPr id="19" name="PlaceHolder 1"/>
           <p:cNvSpPr>
             <a:spLocks noGrp="1"/>
           </p:cNvSpPr>
@@ -2211,8 +2230,8 @@
         </p:nvSpPr>
         <p:spPr>
           <a:xfrm>
-            <a:off x="457200" y="205920"/>
-            <a:ext cx="8229240" cy="856800"/>
+            <a:off x="457200" y="205200"/>
+            <a:ext cx="8229240" cy="858600"/>
           </a:xfrm>
           <a:prstGeom prst="rect">
             <a:avLst/>
@@ -2221,13 +2240,14 @@
         <p:txBody>
           <a:bodyPr lIns="0" rIns="0" tIns="0" bIns="0" anchor="ctr"/>
           <a:p>
-            <a:endParaRPr/>
-          </a:p>
-        </p:txBody>
-      </p:sp>
-      <p:sp>
-        <p:nvSpPr>
-          <p:cNvPr id="22" name="PlaceHolder 2"/>
+            <a:pPr algn="ctr"/>
+            <a:endParaRPr/>
+          </a:p>
+        </p:txBody>
+      </p:sp>
+      <p:sp>
+        <p:nvSpPr>
+          <p:cNvPr id="20" name="PlaceHolder 2"/>
           <p:cNvSpPr>
             <a:spLocks noGrp="1"/>
           </p:cNvSpPr>
@@ -2237,8 +2257,8 @@
         </p:nvSpPr>
         <p:spPr>
           <a:xfrm>
-            <a:off x="457200" y="1200240"/>
-            <a:ext cx="4015800" cy="1776600"/>
+            <a:off x="457200" y="1203480"/>
+            <a:ext cx="4015800" cy="1422720"/>
           </a:xfrm>
           <a:prstGeom prst="rect">
             <a:avLst/>
@@ -2253,7 +2273,7 @@
       </p:sp>
       <p:sp>
         <p:nvSpPr>
-          <p:cNvPr id="23" name="PlaceHolder 3"/>
+          <p:cNvPr id="21" name="PlaceHolder 3"/>
           <p:cNvSpPr>
             <a:spLocks noGrp="1"/>
           </p:cNvSpPr>
@@ -2263,8 +2283,8 @@
         </p:nvSpPr>
         <p:spPr>
           <a:xfrm>
-            <a:off x="4674240" y="1200240"/>
-            <a:ext cx="4015800" cy="1776600"/>
+            <a:off x="4674240" y="1203480"/>
+            <a:ext cx="4015800" cy="1422720"/>
           </a:xfrm>
           <a:prstGeom prst="rect">
             <a:avLst/>
@@ -2279,7 +2299,7 @@
       </p:sp>
       <p:sp>
         <p:nvSpPr>
-          <p:cNvPr id="24" name="PlaceHolder 4"/>
+          <p:cNvPr id="22" name="PlaceHolder 4"/>
           <p:cNvSpPr>
             <a:spLocks noGrp="1"/>
           </p:cNvSpPr>
@@ -2289,8 +2309,8 @@
         </p:nvSpPr>
         <p:spPr>
           <a:xfrm>
-            <a:off x="457200" y="3146040"/>
-            <a:ext cx="8229240" cy="1776600"/>
+            <a:off x="457200" y="2761920"/>
+            <a:ext cx="8229240" cy="1422720"/>
           </a:xfrm>
           <a:prstGeom prst="rect">
             <a:avLst/>
@@ -2344,16 +2364,17 @@
         </p:nvSpPr>
         <p:spPr>
           <a:xfrm>
-            <a:off x="685800" y="1583280"/>
-            <a:ext cx="7772040" cy="1159560"/>
-          </a:xfrm>
-          <a:prstGeom prst="rect">
-            <a:avLst/>
-          </a:prstGeom>
-        </p:spPr>
-        <p:txBody>
-          <a:bodyPr tIns="91440" bIns="91440" anchor="b"/>
-          <a:p>
+            <a:off x="457200" y="205920"/>
+            <a:ext cx="8228520" cy="856080"/>
+          </a:xfrm>
+          <a:prstGeom prst="rect">
+            <a:avLst/>
+          </a:prstGeom>
+        </p:spPr>
+        <p:txBody>
+          <a:bodyPr lIns="0" rIns="0" tIns="0" bIns="0" anchor="ctr"/>
+          <a:p>
+            <a:pPr algn="ctr"/>
             <a:endParaRPr/>
           </a:p>
         </p:txBody>
@@ -2365,81 +2386,13 @@
             <a:spLocks noGrp="1"/>
           </p:cNvSpPr>
           <p:nvPr>
-            <p:ph type="subTitle"/>
-          </p:nvPr>
-        </p:nvSpPr>
-        <p:spPr>
-          <a:xfrm>
-            <a:off x="685800" y="2840040"/>
-            <a:ext cx="7772040" cy="784440"/>
-          </a:xfrm>
-          <a:prstGeom prst="rect">
-            <a:avLst/>
-          </a:prstGeom>
-        </p:spPr>
-        <p:txBody>
-          <a:bodyPr tIns="91440" bIns="91440"/>
-          <a:p>
-            <a:pPr algn="ctr"/>
-            <a:endParaRPr/>
-          </a:p>
-        </p:txBody>
-      </p:sp>
-      <p:sp>
-        <p:nvSpPr>
-          <p:cNvPr id="2" name="PlaceHolder 3"/>
-          <p:cNvSpPr>
-            <a:spLocks noGrp="1"/>
-          </p:cNvSpPr>
-          <p:nvPr>
-            <p:ph type="sldNum"/>
-          </p:nvPr>
-        </p:nvSpPr>
-        <p:spPr>
-          <a:xfrm>
-            <a:off x="8556840" y="4749840"/>
-            <a:ext cx="548280" cy="393120"/>
-          </a:xfrm>
-          <a:prstGeom prst="rect">
-            <a:avLst/>
-          </a:prstGeom>
-        </p:spPr>
-        <p:txBody>
-          <a:bodyPr tIns="91440" bIns="91440" anchor="ctr"/>
-          <a:p>
-            <a:pPr algn="r">
-              <a:lnSpc>
-                <a:spcPct val="100000"/>
-              </a:lnSpc>
-            </a:pPr>
-            <a:fld id="{673F17E3-EFB6-4B23-8D6B-A4AA0FA04D0A}" type="slidenum">
-              <a:rPr lang="en-US" sz="1300" strike="noStrike">
-                <a:solidFill>
-                  <a:srgbClr val="000000"/>
-                </a:solidFill>
-                <a:latin typeface="Arial"/>
-                <a:ea typeface="Arial"/>
-              </a:rPr>
-              <a:t>&lt;number&gt;</a:t>
-            </a:fld>
-            <a:endParaRPr/>
-          </a:p>
-        </p:txBody>
-      </p:sp>
-      <p:sp>
-        <p:nvSpPr>
-          <p:cNvPr id="3" name="PlaceHolder 4"/>
-          <p:cNvSpPr>
-            <a:spLocks noGrp="1"/>
-          </p:cNvSpPr>
-          <p:nvPr>
             <p:ph type="body"/>
           </p:nvPr>
         </p:nvSpPr>
         <p:spPr>
           <a:xfrm>
-            <a:off x="457200" y="1203480"/>
-            <a:ext cx="8229240" cy="2982960"/>
+            <a:off x="457200" y="1200240"/>
+            <a:ext cx="8228520" cy="3724560"/>
           </a:xfrm>
           <a:prstGeom prst="rect">
             <a:avLst/>
@@ -2454,7 +2407,7 @@
               <a:buChar char=""/>
             </a:pPr>
             <a:r>
-              <a:rPr lang="en-US" sz="1400">
+              <a:rPr lang="en-AU">
                 <a:latin typeface="Arial"/>
               </a:rPr>
               <a:t>Click to edit the outline text format</a:t>
@@ -2468,7 +2421,7 @@
               <a:buChar char=""/>
             </a:pPr>
             <a:r>
-              <a:rPr lang="en-US" sz="1400">
+              <a:rPr lang="en-AU">
                 <a:latin typeface="Arial"/>
               </a:rPr>
               <a:t>Second Outline Level</a:t>
@@ -2482,7 +2435,7 @@
               <a:buChar char=""/>
             </a:pPr>
             <a:r>
-              <a:rPr lang="en-US" sz="1400">
+              <a:rPr lang="en-AU">
                 <a:latin typeface="Arial"/>
               </a:rPr>
               <a:t>Third Outline Level</a:t>
@@ -2496,7 +2449,7 @@
               <a:buChar char=""/>
             </a:pPr>
             <a:r>
-              <a:rPr lang="en-US" sz="1400">
+              <a:rPr lang="en-AU">
                 <a:latin typeface="Arial"/>
               </a:rPr>
               <a:t>Fourth Outline Level</a:t>
@@ -2510,7 +2463,7 @@
               <a:buChar char=""/>
             </a:pPr>
             <a:r>
-              <a:rPr lang="en-US" sz="2000">
+              <a:rPr lang="en-AU">
                 <a:latin typeface="Arial"/>
               </a:rPr>
               <a:t>Fifth Outline Level</a:t>
@@ -2524,7 +2477,7 @@
               <a:buChar char=""/>
             </a:pPr>
             <a:r>
-              <a:rPr lang="en-US" sz="2000">
+              <a:rPr lang="en-AU">
                 <a:latin typeface="Arial"/>
               </a:rPr>
               <a:t>Sixth Outline Level</a:t>
@@ -2538,7 +2491,7 @@
               <a:buChar char=""/>
             </a:pPr>
             <a:r>
-              <a:rPr lang="en-US" sz="2000">
+              <a:rPr lang="en-AU">
                 <a:latin typeface="Arial"/>
               </a:rPr>
               <a:t>Seventh Outline Level</a:t>
@@ -2593,7 +2546,7 @@
       </p:grpSpPr>
       <p:sp>
         <p:nvSpPr>
-          <p:cNvPr id="38" name="PlaceHolder 1"/>
+          <p:cNvPr id="36" name="PlaceHolder 1"/>
           <p:cNvSpPr>
             <a:spLocks noGrp="1"/>
           </p:cNvSpPr>
@@ -2603,23 +2556,30 @@
         </p:nvSpPr>
         <p:spPr>
           <a:xfrm>
-            <a:off x="457200" y="205920"/>
-            <a:ext cx="8229240" cy="856800"/>
-          </a:xfrm>
-          <a:prstGeom prst="rect">
-            <a:avLst/>
-          </a:prstGeom>
-        </p:spPr>
-        <p:txBody>
-          <a:bodyPr tIns="91440" bIns="91440" anchor="b"/>
-          <a:p>
-            <a:endParaRPr/>
-          </a:p>
-        </p:txBody>
-      </p:sp>
-      <p:sp>
-        <p:nvSpPr>
-          <p:cNvPr id="39" name="PlaceHolder 2"/>
+            <a:off x="457200" y="205200"/>
+            <a:ext cx="8229240" cy="858600"/>
+          </a:xfrm>
+          <a:prstGeom prst="rect">
+            <a:avLst/>
+          </a:prstGeom>
+        </p:spPr>
+        <p:txBody>
+          <a:bodyPr lIns="0" rIns="0" tIns="0" bIns="0" anchor="ctr"/>
+          <a:p>
+            <a:pPr algn="ctr"/>
+            <a:r>
+              <a:rPr lang="en-AU" sz="4400">
+                <a:latin typeface="Arial"/>
+              </a:rPr>
+              <a:t>Click to edit the title text format</a:t>
+            </a:r>
+            <a:endParaRPr/>
+          </a:p>
+        </p:txBody>
+      </p:sp>
+      <p:sp>
+        <p:nvSpPr>
+          <p:cNvPr id="37" name="PlaceHolder 2"/>
           <p:cNvSpPr>
             <a:spLocks noGrp="1"/>
           </p:cNvSpPr>
@@ -2629,15 +2589,15 @@
         </p:nvSpPr>
         <p:spPr>
           <a:xfrm>
-            <a:off x="457200" y="1200240"/>
-            <a:ext cx="8229240" cy="3725280"/>
-          </a:xfrm>
-          <a:prstGeom prst="rect">
-            <a:avLst/>
-          </a:prstGeom>
-        </p:spPr>
-        <p:txBody>
-          <a:bodyPr tIns="91440" bIns="91440"/>
+            <a:off x="457200" y="1203480"/>
+            <a:ext cx="8229240" cy="2982960"/>
+          </a:xfrm>
+          <a:prstGeom prst="rect">
+            <a:avLst/>
+          </a:prstGeom>
+        </p:spPr>
+        <p:txBody>
+          <a:bodyPr lIns="0" rIns="0" tIns="0" bIns="0"/>
           <a:p>
             <a:pPr>
               <a:buSzPct val="45000"/>
@@ -2645,7 +2605,7 @@
               <a:buChar char=""/>
             </a:pPr>
             <a:r>
-              <a:rPr lang="en-US" sz="3000">
+              <a:rPr lang="en-AU" sz="3200">
                 <a:latin typeface="Arial"/>
               </a:rPr>
               <a:t>Click to edit the outline text format</a:t>
@@ -2659,7 +2619,7 @@
               <a:buChar char=""/>
             </a:pPr>
             <a:r>
-              <a:rPr lang="en-US" sz="3000">
+              <a:rPr lang="en-AU" sz="2800">
                 <a:latin typeface="Arial"/>
               </a:rPr>
               <a:t>Second Outline Level</a:t>
@@ -2673,7 +2633,7 @@
               <a:buChar char=""/>
             </a:pPr>
             <a:r>
-              <a:rPr lang="en-US" sz="3000">
+              <a:rPr lang="en-AU" sz="2400">
                 <a:latin typeface="Arial"/>
               </a:rPr>
               <a:t>Third Outline Level</a:t>
@@ -2687,7 +2647,7 @@
               <a:buChar char=""/>
             </a:pPr>
             <a:r>
-              <a:rPr lang="en-US" sz="3000">
+              <a:rPr lang="en-AU" sz="2000">
                 <a:latin typeface="Arial"/>
               </a:rPr>
               <a:t>Fourth Outline Level</a:t>
@@ -2701,7 +2661,7 @@
               <a:buChar char=""/>
             </a:pPr>
             <a:r>
-              <a:rPr lang="en-US" sz="3000">
+              <a:rPr lang="en-AU" sz="2000">
                 <a:latin typeface="Arial"/>
               </a:rPr>
               <a:t>Fifth Outline Level</a:t>
@@ -2715,7 +2675,7 @@
               <a:buChar char=""/>
             </a:pPr>
             <a:r>
-              <a:rPr lang="en-US" sz="3000">
+              <a:rPr lang="en-AU" sz="2000">
                 <a:latin typeface="Arial"/>
               </a:rPr>
               <a:t>Sixth Outline Level</a:t>
@@ -2729,52 +2689,11 @@
               <a:buChar char=""/>
             </a:pPr>
             <a:r>
-              <a:rPr lang="en-US" sz="3000">
+              <a:rPr lang="en-AU" sz="2000">
                 <a:latin typeface="Arial"/>
               </a:rPr>
               <a:t>Seventh Outline Level</a:t>
             </a:r>
-            <a:endParaRPr/>
-          </a:p>
-        </p:txBody>
-      </p:sp>
-      <p:sp>
-        <p:nvSpPr>
-          <p:cNvPr id="40" name="PlaceHolder 3"/>
-          <p:cNvSpPr>
-            <a:spLocks noGrp="1"/>
-          </p:cNvSpPr>
-          <p:nvPr>
-            <p:ph type="sldNum"/>
-          </p:nvPr>
-        </p:nvSpPr>
-        <p:spPr>
-          <a:xfrm>
-            <a:off x="8556840" y="4749840"/>
-            <a:ext cx="548280" cy="393120"/>
-          </a:xfrm>
-          <a:prstGeom prst="rect">
-            <a:avLst/>
-          </a:prstGeom>
-        </p:spPr>
-        <p:txBody>
-          <a:bodyPr tIns="91440" bIns="91440" anchor="ctr"/>
-          <a:p>
-            <a:pPr algn="r">
-              <a:lnSpc>
-                <a:spcPct val="100000"/>
-              </a:lnSpc>
-            </a:pPr>
-            <a:fld id="{8758D622-37E2-4283-9148-52C4366FF6DE}" type="slidenum">
-              <a:rPr lang="en-US" sz="1300" strike="noStrike">
-                <a:solidFill>
-                  <a:srgbClr val="000000"/>
-                </a:solidFill>
-                <a:latin typeface="Arial"/>
-                <a:ea typeface="Arial"/>
-              </a:rPr>
-              <a:t>&lt;number&gt;</a:t>
-            </a:fld>
             <a:endParaRPr/>
           </a:p>
         </p:txBody>
@@ -2818,14 +2737,14 @@
       </p:grpSpPr>
       <p:sp>
         <p:nvSpPr>
-          <p:cNvPr id="75" name="TextShape 1"/>
-          <p:cNvSpPr txBox="1"/>
+          <p:cNvPr id="72" name="CustomShape 1"/>
+          <p:cNvSpPr/>
           <p:nvPr/>
         </p:nvSpPr>
         <p:spPr>
           <a:xfrm>
             <a:off x="685800" y="818280"/>
-            <a:ext cx="7772040" cy="1924560"/>
+            <a:ext cx="7771320" cy="1923840"/>
           </a:xfrm>
           <a:prstGeom prst="rect">
             <a:avLst/>
@@ -2835,8 +2754,14 @@
             <a:noFill/>
           </a:ln>
         </p:spPr>
-        <p:txBody>
-          <a:bodyPr tIns="91440" bIns="91440" anchor="b"/>
+        <p:style>
+          <a:lnRef idx="0"/>
+          <a:fillRef idx="0"/>
+          <a:effectRef idx="0"/>
+          <a:fontRef idx="minor"/>
+        </p:style>
+        <p:txBody>
+          <a:bodyPr lIns="90000" rIns="90000" tIns="91440" bIns="91440" anchor="b"/>
           <a:p>
             <a:pPr algn="ctr">
               <a:lnSpc>
@@ -2844,7 +2769,7 @@
               </a:lnSpc>
             </a:pPr>
             <a:r>
-              <a:rPr b="1" lang="en-US" sz="4800" strike="noStrike">
+              <a:rPr b="1" lang="en-AU" sz="4800" strike="noStrike">
                 <a:solidFill>
                   <a:srgbClr val="000000"/>
                 </a:solidFill>
@@ -2859,14 +2784,14 @@
       </p:sp>
       <p:sp>
         <p:nvSpPr>
-          <p:cNvPr id="76" name="TextShape 2"/>
-          <p:cNvSpPr txBox="1"/>
+          <p:cNvPr id="73" name="CustomShape 2"/>
+          <p:cNvSpPr/>
           <p:nvPr/>
         </p:nvSpPr>
         <p:spPr>
           <a:xfrm>
             <a:off x="685800" y="2840040"/>
-            <a:ext cx="7772040" cy="784440"/>
+            <a:ext cx="7771320" cy="783720"/>
           </a:xfrm>
           <a:prstGeom prst="rect">
             <a:avLst/>
@@ -2876,8 +2801,14 @@
             <a:noFill/>
           </a:ln>
         </p:spPr>
-        <p:txBody>
-          <a:bodyPr tIns="91440" bIns="91440"/>
+        <p:style>
+          <a:lnRef idx="0"/>
+          <a:fillRef idx="0"/>
+          <a:effectRef idx="0"/>
+          <a:fontRef idx="minor"/>
+        </p:style>
+        <p:txBody>
+          <a:bodyPr lIns="90000" rIns="90000" tIns="91440" bIns="91440"/>
           <a:p>
             <a:pPr algn="ctr">
               <a:lnSpc>
@@ -2885,7 +2816,7 @@
               </a:lnSpc>
             </a:pPr>
             <a:r>
-              <a:rPr lang="en-US" sz="3000" strike="noStrike">
+              <a:rPr lang="en-AU" sz="3000" strike="noStrike">
                 <a:solidFill>
                   <a:srgbClr val="666666"/>
                 </a:solidFill>
@@ -2949,14 +2880,14 @@
       </p:grpSpPr>
       <p:sp>
         <p:nvSpPr>
-          <p:cNvPr id="77" name="TextShape 1"/>
-          <p:cNvSpPr txBox="1"/>
+          <p:cNvPr id="74" name="CustomShape 1"/>
+          <p:cNvSpPr/>
           <p:nvPr/>
         </p:nvSpPr>
         <p:spPr>
           <a:xfrm>
             <a:off x="457200" y="205920"/>
-            <a:ext cx="8229240" cy="857160"/>
+            <a:ext cx="8228520" cy="856440"/>
           </a:xfrm>
           <a:prstGeom prst="rect">
             <a:avLst/>
@@ -2966,8 +2897,14 @@
             <a:noFill/>
           </a:ln>
         </p:spPr>
-        <p:txBody>
-          <a:bodyPr tIns="91440" bIns="91440" anchor="b"/>
+        <p:style>
+          <a:lnRef idx="0"/>
+          <a:fillRef idx="0"/>
+          <a:effectRef idx="0"/>
+          <a:fontRef idx="minor"/>
+        </p:style>
+        <p:txBody>
+          <a:bodyPr lIns="90000" rIns="90000" tIns="91440" bIns="91440" anchor="b"/>
           <a:p>
             <a:pPr>
               <a:lnSpc>
@@ -2975,7 +2912,7 @@
               </a:lnSpc>
             </a:pPr>
             <a:r>
-              <a:rPr b="1" lang="en-US" sz="3600" strike="noStrike">
+              <a:rPr b="1" lang="en-AU" sz="3600" strike="noStrike">
                 <a:solidFill>
                   <a:srgbClr val="000000"/>
                 </a:solidFill>
@@ -2990,14 +2927,14 @@
       </p:sp>
       <p:sp>
         <p:nvSpPr>
-          <p:cNvPr id="78" name="TextShape 2"/>
-          <p:cNvSpPr txBox="1"/>
+          <p:cNvPr id="75" name="CustomShape 2"/>
+          <p:cNvSpPr/>
           <p:nvPr/>
         </p:nvSpPr>
         <p:spPr>
           <a:xfrm>
             <a:off x="457200" y="1200240"/>
-            <a:ext cx="8229240" cy="3725280"/>
+            <a:ext cx="8228520" cy="3724560"/>
           </a:xfrm>
           <a:prstGeom prst="rect">
             <a:avLst/>
@@ -3007,8 +2944,14 @@
             <a:noFill/>
           </a:ln>
         </p:spPr>
-        <p:txBody>
-          <a:bodyPr tIns="91440" bIns="91440"/>
+        <p:style>
+          <a:lnRef idx="0"/>
+          <a:fillRef idx="0"/>
+          <a:effectRef idx="0"/>
+          <a:fontRef idx="minor"/>
+        </p:style>
+        <p:txBody>
+          <a:bodyPr lIns="90000" rIns="90000" tIns="91440" bIns="91440"/>
           <a:p>
             <a:pPr>
               <a:lnSpc>
@@ -3016,7 +2959,7 @@
               </a:lnSpc>
             </a:pPr>
             <a:r>
-              <a:rPr lang="en-US" sz="3000" strike="noStrike">
+              <a:rPr lang="en-AU" sz="3000" strike="noStrike">
                 <a:solidFill>
                   <a:srgbClr val="000000"/>
                 </a:solidFill>
@@ -3036,7 +2979,7 @@
               <a:buAutoNum type="alphaUcPeriod"/>
             </a:pPr>
             <a:r>
-              <a:rPr lang="en-US" sz="3000" strike="noStrike">
+              <a:rPr lang="en-AU" sz="3000" strike="noStrike">
                 <a:solidFill>
                   <a:srgbClr val="000000"/>
                 </a:solidFill>
@@ -3056,7 +2999,7 @@
               <a:buAutoNum type="alphaUcPeriod"/>
             </a:pPr>
             <a:r>
-              <a:rPr lang="en-US" sz="3000" strike="noStrike">
+              <a:rPr lang="en-AU" sz="3000" strike="noStrike">
                 <a:solidFill>
                   <a:srgbClr val="000000"/>
                 </a:solidFill>
@@ -3076,7 +3019,7 @@
               <a:buAutoNum type="alphaUcPeriod"/>
             </a:pPr>
             <a:r>
-              <a:rPr lang="en-US" sz="3000" strike="noStrike">
+              <a:rPr lang="en-AU" sz="3000" strike="noStrike">
                 <a:solidFill>
                   <a:srgbClr val="000000"/>
                 </a:solidFill>
@@ -3096,7 +3039,7 @@
               <a:buAutoNum type="alphaUcPeriod"/>
             </a:pPr>
             <a:r>
-              <a:rPr lang="en-US" sz="3000" strike="noStrike">
+              <a:rPr lang="en-AU" sz="3000" strike="noStrike">
                 <a:solidFill>
                   <a:srgbClr val="000000"/>
                 </a:solidFill>
@@ -3116,7 +3059,7 @@
               <a:buAutoNum type="alphaUcPeriod"/>
             </a:pPr>
             <a:r>
-              <a:rPr lang="en-US" sz="3000" strike="noStrike">
+              <a:rPr lang="en-AU" sz="3000" strike="noStrike">
                 <a:solidFill>
                   <a:srgbClr val="000000"/>
                 </a:solidFill>
@@ -3126,7 +3069,7 @@
               <a:t>Nothing. It’s currently </a:t>
             </a:r>
             <a:r>
-              <a:rPr b="1" lang="en-US" sz="3000" strike="noStrike">
+              <a:rPr b="1" lang="en-AU" sz="3000" strike="noStrike">
                 <a:solidFill>
                   <a:srgbClr val="000000"/>
                 </a:solidFill>
@@ -3190,14 +3133,14 @@
       </p:grpSpPr>
       <p:sp>
         <p:nvSpPr>
-          <p:cNvPr id="79" name="TextShape 1"/>
-          <p:cNvSpPr txBox="1"/>
+          <p:cNvPr id="76" name="CustomShape 1"/>
+          <p:cNvSpPr/>
           <p:nvPr/>
         </p:nvSpPr>
         <p:spPr>
           <a:xfrm>
             <a:off x="457200" y="205920"/>
-            <a:ext cx="8229240" cy="857160"/>
+            <a:ext cx="8228520" cy="856440"/>
           </a:xfrm>
           <a:prstGeom prst="rect">
             <a:avLst/>
@@ -3207,8 +3150,14 @@
             <a:noFill/>
           </a:ln>
         </p:spPr>
-        <p:txBody>
-          <a:bodyPr tIns="91440" bIns="91440" anchor="b"/>
+        <p:style>
+          <a:lnRef idx="0"/>
+          <a:fillRef idx="0"/>
+          <a:effectRef idx="0"/>
+          <a:fontRef idx="minor"/>
+        </p:style>
+        <p:txBody>
+          <a:bodyPr lIns="90000" rIns="90000" tIns="91440" bIns="91440" anchor="b"/>
           <a:p>
             <a:pPr>
               <a:lnSpc>
@@ -3216,7 +3165,7 @@
               </a:lnSpc>
             </a:pPr>
             <a:r>
-              <a:rPr b="1" lang="en-US" sz="3600" strike="noStrike">
+              <a:rPr b="1" lang="en-AU" sz="3600" strike="noStrike">
                 <a:solidFill>
                   <a:srgbClr val="000000"/>
                 </a:solidFill>
@@ -3231,14 +3180,14 @@
       </p:sp>
       <p:sp>
         <p:nvSpPr>
-          <p:cNvPr id="80" name="TextShape 2"/>
-          <p:cNvSpPr txBox="1"/>
+          <p:cNvPr id="77" name="CustomShape 2"/>
+          <p:cNvSpPr/>
           <p:nvPr/>
         </p:nvSpPr>
         <p:spPr>
           <a:xfrm>
             <a:off x="457200" y="1200240"/>
-            <a:ext cx="8229240" cy="3725280"/>
+            <a:ext cx="8228520" cy="3724560"/>
           </a:xfrm>
           <a:prstGeom prst="rect">
             <a:avLst/>
@@ -3248,8 +3197,14 @@
             <a:noFill/>
           </a:ln>
         </p:spPr>
-        <p:txBody>
-          <a:bodyPr tIns="91440" bIns="91440"/>
+        <p:style>
+          <a:lnRef idx="0"/>
+          <a:fillRef idx="0"/>
+          <a:effectRef idx="0"/>
+          <a:fontRef idx="minor"/>
+        </p:style>
+        <p:txBody>
+          <a:bodyPr lIns="90000" rIns="90000" tIns="91440" bIns="91440"/>
           <a:p>
             <a:pPr>
               <a:lnSpc>
@@ -3257,7 +3212,7 @@
               </a:lnSpc>
             </a:pPr>
             <a:r>
-              <a:rPr lang="en-US" sz="3000" strike="noStrike">
+              <a:rPr lang="en-AU" sz="3000" strike="noStrike">
                 <a:solidFill>
                   <a:srgbClr val="000000"/>
                 </a:solidFill>
@@ -3283,7 +3238,7 @@
               </a:lnSpc>
             </a:pPr>
             <a:r>
-              <a:rPr b="1" lang="en-US" sz="3600" strike="noStrike" u="sng">
+              <a:rPr b="1" lang="en-AU" sz="3600" strike="noStrike" u="sng">
                 <a:solidFill>
                   <a:srgbClr val="1155cc"/>
                 </a:solidFill>
@@ -3309,7 +3264,7 @@
               </a:lnSpc>
             </a:pPr>
             <a:r>
-              <a:rPr b="1" lang="en-US" sz="3600" strike="noStrike">
+              <a:rPr b="1" lang="en-AU" sz="3600" strike="noStrike">
                 <a:solidFill>
                   <a:srgbClr val="000000"/>
                 </a:solidFill>
@@ -3373,14 +3328,14 @@
       </p:grpSpPr>
       <p:sp>
         <p:nvSpPr>
-          <p:cNvPr id="81" name="TextShape 1"/>
-          <p:cNvSpPr txBox="1"/>
+          <p:cNvPr id="78" name="CustomShape 1"/>
+          <p:cNvSpPr/>
           <p:nvPr/>
         </p:nvSpPr>
         <p:spPr>
           <a:xfrm>
             <a:off x="457200" y="205920"/>
-            <a:ext cx="8229240" cy="857160"/>
+            <a:ext cx="8228520" cy="856440"/>
           </a:xfrm>
           <a:prstGeom prst="rect">
             <a:avLst/>
@@ -3390,8 +3345,14 @@
             <a:noFill/>
           </a:ln>
         </p:spPr>
-        <p:txBody>
-          <a:bodyPr tIns="91440" bIns="91440" anchor="b"/>
+        <p:style>
+          <a:lnRef idx="0"/>
+          <a:fillRef idx="0"/>
+          <a:effectRef idx="0"/>
+          <a:fontRef idx="minor"/>
+        </p:style>
+        <p:txBody>
+          <a:bodyPr lIns="90000" rIns="90000" tIns="91440" bIns="91440" anchor="b"/>
           <a:p>
             <a:pPr>
               <a:lnSpc>
@@ -3399,7 +3360,7 @@
               </a:lnSpc>
             </a:pPr>
             <a:r>
-              <a:rPr b="1" lang="en-US" sz="3600" strike="noStrike">
+              <a:rPr b="1" lang="en-AU" sz="3600" strike="noStrike">
                 <a:solidFill>
                   <a:srgbClr val="000000"/>
                 </a:solidFill>
@@ -3414,14 +3375,14 @@
       </p:sp>
       <p:sp>
         <p:nvSpPr>
-          <p:cNvPr id="82" name="TextShape 2"/>
-          <p:cNvSpPr txBox="1"/>
+          <p:cNvPr id="79" name="CustomShape 2"/>
+          <p:cNvSpPr/>
           <p:nvPr/>
         </p:nvSpPr>
         <p:spPr>
           <a:xfrm>
             <a:off x="457200" y="1200240"/>
-            <a:ext cx="8229240" cy="3725280"/>
+            <a:ext cx="8228520" cy="3724560"/>
           </a:xfrm>
           <a:prstGeom prst="rect">
             <a:avLst/>
@@ -3431,8 +3392,14 @@
             <a:noFill/>
           </a:ln>
         </p:spPr>
-        <p:txBody>
-          <a:bodyPr tIns="91440" bIns="91440"/>
+        <p:style>
+          <a:lnRef idx="0"/>
+          <a:fillRef idx="0"/>
+          <a:effectRef idx="0"/>
+          <a:fontRef idx="minor"/>
+        </p:style>
+        <p:txBody>
+          <a:bodyPr lIns="90000" rIns="90000" tIns="91440" bIns="91440"/>
           <a:p>
             <a:pPr>
               <a:lnSpc>
@@ -3440,7 +3407,7 @@
               </a:lnSpc>
             </a:pPr>
             <a:r>
-              <a:rPr lang="en-US" sz="3000" strike="noStrike">
+              <a:rPr lang="en-AU" sz="3000" strike="noStrike">
                 <a:solidFill>
                   <a:srgbClr val="000000"/>
                 </a:solidFill>
@@ -3460,7 +3427,7 @@
               <a:buAutoNum type="alphaUcPeriod"/>
             </a:pPr>
             <a:r>
-              <a:rPr lang="en-US" sz="3000" strike="noStrike" u="sng">
+              <a:rPr lang="en-AU" sz="3000" strike="noStrike" u="sng">
                 <a:solidFill>
                   <a:srgbClr val="1155cc"/>
                 </a:solidFill>
@@ -3480,7 +3447,7 @@
               <a:buAutoNum type="alphaUcPeriod"/>
             </a:pPr>
             <a:r>
-              <a:rPr lang="en-US" sz="3000" strike="noStrike" u="sng">
+              <a:rPr lang="en-AU" sz="3000" strike="noStrike" u="sng">
                 <a:solidFill>
                   <a:srgbClr val="1155cc"/>
                 </a:solidFill>
@@ -3500,7 +3467,7 @@
               <a:buAutoNum type="alphaUcPeriod"/>
             </a:pPr>
             <a:r>
-              <a:rPr lang="en-US" sz="3000" strike="noStrike" u="sng">
+              <a:rPr lang="en-AU" sz="3000" strike="noStrike" u="sng">
                 <a:solidFill>
                   <a:srgbClr val="1155cc"/>
                 </a:solidFill>
@@ -3510,7 +3477,7 @@
               <a:t>do_not_reply@rc.nectar.org.au</a:t>
             </a:r>
             <a:r>
-              <a:rPr lang="en-US" sz="3000" strike="noStrike">
+              <a:rPr lang="en-AU" sz="3000" strike="noStrike">
                 <a:solidFill>
                   <a:srgbClr val="000000"/>
                 </a:solidFill>
@@ -3530,7 +3497,7 @@
               <a:buAutoNum type="alphaUcPeriod"/>
             </a:pPr>
             <a:r>
-              <a:rPr lang="en-US" sz="3000" strike="noStrike" u="sng">
+              <a:rPr lang="en-AU" sz="3000" strike="noStrike" u="sng">
                 <a:solidFill>
                   <a:srgbClr val="1155cc"/>
                 </a:solidFill>
@@ -3540,7 +3507,7 @@
               <a:t>the_big_boss@rc.nectar.org.au</a:t>
             </a:r>
             <a:r>
-              <a:rPr lang="en-US" sz="3000" strike="noStrike">
+              <a:rPr lang="en-AU" sz="3000" strike="noStrike">
                 <a:solidFill>
                   <a:srgbClr val="000000"/>
                 </a:solidFill>
@@ -3604,14 +3571,14 @@
       </p:grpSpPr>
       <p:sp>
         <p:nvSpPr>
-          <p:cNvPr id="83" name="TextShape 1"/>
-          <p:cNvSpPr txBox="1"/>
+          <p:cNvPr id="80" name="CustomShape 1"/>
+          <p:cNvSpPr/>
           <p:nvPr/>
         </p:nvSpPr>
         <p:spPr>
           <a:xfrm>
             <a:off x="457200" y="205920"/>
-            <a:ext cx="8229240" cy="857160"/>
+            <a:ext cx="8228520" cy="856440"/>
           </a:xfrm>
           <a:prstGeom prst="rect">
             <a:avLst/>
@@ -3621,8 +3588,14 @@
             <a:noFill/>
           </a:ln>
         </p:spPr>
-        <p:txBody>
-          <a:bodyPr tIns="91440" bIns="91440" anchor="b"/>
+        <p:style>
+          <a:lnRef idx="0"/>
+          <a:fillRef idx="0"/>
+          <a:effectRef idx="0"/>
+          <a:fontRef idx="minor"/>
+        </p:style>
+        <p:txBody>
+          <a:bodyPr lIns="90000" rIns="90000" tIns="91440" bIns="91440" anchor="b"/>
           <a:p>
             <a:pPr>
               <a:lnSpc>
@@ -3630,7 +3603,7 @@
               </a:lnSpc>
             </a:pPr>
             <a:r>
-              <a:rPr b="1" lang="en-US" sz="3600" strike="noStrike">
+              <a:rPr b="1" lang="en-AU" sz="3600" strike="noStrike">
                 <a:solidFill>
                   <a:srgbClr val="000000"/>
                 </a:solidFill>
@@ -3645,14 +3618,14 @@
       </p:sp>
       <p:sp>
         <p:nvSpPr>
-          <p:cNvPr id="84" name="TextShape 2"/>
-          <p:cNvSpPr txBox="1"/>
+          <p:cNvPr id="81" name="CustomShape 2"/>
+          <p:cNvSpPr/>
           <p:nvPr/>
         </p:nvSpPr>
         <p:spPr>
           <a:xfrm>
             <a:off x="457200" y="1200240"/>
-            <a:ext cx="8229240" cy="3725280"/>
+            <a:ext cx="8228520" cy="3724560"/>
           </a:xfrm>
           <a:prstGeom prst="rect">
             <a:avLst/>
@@ -3662,8 +3635,14 @@
             <a:noFill/>
           </a:ln>
         </p:spPr>
-        <p:txBody>
-          <a:bodyPr tIns="91440" bIns="91440"/>
+        <p:style>
+          <a:lnRef idx="0"/>
+          <a:fillRef idx="0"/>
+          <a:effectRef idx="0"/>
+          <a:fontRef idx="minor"/>
+        </p:style>
+        <p:txBody>
+          <a:bodyPr lIns="90000" rIns="90000" tIns="91440" bIns="91440"/>
           <a:p>
             <a:pPr>
               <a:lnSpc>
@@ -3671,7 +3650,7 @@
               </a:lnSpc>
             </a:pPr>
             <a:r>
-              <a:rPr lang="en-US" sz="3000" strike="noStrike">
+              <a:rPr lang="en-AU" sz="3000" strike="noStrike">
                 <a:solidFill>
                   <a:srgbClr val="000000"/>
                 </a:solidFill>
@@ -3691,14 +3670,14 @@
               <a:buAutoNum type="alphaUcPeriod"/>
             </a:pPr>
             <a:r>
-              <a:rPr lang="en-US" sz="3000" strike="noStrike">
+              <a:rPr lang="en-AU" sz="3000" strike="noStrike">
                 <a:solidFill>
                   <a:srgbClr val="000000"/>
                 </a:solidFill>
                 <a:latin typeface="Arial"/>
                 <a:ea typeface="Arial"/>
               </a:rPr>
-              <a:t>Change your password</a:t>
+              <a:t>Change your command line password</a:t>
             </a:r>
             <a:endParaRPr/>
           </a:p>
@@ -3711,7 +3690,7 @@
               <a:buAutoNum type="alphaUcPeriod"/>
             </a:pPr>
             <a:r>
-              <a:rPr lang="en-US" sz="3000" strike="noStrike">
+              <a:rPr lang="en-AU" sz="3000" strike="noStrike">
                 <a:solidFill>
                   <a:srgbClr val="000000"/>
                 </a:solidFill>
@@ -3731,7 +3710,7 @@
               <a:buAutoNum type="alphaUcPeriod"/>
             </a:pPr>
             <a:r>
-              <a:rPr lang="en-US" sz="3000" strike="noStrike">
+              <a:rPr lang="en-AU" sz="3000" strike="noStrike">
                 <a:solidFill>
                   <a:srgbClr val="000000"/>
                 </a:solidFill>
@@ -3751,7 +3730,7 @@
               <a:buAutoNum type="alphaUcPeriod"/>
             </a:pPr>
             <a:r>
-              <a:rPr lang="en-US" sz="3000" strike="noStrike">
+              <a:rPr lang="en-AU" sz="3000" strike="noStrike">
                 <a:solidFill>
                   <a:srgbClr val="000000"/>
                 </a:solidFill>
@@ -3771,7 +3750,7 @@
               <a:buAutoNum type="alphaUcPeriod"/>
             </a:pPr>
             <a:r>
-              <a:rPr lang="en-US" sz="3000" strike="noStrike">
+              <a:rPr lang="en-AU" sz="3000" strike="noStrike">
                 <a:solidFill>
                   <a:srgbClr val="000000"/>
                 </a:solidFill>
@@ -3791,7 +3770,7 @@
               <a:buAutoNum type="alphaUcPeriod"/>
             </a:pPr>
             <a:r>
-              <a:rPr lang="en-US" sz="3000" strike="noStrike">
+              <a:rPr lang="en-AU" sz="3000" strike="noStrike">
                 <a:solidFill>
                   <a:srgbClr val="000000"/>
                 </a:solidFill>
@@ -3855,14 +3834,14 @@
       </p:grpSpPr>
       <p:sp>
         <p:nvSpPr>
-          <p:cNvPr id="85" name="TextShape 1"/>
-          <p:cNvSpPr txBox="1"/>
+          <p:cNvPr id="82" name="CustomShape 1"/>
+          <p:cNvSpPr/>
           <p:nvPr/>
         </p:nvSpPr>
         <p:spPr>
           <a:xfrm>
             <a:off x="457200" y="205920"/>
-            <a:ext cx="8229240" cy="857160"/>
+            <a:ext cx="8228520" cy="856440"/>
           </a:xfrm>
           <a:prstGeom prst="rect">
             <a:avLst/>
@@ -3872,8 +3851,14 @@
             <a:noFill/>
           </a:ln>
         </p:spPr>
-        <p:txBody>
-          <a:bodyPr tIns="91440" bIns="91440" anchor="b"/>
+        <p:style>
+          <a:lnRef idx="0"/>
+          <a:fillRef idx="0"/>
+          <a:effectRef idx="0"/>
+          <a:fontRef idx="minor"/>
+        </p:style>
+        <p:txBody>
+          <a:bodyPr lIns="90000" rIns="90000" tIns="91440" bIns="91440" anchor="b"/>
           <a:p>
             <a:pPr>
               <a:lnSpc>
@@ -3881,7 +3866,7 @@
               </a:lnSpc>
             </a:pPr>
             <a:r>
-              <a:rPr b="1" lang="en-US" sz="3600" strike="noStrike">
+              <a:rPr b="1" lang="en-AU" sz="3600" strike="noStrike">
                 <a:solidFill>
                   <a:srgbClr val="000000"/>
                 </a:solidFill>
@@ -3896,14 +3881,14 @@
       </p:sp>
       <p:sp>
         <p:nvSpPr>
-          <p:cNvPr id="86" name="TextShape 2"/>
-          <p:cNvSpPr txBox="1"/>
+          <p:cNvPr id="83" name="CustomShape 2"/>
+          <p:cNvSpPr/>
           <p:nvPr/>
         </p:nvSpPr>
         <p:spPr>
           <a:xfrm>
             <a:off x="457200" y="1200240"/>
-            <a:ext cx="8229240" cy="3725280"/>
+            <a:ext cx="8228520" cy="3724560"/>
           </a:xfrm>
           <a:prstGeom prst="rect">
             <a:avLst/>
@@ -3913,8 +3898,14 @@
             <a:noFill/>
           </a:ln>
         </p:spPr>
-        <p:txBody>
-          <a:bodyPr tIns="91440" bIns="91440"/>
+        <p:style>
+          <a:lnRef idx="0"/>
+          <a:fillRef idx="0"/>
+          <a:effectRef idx="0"/>
+          <a:fontRef idx="minor"/>
+        </p:style>
+        <p:txBody>
+          <a:bodyPr lIns="90000" rIns="90000" tIns="91440" bIns="91440"/>
           <a:p>
             <a:pPr>
               <a:lnSpc>
@@ -3922,7 +3913,7 @@
               </a:lnSpc>
             </a:pPr>
             <a:r>
-              <a:rPr lang="en-US" sz="3000" strike="noStrike">
+              <a:rPr lang="en-AU" sz="3000" strike="noStrike">
                 <a:solidFill>
                   <a:srgbClr val="000000"/>
                 </a:solidFill>
@@ -3940,7 +3931,7 @@
               </a:lnSpc>
             </a:pPr>
             <a:r>
-              <a:rPr b="1" lang="en-US" sz="3000" strike="noStrike">
+              <a:rPr b="1" lang="en-AU" sz="3000" strike="noStrike">
                 <a:solidFill>
                   <a:srgbClr val="000000"/>
                 </a:solidFill>
@@ -3958,7 +3949,7 @@
               </a:lnSpc>
             </a:pPr>
             <a:r>
-              <a:rPr lang="en-US" sz="3000" strike="noStrike">
+              <a:rPr lang="en-AU" sz="3000" strike="noStrike">
                 <a:solidFill>
                   <a:srgbClr val="000000"/>
                 </a:solidFill>
@@ -3976,7 +3967,7 @@
               </a:lnSpc>
             </a:pPr>
             <a:r>
-              <a:rPr lang="en-US" sz="3000" strike="noStrike">
+              <a:rPr lang="en-AU" sz="3000" strike="noStrike">
                 <a:solidFill>
                   <a:srgbClr val="000000"/>
                 </a:solidFill>
@@ -3994,7 +3985,7 @@
               </a:lnSpc>
             </a:pPr>
             <a:r>
-              <a:rPr b="1" lang="en-US" sz="3000" strike="noStrike">
+              <a:rPr b="1" lang="en-AU" sz="3000" strike="noStrike">
                 <a:solidFill>
                   <a:srgbClr val="000000"/>
                 </a:solidFill>
@@ -4004,7 +3995,7 @@
               <a:t>Challenge:</a:t>
             </a:r>
             <a:r>
-              <a:rPr lang="en-US" sz="3000" strike="noStrike">
+              <a:rPr lang="en-AU" sz="3000" strike="noStrike">
                 <a:solidFill>
                   <a:srgbClr val="000000"/>
                 </a:solidFill>
@@ -4022,7 +4013,7 @@
               </a:lnSpc>
             </a:pPr>
             <a:r>
-              <a:rPr lang="en-US" sz="3000" strike="noStrike">
+              <a:rPr lang="en-AU" sz="3000" strike="noStrike">
                 <a:solidFill>
                   <a:srgbClr val="000000"/>
                 </a:solidFill>
@@ -4086,14 +4077,14 @@
       </p:grpSpPr>
       <p:sp>
         <p:nvSpPr>
-          <p:cNvPr id="87" name="TextShape 1"/>
-          <p:cNvSpPr txBox="1"/>
+          <p:cNvPr id="84" name="CustomShape 1"/>
+          <p:cNvSpPr/>
           <p:nvPr/>
         </p:nvSpPr>
         <p:spPr>
           <a:xfrm>
             <a:off x="457200" y="205920"/>
-            <a:ext cx="8229240" cy="857160"/>
+            <a:ext cx="8228520" cy="856440"/>
           </a:xfrm>
           <a:prstGeom prst="rect">
             <a:avLst/>
@@ -4103,8 +4094,14 @@
             <a:noFill/>
           </a:ln>
         </p:spPr>
-        <p:txBody>
-          <a:bodyPr tIns="91440" bIns="91440" anchor="b"/>
+        <p:style>
+          <a:lnRef idx="0"/>
+          <a:fillRef idx="0"/>
+          <a:effectRef idx="0"/>
+          <a:fontRef idx="minor"/>
+        </p:style>
+        <p:txBody>
+          <a:bodyPr lIns="90000" rIns="90000" tIns="91440" bIns="91440" anchor="b"/>
           <a:p>
             <a:pPr>
               <a:lnSpc>
@@ -4112,7 +4109,7 @@
               </a:lnSpc>
             </a:pPr>
             <a:r>
-              <a:rPr b="1" lang="en-US" sz="3600" strike="noStrike">
+              <a:rPr b="1" lang="en-AU" sz="3600" strike="noStrike">
                 <a:solidFill>
                   <a:srgbClr val="000000"/>
                 </a:solidFill>
@@ -4127,14 +4124,14 @@
       </p:sp>
       <p:sp>
         <p:nvSpPr>
-          <p:cNvPr id="88" name="TextShape 2"/>
-          <p:cNvSpPr txBox="1"/>
+          <p:cNvPr id="85" name="CustomShape 2"/>
+          <p:cNvSpPr/>
           <p:nvPr/>
         </p:nvSpPr>
         <p:spPr>
           <a:xfrm>
             <a:off x="457200" y="1200240"/>
-            <a:ext cx="8229240" cy="3725280"/>
+            <a:ext cx="8228520" cy="3724560"/>
           </a:xfrm>
           <a:prstGeom prst="rect">
             <a:avLst/>
@@ -4144,8 +4141,14 @@
             <a:noFill/>
           </a:ln>
         </p:spPr>
-        <p:txBody>
-          <a:bodyPr tIns="91440" bIns="91440"/>
+        <p:style>
+          <a:lnRef idx="0"/>
+          <a:fillRef idx="0"/>
+          <a:effectRef idx="0"/>
+          <a:fontRef idx="minor"/>
+        </p:style>
+        <p:txBody>
+          <a:bodyPr lIns="90000" rIns="90000" tIns="91440" bIns="91440"/>
           <a:p>
             <a:pPr>
               <a:lnSpc>
@@ -4153,7 +4156,7 @@
               </a:lnSpc>
             </a:pPr>
             <a:r>
-              <a:rPr lang="en-US" sz="3000" strike="noStrike">
+              <a:rPr lang="en-AU" sz="3000" strike="noStrike">
                 <a:solidFill>
                   <a:srgbClr val="000000"/>
                 </a:solidFill>
@@ -4173,7 +4176,7 @@
               <a:buAutoNum type="alphaUcPeriod"/>
             </a:pPr>
             <a:r>
-              <a:rPr lang="en-US" sz="3000" strike="noStrike">
+              <a:rPr lang="en-AU" sz="3000" strike="noStrike">
                 <a:solidFill>
                   <a:srgbClr val="000000"/>
                 </a:solidFill>
@@ -4193,7 +4196,7 @@
               <a:buAutoNum type="alphaUcPeriod"/>
             </a:pPr>
             <a:r>
-              <a:rPr lang="en-US" sz="3000" strike="noStrike">
+              <a:rPr lang="en-AU" sz="3000" strike="noStrike">
                 <a:solidFill>
                   <a:srgbClr val="000000"/>
                 </a:solidFill>
@@ -4213,7 +4216,7 @@
               <a:buAutoNum type="alphaUcPeriod"/>
             </a:pPr>
             <a:r>
-              <a:rPr lang="en-US" sz="3000" strike="noStrike">
+              <a:rPr lang="en-AU" sz="3000" strike="noStrike">
                 <a:solidFill>
                   <a:srgbClr val="000000"/>
                 </a:solidFill>
@@ -4233,7 +4236,7 @@
               <a:buAutoNum type="alphaUcPeriod"/>
             </a:pPr>
             <a:r>
-              <a:rPr lang="en-US" sz="3000" strike="noStrike">
+              <a:rPr lang="en-AU" sz="3000" strike="noStrike">
                 <a:solidFill>
                   <a:srgbClr val="000000"/>
                 </a:solidFill>
@@ -4297,14 +4300,14 @@
       </p:grpSpPr>
       <p:sp>
         <p:nvSpPr>
-          <p:cNvPr id="89" name="TextShape 1"/>
-          <p:cNvSpPr txBox="1"/>
+          <p:cNvPr id="86" name="CustomShape 1"/>
+          <p:cNvSpPr/>
           <p:nvPr/>
         </p:nvSpPr>
         <p:spPr>
           <a:xfrm>
             <a:off x="457200" y="205920"/>
-            <a:ext cx="8229240" cy="857160"/>
+            <a:ext cx="8228520" cy="856440"/>
           </a:xfrm>
           <a:prstGeom prst="rect">
             <a:avLst/>
@@ -4314,8 +4317,14 @@
             <a:noFill/>
           </a:ln>
         </p:spPr>
-        <p:txBody>
-          <a:bodyPr tIns="91440" bIns="91440" anchor="b"/>
+        <p:style>
+          <a:lnRef idx="0"/>
+          <a:fillRef idx="0"/>
+          <a:effectRef idx="0"/>
+          <a:fontRef idx="minor"/>
+        </p:style>
+        <p:txBody>
+          <a:bodyPr lIns="90000" rIns="90000" tIns="91440" bIns="91440" anchor="b"/>
           <a:p>
             <a:pPr>
               <a:lnSpc>
@@ -4323,7 +4332,7 @@
               </a:lnSpc>
             </a:pPr>
             <a:r>
-              <a:rPr b="1" lang="en-US" sz="3600" strike="noStrike">
+              <a:rPr b="1" lang="en-AU" sz="3600" strike="noStrike">
                 <a:solidFill>
                   <a:srgbClr val="000000"/>
                 </a:solidFill>
@@ -4338,14 +4347,14 @@
       </p:sp>
       <p:sp>
         <p:nvSpPr>
-          <p:cNvPr id="90" name="TextShape 2"/>
-          <p:cNvSpPr txBox="1"/>
+          <p:cNvPr id="87" name="CustomShape 2"/>
+          <p:cNvSpPr/>
           <p:nvPr/>
         </p:nvSpPr>
         <p:spPr>
           <a:xfrm>
             <a:off x="457200" y="1200240"/>
-            <a:ext cx="8229240" cy="3725280"/>
+            <a:ext cx="8228520" cy="3724560"/>
           </a:xfrm>
           <a:prstGeom prst="rect">
             <a:avLst/>
@@ -4355,8 +4364,14 @@
             <a:noFill/>
           </a:ln>
         </p:spPr>
-        <p:txBody>
-          <a:bodyPr tIns="91440" bIns="91440"/>
+        <p:style>
+          <a:lnRef idx="0"/>
+          <a:fillRef idx="0"/>
+          <a:effectRef idx="0"/>
+          <a:fontRef idx="minor"/>
+        </p:style>
+        <p:txBody>
+          <a:bodyPr lIns="90000" rIns="90000" tIns="91440" bIns="91440"/>
           <a:p>
             <a:pPr>
               <a:lnSpc>
@@ -4364,7 +4379,7 @@
               </a:lnSpc>
             </a:pPr>
             <a:r>
-              <a:rPr lang="en-US" sz="3000" strike="noStrike">
+              <a:rPr lang="en-AU" sz="3000" strike="noStrike">
                 <a:solidFill>
                   <a:srgbClr val="000000"/>
                 </a:solidFill>
@@ -4384,7 +4399,7 @@
               <a:buAutoNum type="alphaUcPeriod"/>
             </a:pPr>
             <a:r>
-              <a:rPr lang="en-US" sz="3000" strike="noStrike">
+              <a:rPr lang="en-AU" sz="3000" strike="noStrike">
                 <a:solidFill>
                   <a:srgbClr val="000000"/>
                 </a:solidFill>
@@ -4404,7 +4419,7 @@
               <a:buAutoNum type="alphaUcPeriod"/>
             </a:pPr>
             <a:r>
-              <a:rPr lang="en-US" sz="3000" strike="noStrike">
+              <a:rPr lang="en-AU" sz="3000" strike="noStrike">
                 <a:solidFill>
                   <a:srgbClr val="000000"/>
                 </a:solidFill>
@@ -4424,7 +4439,7 @@
               <a:buAutoNum type="alphaUcPeriod"/>
             </a:pPr>
             <a:r>
-              <a:rPr lang="en-US" sz="3000" strike="noStrike">
+              <a:rPr lang="en-AU" sz="3000" strike="noStrike">
                 <a:solidFill>
                   <a:srgbClr val="000000"/>
                 </a:solidFill>
@@ -4444,7 +4459,7 @@
               <a:buAutoNum type="alphaUcPeriod"/>
             </a:pPr>
             <a:r>
-              <a:rPr lang="en-US" sz="3000" strike="noStrike">
+              <a:rPr lang="en-AU" sz="3000" strike="noStrike">
                 <a:solidFill>
                   <a:srgbClr val="000000"/>
                 </a:solidFill>
@@ -4464,7 +4479,7 @@
               <a:buAutoNum type="alphaUcPeriod"/>
             </a:pPr>
             <a:r>
-              <a:rPr lang="en-US" sz="3000" strike="noStrike">
+              <a:rPr lang="en-AU" sz="3000" strike="noStrike">
                 <a:solidFill>
                   <a:srgbClr val="000000"/>
                 </a:solidFill>

</xml_diff>

<commit_message>
Added more information on "train the trainer" and rejigged the first two lessons slightly.
</commit_message>
<xml_diff>
--- a/Lessons/Lesson_I/Lesson_I_Questions.pptx
+++ b/Lessons/Lesson_I/Lesson_I_Questions.pptx
@@ -4,15 +4,17 @@
   <p:sldMasterIdLst>
     <p:sldMasterId id="2147483648" r:id="rId2"/>
     <p:sldMasterId id="2147483661" r:id="rId3"/>
+    <p:sldMasterId id="2147483674" r:id="rId4"/>
   </p:sldMasterIdLst>
   <p:sldIdLst>
-    <p:sldId id="256" r:id="rId4"/>
-    <p:sldId id="257" r:id="rId5"/>
-    <p:sldId id="258" r:id="rId6"/>
-    <p:sldId id="259" r:id="rId7"/>
-    <p:sldId id="260" r:id="rId8"/>
-    <p:sldId id="261" r:id="rId9"/>
-    <p:sldId id="262" r:id="rId10"/>
+    <p:sldId id="256" r:id="rId5"/>
+    <p:sldId id="257" r:id="rId6"/>
+    <p:sldId id="258" r:id="rId7"/>
+    <p:sldId id="259" r:id="rId8"/>
+    <p:sldId id="260" r:id="rId9"/>
+    <p:sldId id="261" r:id="rId10"/>
+    <p:sldId id="262" r:id="rId11"/>
+    <p:sldId id="263" r:id="rId12"/>
   </p:sldIdLst>
   <p:sldSz cx="9144000" cy="5143500"/>
   <p:notesSz cx="7559675" cy="10691812"/>
@@ -70,8 +72,8 @@
         </p:nvSpPr>
         <p:spPr>
           <a:xfrm>
-            <a:off x="457200" y="205200"/>
-            <a:ext cx="8229240" cy="858600"/>
+            <a:off x="457200" y="205920"/>
+            <a:ext cx="8228880" cy="856440"/>
           </a:xfrm>
           <a:prstGeom prst="rect">
             <a:avLst/>
@@ -97,8 +99,8 @@
         </p:nvSpPr>
         <p:spPr>
           <a:xfrm>
-            <a:off x="457200" y="1203480"/>
-            <a:ext cx="8229240" cy="1422720"/>
+            <a:off x="457200" y="1200240"/>
+            <a:ext cx="8228880" cy="1776600"/>
           </a:xfrm>
           <a:prstGeom prst="rect">
             <a:avLst/>
@@ -123,8 +125,8 @@
         </p:nvSpPr>
         <p:spPr>
           <a:xfrm>
-            <a:off x="457200" y="2761920"/>
-            <a:ext cx="8229240" cy="1422720"/>
+            <a:off x="457200" y="3146040"/>
+            <a:ext cx="8228880" cy="1776600"/>
           </a:xfrm>
           <a:prstGeom prst="rect">
             <a:avLst/>
@@ -171,8 +173,8 @@
         </p:nvSpPr>
         <p:spPr>
           <a:xfrm>
-            <a:off x="457200" y="205200"/>
-            <a:ext cx="8229240" cy="858600"/>
+            <a:off x="457200" y="205920"/>
+            <a:ext cx="8228880" cy="856440"/>
           </a:xfrm>
           <a:prstGeom prst="rect">
             <a:avLst/>
@@ -198,8 +200,8 @@
         </p:nvSpPr>
         <p:spPr>
           <a:xfrm>
-            <a:off x="457200" y="1203480"/>
-            <a:ext cx="4015800" cy="1422720"/>
+            <a:off x="457200" y="1200240"/>
+            <a:ext cx="4015440" cy="1776600"/>
           </a:xfrm>
           <a:prstGeom prst="rect">
             <a:avLst/>
@@ -224,8 +226,8 @@
         </p:nvSpPr>
         <p:spPr>
           <a:xfrm>
-            <a:off x="4674240" y="1203480"/>
-            <a:ext cx="4015800" cy="1422720"/>
+            <a:off x="4673880" y="1200240"/>
+            <a:ext cx="4015440" cy="1776600"/>
           </a:xfrm>
           <a:prstGeom prst="rect">
             <a:avLst/>
@@ -250,8 +252,8 @@
         </p:nvSpPr>
         <p:spPr>
           <a:xfrm>
-            <a:off x="4674240" y="2761920"/>
-            <a:ext cx="4015800" cy="1422720"/>
+            <a:off x="4673880" y="3146040"/>
+            <a:ext cx="4015440" cy="1776600"/>
           </a:xfrm>
           <a:prstGeom prst="rect">
             <a:avLst/>
@@ -276,8 +278,8 @@
         </p:nvSpPr>
         <p:spPr>
           <a:xfrm>
-            <a:off x="457200" y="2761920"/>
-            <a:ext cx="4015800" cy="1422720"/>
+            <a:off x="457200" y="3146040"/>
+            <a:ext cx="4015440" cy="1776600"/>
           </a:xfrm>
           <a:prstGeom prst="rect">
             <a:avLst/>
@@ -324,8 +326,8 @@
         </p:nvSpPr>
         <p:spPr>
           <a:xfrm>
-            <a:off x="457200" y="205200"/>
-            <a:ext cx="8229240" cy="858600"/>
+            <a:off x="457200" y="205920"/>
+            <a:ext cx="8228880" cy="856440"/>
           </a:xfrm>
           <a:prstGeom prst="rect">
             <a:avLst/>
@@ -351,8 +353,8 @@
         </p:nvSpPr>
         <p:spPr>
           <a:xfrm>
-            <a:off x="457200" y="1203480"/>
-            <a:ext cx="8229240" cy="2982960"/>
+            <a:off x="457200" y="1200240"/>
+            <a:ext cx="8228880" cy="3724920"/>
           </a:xfrm>
           <a:prstGeom prst="rect">
             <a:avLst/>
@@ -377,8 +379,8 @@
         </p:nvSpPr>
         <p:spPr>
           <a:xfrm>
-            <a:off x="457200" y="1203480"/>
-            <a:ext cx="8229240" cy="2982960"/>
+            <a:off x="457200" y="1200240"/>
+            <a:ext cx="8228880" cy="3724920"/>
           </a:xfrm>
           <a:prstGeom prst="rect">
             <a:avLst/>
@@ -403,8 +405,8 @@
         </p:blipFill>
         <p:spPr>
           <a:xfrm>
-            <a:off x="2702160" y="1203480"/>
-            <a:ext cx="3738600" cy="2982960"/>
+            <a:off x="2237400" y="1199880"/>
+            <a:ext cx="4668480" cy="3724920"/>
           </a:xfrm>
           <a:prstGeom prst="rect">
             <a:avLst/>
@@ -426,8 +428,8 @@
         </p:blipFill>
         <p:spPr>
           <a:xfrm>
-            <a:off x="2702160" y="1203480"/>
-            <a:ext cx="3738600" cy="2982960"/>
+            <a:off x="2237400" y="1199880"/>
+            <a:ext cx="4668480" cy="3724920"/>
           </a:xfrm>
           <a:prstGeom prst="rect">
             <a:avLst/>
@@ -493,8 +495,8 @@
         </p:nvSpPr>
         <p:spPr>
           <a:xfrm>
-            <a:off x="457200" y="205200"/>
-            <a:ext cx="8229240" cy="858600"/>
+            <a:off x="457200" y="205920"/>
+            <a:ext cx="8228880" cy="856440"/>
           </a:xfrm>
           <a:prstGeom prst="rect">
             <a:avLst/>
@@ -520,8 +522,8 @@
         </p:nvSpPr>
         <p:spPr>
           <a:xfrm>
-            <a:off x="457200" y="1203480"/>
-            <a:ext cx="8229240" cy="2982960"/>
+            <a:off x="457200" y="1200240"/>
+            <a:ext cx="8228880" cy="3724920"/>
           </a:xfrm>
           <a:prstGeom prst="rect">
             <a:avLst/>
@@ -569,8 +571,8 @@
         </p:nvSpPr>
         <p:spPr>
           <a:xfrm>
-            <a:off x="457200" y="205200"/>
-            <a:ext cx="8229240" cy="858600"/>
+            <a:off x="457200" y="205920"/>
+            <a:ext cx="8228880" cy="856440"/>
           </a:xfrm>
           <a:prstGeom prst="rect">
             <a:avLst/>
@@ -596,8 +598,8 @@
         </p:nvSpPr>
         <p:spPr>
           <a:xfrm>
-            <a:off x="457200" y="1203480"/>
-            <a:ext cx="8229240" cy="2982960"/>
+            <a:off x="457200" y="1200240"/>
+            <a:ext cx="8228880" cy="3724920"/>
           </a:xfrm>
           <a:prstGeom prst="rect">
             <a:avLst/>
@@ -644,8 +646,8 @@
         </p:nvSpPr>
         <p:spPr>
           <a:xfrm>
-            <a:off x="457200" y="205200"/>
-            <a:ext cx="8229240" cy="858600"/>
+            <a:off x="457200" y="205920"/>
+            <a:ext cx="8228880" cy="856440"/>
           </a:xfrm>
           <a:prstGeom prst="rect">
             <a:avLst/>
@@ -671,8 +673,8 @@
         </p:nvSpPr>
         <p:spPr>
           <a:xfrm>
-            <a:off x="457200" y="1203480"/>
-            <a:ext cx="4015800" cy="2982960"/>
+            <a:off x="457200" y="1200240"/>
+            <a:ext cx="4015440" cy="3724920"/>
           </a:xfrm>
           <a:prstGeom prst="rect">
             <a:avLst/>
@@ -697,8 +699,8 @@
         </p:nvSpPr>
         <p:spPr>
           <a:xfrm>
-            <a:off x="4674240" y="1203480"/>
-            <a:ext cx="4015800" cy="2982960"/>
+            <a:off x="4673880" y="1200240"/>
+            <a:ext cx="4015440" cy="3724920"/>
           </a:xfrm>
           <a:prstGeom prst="rect">
             <a:avLst/>
@@ -745,8 +747,8 @@
         </p:nvSpPr>
         <p:spPr>
           <a:xfrm>
-            <a:off x="457200" y="205200"/>
-            <a:ext cx="8229240" cy="858600"/>
+            <a:off x="457200" y="205920"/>
+            <a:ext cx="8228880" cy="856440"/>
           </a:xfrm>
           <a:prstGeom prst="rect">
             <a:avLst/>
@@ -794,8 +796,8 @@
         </p:nvSpPr>
         <p:spPr>
           <a:xfrm>
-            <a:off x="457200" y="205200"/>
-            <a:ext cx="8229240" cy="3981240"/>
+            <a:off x="457200" y="205920"/>
+            <a:ext cx="8228880" cy="3971160"/>
           </a:xfrm>
           <a:prstGeom prst="rect">
             <a:avLst/>
@@ -843,8 +845,8 @@
         </p:nvSpPr>
         <p:spPr>
           <a:xfrm>
-            <a:off x="457200" y="205200"/>
-            <a:ext cx="8229240" cy="858600"/>
+            <a:off x="457200" y="205920"/>
+            <a:ext cx="8228880" cy="856440"/>
           </a:xfrm>
           <a:prstGeom prst="rect">
             <a:avLst/>
@@ -870,8 +872,8 @@
         </p:nvSpPr>
         <p:spPr>
           <a:xfrm>
-            <a:off x="457200" y="1203480"/>
-            <a:ext cx="4015800" cy="1422720"/>
+            <a:off x="457200" y="1200240"/>
+            <a:ext cx="4015440" cy="1776600"/>
           </a:xfrm>
           <a:prstGeom prst="rect">
             <a:avLst/>
@@ -896,8 +898,8 @@
         </p:nvSpPr>
         <p:spPr>
           <a:xfrm>
-            <a:off x="457200" y="2761920"/>
-            <a:ext cx="4015800" cy="1422720"/>
+            <a:off x="457200" y="3146040"/>
+            <a:ext cx="4015440" cy="1776600"/>
           </a:xfrm>
           <a:prstGeom prst="rect">
             <a:avLst/>
@@ -922,8 +924,8 @@
         </p:nvSpPr>
         <p:spPr>
           <a:xfrm>
-            <a:off x="4674240" y="1203480"/>
-            <a:ext cx="4015800" cy="2982960"/>
+            <a:off x="4673880" y="1200240"/>
+            <a:ext cx="4015440" cy="3724920"/>
           </a:xfrm>
           <a:prstGeom prst="rect">
             <a:avLst/>
@@ -970,8 +972,8 @@
         </p:nvSpPr>
         <p:spPr>
           <a:xfrm>
-            <a:off x="457200" y="205200"/>
-            <a:ext cx="8229240" cy="858600"/>
+            <a:off x="457200" y="205920"/>
+            <a:ext cx="8228880" cy="856440"/>
           </a:xfrm>
           <a:prstGeom prst="rect">
             <a:avLst/>
@@ -997,8 +999,8 @@
         </p:nvSpPr>
         <p:spPr>
           <a:xfrm>
-            <a:off x="457200" y="1203480"/>
-            <a:ext cx="8229240" cy="2982960"/>
+            <a:off x="457200" y="1200240"/>
+            <a:ext cx="8228880" cy="3724920"/>
           </a:xfrm>
           <a:prstGeom prst="rect">
             <a:avLst/>
@@ -1046,8 +1048,8 @@
         </p:nvSpPr>
         <p:spPr>
           <a:xfrm>
-            <a:off x="457200" y="205200"/>
-            <a:ext cx="8229240" cy="858600"/>
+            <a:off x="457200" y="205920"/>
+            <a:ext cx="8228880" cy="856440"/>
           </a:xfrm>
           <a:prstGeom prst="rect">
             <a:avLst/>
@@ -1073,8 +1075,8 @@
         </p:nvSpPr>
         <p:spPr>
           <a:xfrm>
-            <a:off x="457200" y="1203480"/>
-            <a:ext cx="4015800" cy="2982960"/>
+            <a:off x="457200" y="1200240"/>
+            <a:ext cx="4015440" cy="3724920"/>
           </a:xfrm>
           <a:prstGeom prst="rect">
             <a:avLst/>
@@ -1099,8 +1101,8 @@
         </p:nvSpPr>
         <p:spPr>
           <a:xfrm>
-            <a:off x="4674240" y="1203480"/>
-            <a:ext cx="4015800" cy="1422720"/>
+            <a:off x="4673880" y="1200240"/>
+            <a:ext cx="4015440" cy="1776600"/>
           </a:xfrm>
           <a:prstGeom prst="rect">
             <a:avLst/>
@@ -1125,8 +1127,8 @@
         </p:nvSpPr>
         <p:spPr>
           <a:xfrm>
-            <a:off x="4674240" y="2761920"/>
-            <a:ext cx="4015800" cy="1422720"/>
+            <a:off x="4673880" y="3146040"/>
+            <a:ext cx="4015440" cy="1776600"/>
           </a:xfrm>
           <a:prstGeom prst="rect">
             <a:avLst/>
@@ -1173,8 +1175,8 @@
         </p:nvSpPr>
         <p:spPr>
           <a:xfrm>
-            <a:off x="457200" y="205200"/>
-            <a:ext cx="8229240" cy="858600"/>
+            <a:off x="457200" y="205920"/>
+            <a:ext cx="8228880" cy="856440"/>
           </a:xfrm>
           <a:prstGeom prst="rect">
             <a:avLst/>
@@ -1200,8 +1202,8 @@
         </p:nvSpPr>
         <p:spPr>
           <a:xfrm>
-            <a:off x="457200" y="1203480"/>
-            <a:ext cx="4015800" cy="1422720"/>
+            <a:off x="457200" y="1200240"/>
+            <a:ext cx="4015440" cy="1776600"/>
           </a:xfrm>
           <a:prstGeom prst="rect">
             <a:avLst/>
@@ -1226,8 +1228,8 @@
         </p:nvSpPr>
         <p:spPr>
           <a:xfrm>
-            <a:off x="4674240" y="1203480"/>
-            <a:ext cx="4015800" cy="1422720"/>
+            <a:off x="4673880" y="1200240"/>
+            <a:ext cx="4015440" cy="1776600"/>
           </a:xfrm>
           <a:prstGeom prst="rect">
             <a:avLst/>
@@ -1252,8 +1254,8 @@
         </p:nvSpPr>
         <p:spPr>
           <a:xfrm>
-            <a:off x="457200" y="2761920"/>
-            <a:ext cx="8229240" cy="1422720"/>
+            <a:off x="457200" y="3146040"/>
+            <a:ext cx="8228880" cy="1776600"/>
           </a:xfrm>
           <a:prstGeom prst="rect">
             <a:avLst/>
@@ -1300,8 +1302,8 @@
         </p:nvSpPr>
         <p:spPr>
           <a:xfrm>
-            <a:off x="457200" y="205200"/>
-            <a:ext cx="8229240" cy="858600"/>
+            <a:off x="457200" y="205920"/>
+            <a:ext cx="8228880" cy="856440"/>
           </a:xfrm>
           <a:prstGeom prst="rect">
             <a:avLst/>
@@ -1327,8 +1329,8 @@
         </p:nvSpPr>
         <p:spPr>
           <a:xfrm>
-            <a:off x="457200" y="1203480"/>
-            <a:ext cx="8229240" cy="1422720"/>
+            <a:off x="457200" y="1200240"/>
+            <a:ext cx="8228880" cy="1776600"/>
           </a:xfrm>
           <a:prstGeom prst="rect">
             <a:avLst/>
@@ -1353,8 +1355,8 @@
         </p:nvSpPr>
         <p:spPr>
           <a:xfrm>
-            <a:off x="457200" y="2761920"/>
-            <a:ext cx="8229240" cy="1422720"/>
+            <a:off x="457200" y="3146040"/>
+            <a:ext cx="8228880" cy="1776600"/>
           </a:xfrm>
           <a:prstGeom prst="rect">
             <a:avLst/>
@@ -1401,8 +1403,8 @@
         </p:nvSpPr>
         <p:spPr>
           <a:xfrm>
-            <a:off x="457200" y="205200"/>
-            <a:ext cx="8229240" cy="858600"/>
+            <a:off x="457200" y="205920"/>
+            <a:ext cx="8228880" cy="856440"/>
           </a:xfrm>
           <a:prstGeom prst="rect">
             <a:avLst/>
@@ -1428,8 +1430,8 @@
         </p:nvSpPr>
         <p:spPr>
           <a:xfrm>
-            <a:off x="457200" y="1203480"/>
-            <a:ext cx="4015800" cy="1422720"/>
+            <a:off x="457200" y="1200240"/>
+            <a:ext cx="4015440" cy="1776600"/>
           </a:xfrm>
           <a:prstGeom prst="rect">
             <a:avLst/>
@@ -1454,8 +1456,8 @@
         </p:nvSpPr>
         <p:spPr>
           <a:xfrm>
-            <a:off x="4674240" y="1203480"/>
-            <a:ext cx="4015800" cy="1422720"/>
+            <a:off x="4673880" y="1200240"/>
+            <a:ext cx="4015440" cy="1776600"/>
           </a:xfrm>
           <a:prstGeom prst="rect">
             <a:avLst/>
@@ -1480,8 +1482,8 @@
         </p:nvSpPr>
         <p:spPr>
           <a:xfrm>
-            <a:off x="4674240" y="2761920"/>
-            <a:ext cx="4015800" cy="1422720"/>
+            <a:off x="4673880" y="3146040"/>
+            <a:ext cx="4015440" cy="1776600"/>
           </a:xfrm>
           <a:prstGeom prst="rect">
             <a:avLst/>
@@ -1506,8 +1508,8 @@
         </p:nvSpPr>
         <p:spPr>
           <a:xfrm>
-            <a:off x="457200" y="2761920"/>
-            <a:ext cx="4015800" cy="1422720"/>
+            <a:off x="457200" y="3146040"/>
+            <a:ext cx="4015440" cy="1776600"/>
           </a:xfrm>
           <a:prstGeom prst="rect">
             <a:avLst/>
@@ -1554,8 +1556,8 @@
         </p:nvSpPr>
         <p:spPr>
           <a:xfrm>
-            <a:off x="457200" y="205200"/>
-            <a:ext cx="8229240" cy="858600"/>
+            <a:off x="457200" y="205920"/>
+            <a:ext cx="8228880" cy="856440"/>
           </a:xfrm>
           <a:prstGeom prst="rect">
             <a:avLst/>
@@ -1581,8 +1583,8 @@
         </p:nvSpPr>
         <p:spPr>
           <a:xfrm>
-            <a:off x="457200" y="1203480"/>
-            <a:ext cx="8229240" cy="2982960"/>
+            <a:off x="457200" y="1200240"/>
+            <a:ext cx="8228880" cy="3724920"/>
           </a:xfrm>
           <a:prstGeom prst="rect">
             <a:avLst/>
@@ -1607,8 +1609,8 @@
         </p:nvSpPr>
         <p:spPr>
           <a:xfrm>
-            <a:off x="457200" y="1203480"/>
-            <a:ext cx="8229240" cy="2982960"/>
+            <a:off x="457200" y="1200240"/>
+            <a:ext cx="8228880" cy="3724920"/>
           </a:xfrm>
           <a:prstGeom prst="rect">
             <a:avLst/>
@@ -1633,8 +1635,8 @@
         </p:blipFill>
         <p:spPr>
           <a:xfrm>
-            <a:off x="2702160" y="1203480"/>
-            <a:ext cx="3738600" cy="2982960"/>
+            <a:off x="2237400" y="1199880"/>
+            <a:ext cx="4668480" cy="3724920"/>
           </a:xfrm>
           <a:prstGeom prst="rect">
             <a:avLst/>
@@ -1656,8 +1658,8 @@
         </p:blipFill>
         <p:spPr>
           <a:xfrm>
-            <a:off x="2702160" y="1203480"/>
-            <a:ext cx="3738600" cy="2982960"/>
+            <a:off x="2237400" y="1199880"/>
+            <a:ext cx="4668480" cy="3724920"/>
           </a:xfrm>
           <a:prstGeom prst="rect">
             <a:avLst/>
@@ -1667,6 +1669,329 @@
           </a:ln>
         </p:spPr>
       </p:pic>
+    </p:spTree>
+  </p:cSld>
+</p:sldLayout>
+</file>
+
+<file path=ppt/slideLayouts/slideLayout25.xml><?xml version="1.0" encoding="utf-8"?>
+<p:sldLayout xmlns:a="http://schemas.openxmlformats.org/drawingml/2006/main" xmlns:p="http://schemas.openxmlformats.org/presentationml/2006/main" xmlns:r="http://schemas.openxmlformats.org/officeDocument/2006/relationships" type="blank" preserve="1">
+  <p:cSld name="Blank Slide">
+    <p:spTree>
+      <p:nvGrpSpPr>
+        <p:cNvPr id="1" name=""/>
+        <p:cNvGrpSpPr/>
+        <p:nvPr/>
+      </p:nvGrpSpPr>
+      <p:grpSpPr>
+        <a:xfrm>
+          <a:off x="0" y="0"/>
+          <a:ext cx="0" cy="0"/>
+          <a:chOff x="0" y="0"/>
+          <a:chExt cx="0" cy="0"/>
+        </a:xfrm>
+      </p:grpSpPr>
+    </p:spTree>
+  </p:cSld>
+</p:sldLayout>
+</file>
+
+<file path=ppt/slideLayouts/slideLayout26.xml><?xml version="1.0" encoding="utf-8"?>
+<p:sldLayout xmlns:a="http://schemas.openxmlformats.org/drawingml/2006/main" xmlns:p="http://schemas.openxmlformats.org/presentationml/2006/main" xmlns:r="http://schemas.openxmlformats.org/officeDocument/2006/relationships" type="tx" preserve="1">
+  <p:cSld name="Title Slide">
+    <p:spTree>
+      <p:nvGrpSpPr>
+        <p:cNvPr id="1" name=""/>
+        <p:cNvGrpSpPr/>
+        <p:nvPr/>
+      </p:nvGrpSpPr>
+      <p:grpSpPr>
+        <a:xfrm>
+          <a:off x="0" y="0"/>
+          <a:ext cx="0" cy="0"/>
+          <a:chOff x="0" y="0"/>
+          <a:chExt cx="0" cy="0"/>
+        </a:xfrm>
+      </p:grpSpPr>
+      <p:sp>
+        <p:nvSpPr>
+          <p:cNvPr id="74" name="PlaceHolder 1"/>
+          <p:cNvSpPr>
+            <a:spLocks noGrp="1"/>
+          </p:cNvSpPr>
+          <p:nvPr>
+            <p:ph type="title"/>
+          </p:nvPr>
+        </p:nvSpPr>
+        <p:spPr>
+          <a:xfrm>
+            <a:off x="457200" y="205920"/>
+            <a:ext cx="8228880" cy="856440"/>
+          </a:xfrm>
+          <a:prstGeom prst="rect">
+            <a:avLst/>
+          </a:prstGeom>
+        </p:spPr>
+        <p:txBody>
+          <a:bodyPr lIns="0" rIns="0" tIns="0" bIns="0" anchor="ctr"/>
+          <a:p>
+            <a:pPr algn="ctr"/>
+            <a:endParaRPr/>
+          </a:p>
+        </p:txBody>
+      </p:sp>
+      <p:sp>
+        <p:nvSpPr>
+          <p:cNvPr id="75" name="PlaceHolder 2"/>
+          <p:cNvSpPr>
+            <a:spLocks noGrp="1"/>
+          </p:cNvSpPr>
+          <p:nvPr>
+            <p:ph type="subTitle"/>
+          </p:nvPr>
+        </p:nvSpPr>
+        <p:spPr>
+          <a:xfrm>
+            <a:off x="457200" y="1200240"/>
+            <a:ext cx="8228880" cy="3724920"/>
+          </a:xfrm>
+          <a:prstGeom prst="rect">
+            <a:avLst/>
+          </a:prstGeom>
+        </p:spPr>
+        <p:txBody>
+          <a:bodyPr lIns="0" rIns="0" tIns="0" bIns="0" anchor="ctr"/>
+          <a:p>
+            <a:pPr algn="ctr"/>
+            <a:endParaRPr/>
+          </a:p>
+        </p:txBody>
+      </p:sp>
+    </p:spTree>
+  </p:cSld>
+</p:sldLayout>
+</file>
+
+<file path=ppt/slideLayouts/slideLayout27.xml><?xml version="1.0" encoding="utf-8"?>
+<p:sldLayout xmlns:a="http://schemas.openxmlformats.org/drawingml/2006/main" xmlns:p="http://schemas.openxmlformats.org/presentationml/2006/main" xmlns:r="http://schemas.openxmlformats.org/officeDocument/2006/relationships" type="obj" preserve="1">
+  <p:cSld name="Title, Content">
+    <p:spTree>
+      <p:nvGrpSpPr>
+        <p:cNvPr id="1" name=""/>
+        <p:cNvGrpSpPr/>
+        <p:nvPr/>
+      </p:nvGrpSpPr>
+      <p:grpSpPr>
+        <a:xfrm>
+          <a:off x="0" y="0"/>
+          <a:ext cx="0" cy="0"/>
+          <a:chOff x="0" y="0"/>
+          <a:chExt cx="0" cy="0"/>
+        </a:xfrm>
+      </p:grpSpPr>
+      <p:sp>
+        <p:nvSpPr>
+          <p:cNvPr id="76" name="PlaceHolder 1"/>
+          <p:cNvSpPr>
+            <a:spLocks noGrp="1"/>
+          </p:cNvSpPr>
+          <p:nvPr>
+            <p:ph type="title"/>
+          </p:nvPr>
+        </p:nvSpPr>
+        <p:spPr>
+          <a:xfrm>
+            <a:off x="457200" y="205920"/>
+            <a:ext cx="8228880" cy="856440"/>
+          </a:xfrm>
+          <a:prstGeom prst="rect">
+            <a:avLst/>
+          </a:prstGeom>
+        </p:spPr>
+        <p:txBody>
+          <a:bodyPr lIns="0" rIns="0" tIns="0" bIns="0" anchor="ctr"/>
+          <a:p>
+            <a:pPr algn="ctr"/>
+            <a:endParaRPr/>
+          </a:p>
+        </p:txBody>
+      </p:sp>
+      <p:sp>
+        <p:nvSpPr>
+          <p:cNvPr id="77" name="PlaceHolder 2"/>
+          <p:cNvSpPr>
+            <a:spLocks noGrp="1"/>
+          </p:cNvSpPr>
+          <p:nvPr>
+            <p:ph type="body"/>
+          </p:nvPr>
+        </p:nvSpPr>
+        <p:spPr>
+          <a:xfrm>
+            <a:off x="457200" y="1200240"/>
+            <a:ext cx="8228880" cy="3724920"/>
+          </a:xfrm>
+          <a:prstGeom prst="rect">
+            <a:avLst/>
+          </a:prstGeom>
+        </p:spPr>
+        <p:txBody>
+          <a:bodyPr lIns="0" rIns="0" tIns="0" bIns="0"/>
+          <a:p>
+            <a:endParaRPr/>
+          </a:p>
+        </p:txBody>
+      </p:sp>
+    </p:spTree>
+  </p:cSld>
+</p:sldLayout>
+</file>
+
+<file path=ppt/slideLayouts/slideLayout28.xml><?xml version="1.0" encoding="utf-8"?>
+<p:sldLayout xmlns:a="http://schemas.openxmlformats.org/drawingml/2006/main" xmlns:p="http://schemas.openxmlformats.org/presentationml/2006/main" xmlns:r="http://schemas.openxmlformats.org/officeDocument/2006/relationships" type="twoObj" preserve="1">
+  <p:cSld name="Title, 2 Content">
+    <p:spTree>
+      <p:nvGrpSpPr>
+        <p:cNvPr id="1" name=""/>
+        <p:cNvGrpSpPr/>
+        <p:nvPr/>
+      </p:nvGrpSpPr>
+      <p:grpSpPr>
+        <a:xfrm>
+          <a:off x="0" y="0"/>
+          <a:ext cx="0" cy="0"/>
+          <a:chOff x="0" y="0"/>
+          <a:chExt cx="0" cy="0"/>
+        </a:xfrm>
+      </p:grpSpPr>
+      <p:sp>
+        <p:nvSpPr>
+          <p:cNvPr id="78" name="PlaceHolder 1"/>
+          <p:cNvSpPr>
+            <a:spLocks noGrp="1"/>
+          </p:cNvSpPr>
+          <p:nvPr>
+            <p:ph type="title"/>
+          </p:nvPr>
+        </p:nvSpPr>
+        <p:spPr>
+          <a:xfrm>
+            <a:off x="457200" y="205920"/>
+            <a:ext cx="8228880" cy="856440"/>
+          </a:xfrm>
+          <a:prstGeom prst="rect">
+            <a:avLst/>
+          </a:prstGeom>
+        </p:spPr>
+        <p:txBody>
+          <a:bodyPr lIns="0" rIns="0" tIns="0" bIns="0" anchor="ctr"/>
+          <a:p>
+            <a:pPr algn="ctr"/>
+            <a:endParaRPr/>
+          </a:p>
+        </p:txBody>
+      </p:sp>
+      <p:sp>
+        <p:nvSpPr>
+          <p:cNvPr id="79" name="PlaceHolder 2"/>
+          <p:cNvSpPr>
+            <a:spLocks noGrp="1"/>
+          </p:cNvSpPr>
+          <p:nvPr>
+            <p:ph type="body"/>
+          </p:nvPr>
+        </p:nvSpPr>
+        <p:spPr>
+          <a:xfrm>
+            <a:off x="457200" y="1200240"/>
+            <a:ext cx="4015440" cy="3724920"/>
+          </a:xfrm>
+          <a:prstGeom prst="rect">
+            <a:avLst/>
+          </a:prstGeom>
+        </p:spPr>
+        <p:txBody>
+          <a:bodyPr lIns="0" rIns="0" tIns="0" bIns="0"/>
+          <a:p>
+            <a:endParaRPr/>
+          </a:p>
+        </p:txBody>
+      </p:sp>
+      <p:sp>
+        <p:nvSpPr>
+          <p:cNvPr id="80" name="PlaceHolder 3"/>
+          <p:cNvSpPr>
+            <a:spLocks noGrp="1"/>
+          </p:cNvSpPr>
+          <p:nvPr>
+            <p:ph type="body"/>
+          </p:nvPr>
+        </p:nvSpPr>
+        <p:spPr>
+          <a:xfrm>
+            <a:off x="4673880" y="1200240"/>
+            <a:ext cx="4015440" cy="3724920"/>
+          </a:xfrm>
+          <a:prstGeom prst="rect">
+            <a:avLst/>
+          </a:prstGeom>
+        </p:spPr>
+        <p:txBody>
+          <a:bodyPr lIns="0" rIns="0" tIns="0" bIns="0"/>
+          <a:p>
+            <a:endParaRPr/>
+          </a:p>
+        </p:txBody>
+      </p:sp>
+    </p:spTree>
+  </p:cSld>
+</p:sldLayout>
+</file>
+
+<file path=ppt/slideLayouts/slideLayout29.xml><?xml version="1.0" encoding="utf-8"?>
+<p:sldLayout xmlns:a="http://schemas.openxmlformats.org/drawingml/2006/main" xmlns:p="http://schemas.openxmlformats.org/presentationml/2006/main" xmlns:r="http://schemas.openxmlformats.org/officeDocument/2006/relationships" type="titleOnly" preserve="1">
+  <p:cSld name="Title Only">
+    <p:spTree>
+      <p:nvGrpSpPr>
+        <p:cNvPr id="1" name=""/>
+        <p:cNvGrpSpPr/>
+        <p:nvPr/>
+      </p:nvGrpSpPr>
+      <p:grpSpPr>
+        <a:xfrm>
+          <a:off x="0" y="0"/>
+          <a:ext cx="0" cy="0"/>
+          <a:chOff x="0" y="0"/>
+          <a:chExt cx="0" cy="0"/>
+        </a:xfrm>
+      </p:grpSpPr>
+      <p:sp>
+        <p:nvSpPr>
+          <p:cNvPr id="81" name="PlaceHolder 1"/>
+          <p:cNvSpPr>
+            <a:spLocks noGrp="1"/>
+          </p:cNvSpPr>
+          <p:nvPr>
+            <p:ph type="title"/>
+          </p:nvPr>
+        </p:nvSpPr>
+        <p:spPr>
+          <a:xfrm>
+            <a:off x="457200" y="205920"/>
+            <a:ext cx="8228880" cy="856440"/>
+          </a:xfrm>
+          <a:prstGeom prst="rect">
+            <a:avLst/>
+          </a:prstGeom>
+        </p:spPr>
+        <p:txBody>
+          <a:bodyPr lIns="0" rIns="0" tIns="0" bIns="0" anchor="ctr"/>
+          <a:p>
+            <a:pPr algn="ctr"/>
+            <a:endParaRPr/>
+          </a:p>
+        </p:txBody>
+      </p:sp>
     </p:spTree>
   </p:cSld>
 </p:sldLayout>
@@ -1701,8 +2026,8 @@
         </p:nvSpPr>
         <p:spPr>
           <a:xfrm>
-            <a:off x="457200" y="205200"/>
-            <a:ext cx="8229240" cy="858600"/>
+            <a:off x="457200" y="205920"/>
+            <a:ext cx="8228880" cy="856440"/>
           </a:xfrm>
           <a:prstGeom prst="rect">
             <a:avLst/>
@@ -1728,8 +2053,8 @@
         </p:nvSpPr>
         <p:spPr>
           <a:xfrm>
-            <a:off x="457200" y="1203480"/>
-            <a:ext cx="8229240" cy="2982960"/>
+            <a:off x="457200" y="1200240"/>
+            <a:ext cx="8228880" cy="3724920"/>
           </a:xfrm>
           <a:prstGeom prst="rect">
             <a:avLst/>
@@ -1742,6 +2067,837 @@
           </a:p>
         </p:txBody>
       </p:sp>
+    </p:spTree>
+  </p:cSld>
+</p:sldLayout>
+</file>
+
+<file path=ppt/slideLayouts/slideLayout30.xml><?xml version="1.0" encoding="utf-8"?>
+<p:sldLayout xmlns:a="http://schemas.openxmlformats.org/drawingml/2006/main" xmlns:p="http://schemas.openxmlformats.org/presentationml/2006/main" xmlns:r="http://schemas.openxmlformats.org/officeDocument/2006/relationships" type="objOnly" preserve="1">
+  <p:cSld name="Centered Text">
+    <p:spTree>
+      <p:nvGrpSpPr>
+        <p:cNvPr id="1" name=""/>
+        <p:cNvGrpSpPr/>
+        <p:nvPr/>
+      </p:nvGrpSpPr>
+      <p:grpSpPr>
+        <a:xfrm>
+          <a:off x="0" y="0"/>
+          <a:ext cx="0" cy="0"/>
+          <a:chOff x="0" y="0"/>
+          <a:chExt cx="0" cy="0"/>
+        </a:xfrm>
+      </p:grpSpPr>
+      <p:sp>
+        <p:nvSpPr>
+          <p:cNvPr id="82" name="PlaceHolder 1"/>
+          <p:cNvSpPr>
+            <a:spLocks noGrp="1"/>
+          </p:cNvSpPr>
+          <p:nvPr>
+            <p:ph type="subTitle"/>
+          </p:nvPr>
+        </p:nvSpPr>
+        <p:spPr>
+          <a:xfrm>
+            <a:off x="457200" y="205920"/>
+            <a:ext cx="8228880" cy="3971160"/>
+          </a:xfrm>
+          <a:prstGeom prst="rect">
+            <a:avLst/>
+          </a:prstGeom>
+        </p:spPr>
+        <p:txBody>
+          <a:bodyPr lIns="0" rIns="0" tIns="0" bIns="0" anchor="ctr"/>
+          <a:p>
+            <a:pPr algn="ctr"/>
+            <a:endParaRPr/>
+          </a:p>
+        </p:txBody>
+      </p:sp>
+    </p:spTree>
+  </p:cSld>
+</p:sldLayout>
+</file>
+
+<file path=ppt/slideLayouts/slideLayout31.xml><?xml version="1.0" encoding="utf-8"?>
+<p:sldLayout xmlns:a="http://schemas.openxmlformats.org/drawingml/2006/main" xmlns:p="http://schemas.openxmlformats.org/presentationml/2006/main" xmlns:r="http://schemas.openxmlformats.org/officeDocument/2006/relationships" type="twoObjAndObj" preserve="1">
+  <p:cSld name="Title, 2 Content and Content">
+    <p:spTree>
+      <p:nvGrpSpPr>
+        <p:cNvPr id="1" name=""/>
+        <p:cNvGrpSpPr/>
+        <p:nvPr/>
+      </p:nvGrpSpPr>
+      <p:grpSpPr>
+        <a:xfrm>
+          <a:off x="0" y="0"/>
+          <a:ext cx="0" cy="0"/>
+          <a:chOff x="0" y="0"/>
+          <a:chExt cx="0" cy="0"/>
+        </a:xfrm>
+      </p:grpSpPr>
+      <p:sp>
+        <p:nvSpPr>
+          <p:cNvPr id="83" name="PlaceHolder 1"/>
+          <p:cNvSpPr>
+            <a:spLocks noGrp="1"/>
+          </p:cNvSpPr>
+          <p:nvPr>
+            <p:ph type="title"/>
+          </p:nvPr>
+        </p:nvSpPr>
+        <p:spPr>
+          <a:xfrm>
+            <a:off x="457200" y="205920"/>
+            <a:ext cx="8228880" cy="856440"/>
+          </a:xfrm>
+          <a:prstGeom prst="rect">
+            <a:avLst/>
+          </a:prstGeom>
+        </p:spPr>
+        <p:txBody>
+          <a:bodyPr lIns="0" rIns="0" tIns="0" bIns="0" anchor="ctr"/>
+          <a:p>
+            <a:pPr algn="ctr"/>
+            <a:endParaRPr/>
+          </a:p>
+        </p:txBody>
+      </p:sp>
+      <p:sp>
+        <p:nvSpPr>
+          <p:cNvPr id="84" name="PlaceHolder 2"/>
+          <p:cNvSpPr>
+            <a:spLocks noGrp="1"/>
+          </p:cNvSpPr>
+          <p:nvPr>
+            <p:ph type="body"/>
+          </p:nvPr>
+        </p:nvSpPr>
+        <p:spPr>
+          <a:xfrm>
+            <a:off x="457200" y="1200240"/>
+            <a:ext cx="4015440" cy="1776600"/>
+          </a:xfrm>
+          <a:prstGeom prst="rect">
+            <a:avLst/>
+          </a:prstGeom>
+        </p:spPr>
+        <p:txBody>
+          <a:bodyPr lIns="0" rIns="0" tIns="0" bIns="0"/>
+          <a:p>
+            <a:endParaRPr/>
+          </a:p>
+        </p:txBody>
+      </p:sp>
+      <p:sp>
+        <p:nvSpPr>
+          <p:cNvPr id="85" name="PlaceHolder 3"/>
+          <p:cNvSpPr>
+            <a:spLocks noGrp="1"/>
+          </p:cNvSpPr>
+          <p:nvPr>
+            <p:ph type="body"/>
+          </p:nvPr>
+        </p:nvSpPr>
+        <p:spPr>
+          <a:xfrm>
+            <a:off x="457200" y="3146040"/>
+            <a:ext cx="4015440" cy="1776600"/>
+          </a:xfrm>
+          <a:prstGeom prst="rect">
+            <a:avLst/>
+          </a:prstGeom>
+        </p:spPr>
+        <p:txBody>
+          <a:bodyPr lIns="0" rIns="0" tIns="0" bIns="0"/>
+          <a:p>
+            <a:endParaRPr/>
+          </a:p>
+        </p:txBody>
+      </p:sp>
+      <p:sp>
+        <p:nvSpPr>
+          <p:cNvPr id="86" name="PlaceHolder 4"/>
+          <p:cNvSpPr>
+            <a:spLocks noGrp="1"/>
+          </p:cNvSpPr>
+          <p:nvPr>
+            <p:ph type="body"/>
+          </p:nvPr>
+        </p:nvSpPr>
+        <p:spPr>
+          <a:xfrm>
+            <a:off x="4673880" y="1200240"/>
+            <a:ext cx="4015440" cy="3724920"/>
+          </a:xfrm>
+          <a:prstGeom prst="rect">
+            <a:avLst/>
+          </a:prstGeom>
+        </p:spPr>
+        <p:txBody>
+          <a:bodyPr lIns="0" rIns="0" tIns="0" bIns="0"/>
+          <a:p>
+            <a:endParaRPr/>
+          </a:p>
+        </p:txBody>
+      </p:sp>
+    </p:spTree>
+  </p:cSld>
+</p:sldLayout>
+</file>
+
+<file path=ppt/slideLayouts/slideLayout32.xml><?xml version="1.0" encoding="utf-8"?>
+<p:sldLayout xmlns:a="http://schemas.openxmlformats.org/drawingml/2006/main" xmlns:p="http://schemas.openxmlformats.org/presentationml/2006/main" xmlns:r="http://schemas.openxmlformats.org/officeDocument/2006/relationships" type="objAndTwoObj" preserve="1">
+  <p:cSld name="Title Content and 2 Content">
+    <p:spTree>
+      <p:nvGrpSpPr>
+        <p:cNvPr id="1" name=""/>
+        <p:cNvGrpSpPr/>
+        <p:nvPr/>
+      </p:nvGrpSpPr>
+      <p:grpSpPr>
+        <a:xfrm>
+          <a:off x="0" y="0"/>
+          <a:ext cx="0" cy="0"/>
+          <a:chOff x="0" y="0"/>
+          <a:chExt cx="0" cy="0"/>
+        </a:xfrm>
+      </p:grpSpPr>
+      <p:sp>
+        <p:nvSpPr>
+          <p:cNvPr id="87" name="PlaceHolder 1"/>
+          <p:cNvSpPr>
+            <a:spLocks noGrp="1"/>
+          </p:cNvSpPr>
+          <p:nvPr>
+            <p:ph type="title"/>
+          </p:nvPr>
+        </p:nvSpPr>
+        <p:spPr>
+          <a:xfrm>
+            <a:off x="457200" y="205920"/>
+            <a:ext cx="8228880" cy="856440"/>
+          </a:xfrm>
+          <a:prstGeom prst="rect">
+            <a:avLst/>
+          </a:prstGeom>
+        </p:spPr>
+        <p:txBody>
+          <a:bodyPr lIns="0" rIns="0" tIns="0" bIns="0" anchor="ctr"/>
+          <a:p>
+            <a:pPr algn="ctr"/>
+            <a:endParaRPr/>
+          </a:p>
+        </p:txBody>
+      </p:sp>
+      <p:sp>
+        <p:nvSpPr>
+          <p:cNvPr id="88" name="PlaceHolder 2"/>
+          <p:cNvSpPr>
+            <a:spLocks noGrp="1"/>
+          </p:cNvSpPr>
+          <p:nvPr>
+            <p:ph type="body"/>
+          </p:nvPr>
+        </p:nvSpPr>
+        <p:spPr>
+          <a:xfrm>
+            <a:off x="457200" y="1200240"/>
+            <a:ext cx="4015440" cy="3724920"/>
+          </a:xfrm>
+          <a:prstGeom prst="rect">
+            <a:avLst/>
+          </a:prstGeom>
+        </p:spPr>
+        <p:txBody>
+          <a:bodyPr lIns="0" rIns="0" tIns="0" bIns="0"/>
+          <a:p>
+            <a:endParaRPr/>
+          </a:p>
+        </p:txBody>
+      </p:sp>
+      <p:sp>
+        <p:nvSpPr>
+          <p:cNvPr id="89" name="PlaceHolder 3"/>
+          <p:cNvSpPr>
+            <a:spLocks noGrp="1"/>
+          </p:cNvSpPr>
+          <p:nvPr>
+            <p:ph type="body"/>
+          </p:nvPr>
+        </p:nvSpPr>
+        <p:spPr>
+          <a:xfrm>
+            <a:off x="4673880" y="1200240"/>
+            <a:ext cx="4015440" cy="1776600"/>
+          </a:xfrm>
+          <a:prstGeom prst="rect">
+            <a:avLst/>
+          </a:prstGeom>
+        </p:spPr>
+        <p:txBody>
+          <a:bodyPr lIns="0" rIns="0" tIns="0" bIns="0"/>
+          <a:p>
+            <a:endParaRPr/>
+          </a:p>
+        </p:txBody>
+      </p:sp>
+      <p:sp>
+        <p:nvSpPr>
+          <p:cNvPr id="90" name="PlaceHolder 4"/>
+          <p:cNvSpPr>
+            <a:spLocks noGrp="1"/>
+          </p:cNvSpPr>
+          <p:nvPr>
+            <p:ph type="body"/>
+          </p:nvPr>
+        </p:nvSpPr>
+        <p:spPr>
+          <a:xfrm>
+            <a:off x="4673880" y="3146040"/>
+            <a:ext cx="4015440" cy="1776600"/>
+          </a:xfrm>
+          <a:prstGeom prst="rect">
+            <a:avLst/>
+          </a:prstGeom>
+        </p:spPr>
+        <p:txBody>
+          <a:bodyPr lIns="0" rIns="0" tIns="0" bIns="0"/>
+          <a:p>
+            <a:endParaRPr/>
+          </a:p>
+        </p:txBody>
+      </p:sp>
+    </p:spTree>
+  </p:cSld>
+</p:sldLayout>
+</file>
+
+<file path=ppt/slideLayouts/slideLayout33.xml><?xml version="1.0" encoding="utf-8"?>
+<p:sldLayout xmlns:a="http://schemas.openxmlformats.org/drawingml/2006/main" xmlns:p="http://schemas.openxmlformats.org/presentationml/2006/main" xmlns:r="http://schemas.openxmlformats.org/officeDocument/2006/relationships" type="twoObjOverTx" preserve="1">
+  <p:cSld name="Title, 2 Content over Content">
+    <p:spTree>
+      <p:nvGrpSpPr>
+        <p:cNvPr id="1" name=""/>
+        <p:cNvGrpSpPr/>
+        <p:nvPr/>
+      </p:nvGrpSpPr>
+      <p:grpSpPr>
+        <a:xfrm>
+          <a:off x="0" y="0"/>
+          <a:ext cx="0" cy="0"/>
+          <a:chOff x="0" y="0"/>
+          <a:chExt cx="0" cy="0"/>
+        </a:xfrm>
+      </p:grpSpPr>
+      <p:sp>
+        <p:nvSpPr>
+          <p:cNvPr id="91" name="PlaceHolder 1"/>
+          <p:cNvSpPr>
+            <a:spLocks noGrp="1"/>
+          </p:cNvSpPr>
+          <p:nvPr>
+            <p:ph type="title"/>
+          </p:nvPr>
+        </p:nvSpPr>
+        <p:spPr>
+          <a:xfrm>
+            <a:off x="457200" y="205920"/>
+            <a:ext cx="8228880" cy="856440"/>
+          </a:xfrm>
+          <a:prstGeom prst="rect">
+            <a:avLst/>
+          </a:prstGeom>
+        </p:spPr>
+        <p:txBody>
+          <a:bodyPr lIns="0" rIns="0" tIns="0" bIns="0" anchor="ctr"/>
+          <a:p>
+            <a:pPr algn="ctr"/>
+            <a:endParaRPr/>
+          </a:p>
+        </p:txBody>
+      </p:sp>
+      <p:sp>
+        <p:nvSpPr>
+          <p:cNvPr id="92" name="PlaceHolder 2"/>
+          <p:cNvSpPr>
+            <a:spLocks noGrp="1"/>
+          </p:cNvSpPr>
+          <p:nvPr>
+            <p:ph type="body"/>
+          </p:nvPr>
+        </p:nvSpPr>
+        <p:spPr>
+          <a:xfrm>
+            <a:off x="457200" y="1200240"/>
+            <a:ext cx="4015440" cy="1776600"/>
+          </a:xfrm>
+          <a:prstGeom prst="rect">
+            <a:avLst/>
+          </a:prstGeom>
+        </p:spPr>
+        <p:txBody>
+          <a:bodyPr lIns="0" rIns="0" tIns="0" bIns="0"/>
+          <a:p>
+            <a:endParaRPr/>
+          </a:p>
+        </p:txBody>
+      </p:sp>
+      <p:sp>
+        <p:nvSpPr>
+          <p:cNvPr id="93" name="PlaceHolder 3"/>
+          <p:cNvSpPr>
+            <a:spLocks noGrp="1"/>
+          </p:cNvSpPr>
+          <p:nvPr>
+            <p:ph type="body"/>
+          </p:nvPr>
+        </p:nvSpPr>
+        <p:spPr>
+          <a:xfrm>
+            <a:off x="4673880" y="1200240"/>
+            <a:ext cx="4015440" cy="1776600"/>
+          </a:xfrm>
+          <a:prstGeom prst="rect">
+            <a:avLst/>
+          </a:prstGeom>
+        </p:spPr>
+        <p:txBody>
+          <a:bodyPr lIns="0" rIns="0" tIns="0" bIns="0"/>
+          <a:p>
+            <a:endParaRPr/>
+          </a:p>
+        </p:txBody>
+      </p:sp>
+      <p:sp>
+        <p:nvSpPr>
+          <p:cNvPr id="94" name="PlaceHolder 4"/>
+          <p:cNvSpPr>
+            <a:spLocks noGrp="1"/>
+          </p:cNvSpPr>
+          <p:nvPr>
+            <p:ph type="body"/>
+          </p:nvPr>
+        </p:nvSpPr>
+        <p:spPr>
+          <a:xfrm>
+            <a:off x="457200" y="3146040"/>
+            <a:ext cx="8228880" cy="1776600"/>
+          </a:xfrm>
+          <a:prstGeom prst="rect">
+            <a:avLst/>
+          </a:prstGeom>
+        </p:spPr>
+        <p:txBody>
+          <a:bodyPr lIns="0" rIns="0" tIns="0" bIns="0"/>
+          <a:p>
+            <a:endParaRPr/>
+          </a:p>
+        </p:txBody>
+      </p:sp>
+    </p:spTree>
+  </p:cSld>
+</p:sldLayout>
+</file>
+
+<file path=ppt/slideLayouts/slideLayout34.xml><?xml version="1.0" encoding="utf-8"?>
+<p:sldLayout xmlns:a="http://schemas.openxmlformats.org/drawingml/2006/main" xmlns:p="http://schemas.openxmlformats.org/presentationml/2006/main" xmlns:r="http://schemas.openxmlformats.org/officeDocument/2006/relationships" type="objOverTx" preserve="1">
+  <p:cSld name="Title, Content over Content">
+    <p:spTree>
+      <p:nvGrpSpPr>
+        <p:cNvPr id="1" name=""/>
+        <p:cNvGrpSpPr/>
+        <p:nvPr/>
+      </p:nvGrpSpPr>
+      <p:grpSpPr>
+        <a:xfrm>
+          <a:off x="0" y="0"/>
+          <a:ext cx="0" cy="0"/>
+          <a:chOff x="0" y="0"/>
+          <a:chExt cx="0" cy="0"/>
+        </a:xfrm>
+      </p:grpSpPr>
+      <p:sp>
+        <p:nvSpPr>
+          <p:cNvPr id="95" name="PlaceHolder 1"/>
+          <p:cNvSpPr>
+            <a:spLocks noGrp="1"/>
+          </p:cNvSpPr>
+          <p:nvPr>
+            <p:ph type="title"/>
+          </p:nvPr>
+        </p:nvSpPr>
+        <p:spPr>
+          <a:xfrm>
+            <a:off x="457200" y="205920"/>
+            <a:ext cx="8228880" cy="856440"/>
+          </a:xfrm>
+          <a:prstGeom prst="rect">
+            <a:avLst/>
+          </a:prstGeom>
+        </p:spPr>
+        <p:txBody>
+          <a:bodyPr lIns="0" rIns="0" tIns="0" bIns="0" anchor="ctr"/>
+          <a:p>
+            <a:pPr algn="ctr"/>
+            <a:endParaRPr/>
+          </a:p>
+        </p:txBody>
+      </p:sp>
+      <p:sp>
+        <p:nvSpPr>
+          <p:cNvPr id="96" name="PlaceHolder 2"/>
+          <p:cNvSpPr>
+            <a:spLocks noGrp="1"/>
+          </p:cNvSpPr>
+          <p:nvPr>
+            <p:ph type="body"/>
+          </p:nvPr>
+        </p:nvSpPr>
+        <p:spPr>
+          <a:xfrm>
+            <a:off x="457200" y="1200240"/>
+            <a:ext cx="8228880" cy="1776600"/>
+          </a:xfrm>
+          <a:prstGeom prst="rect">
+            <a:avLst/>
+          </a:prstGeom>
+        </p:spPr>
+        <p:txBody>
+          <a:bodyPr lIns="0" rIns="0" tIns="0" bIns="0"/>
+          <a:p>
+            <a:endParaRPr/>
+          </a:p>
+        </p:txBody>
+      </p:sp>
+      <p:sp>
+        <p:nvSpPr>
+          <p:cNvPr id="97" name="PlaceHolder 3"/>
+          <p:cNvSpPr>
+            <a:spLocks noGrp="1"/>
+          </p:cNvSpPr>
+          <p:nvPr>
+            <p:ph type="body"/>
+          </p:nvPr>
+        </p:nvSpPr>
+        <p:spPr>
+          <a:xfrm>
+            <a:off x="457200" y="3146040"/>
+            <a:ext cx="8228880" cy="1776600"/>
+          </a:xfrm>
+          <a:prstGeom prst="rect">
+            <a:avLst/>
+          </a:prstGeom>
+        </p:spPr>
+        <p:txBody>
+          <a:bodyPr lIns="0" rIns="0" tIns="0" bIns="0"/>
+          <a:p>
+            <a:endParaRPr/>
+          </a:p>
+        </p:txBody>
+      </p:sp>
+    </p:spTree>
+  </p:cSld>
+</p:sldLayout>
+</file>
+
+<file path=ppt/slideLayouts/slideLayout35.xml><?xml version="1.0" encoding="utf-8"?>
+<p:sldLayout xmlns:a="http://schemas.openxmlformats.org/drawingml/2006/main" xmlns:p="http://schemas.openxmlformats.org/presentationml/2006/main" xmlns:r="http://schemas.openxmlformats.org/officeDocument/2006/relationships" type="fourObj" preserve="1">
+  <p:cSld name="Title, 4 Content">
+    <p:spTree>
+      <p:nvGrpSpPr>
+        <p:cNvPr id="1" name=""/>
+        <p:cNvGrpSpPr/>
+        <p:nvPr/>
+      </p:nvGrpSpPr>
+      <p:grpSpPr>
+        <a:xfrm>
+          <a:off x="0" y="0"/>
+          <a:ext cx="0" cy="0"/>
+          <a:chOff x="0" y="0"/>
+          <a:chExt cx="0" cy="0"/>
+        </a:xfrm>
+      </p:grpSpPr>
+      <p:sp>
+        <p:nvSpPr>
+          <p:cNvPr id="98" name="PlaceHolder 1"/>
+          <p:cNvSpPr>
+            <a:spLocks noGrp="1"/>
+          </p:cNvSpPr>
+          <p:nvPr>
+            <p:ph type="title"/>
+          </p:nvPr>
+        </p:nvSpPr>
+        <p:spPr>
+          <a:xfrm>
+            <a:off x="457200" y="205920"/>
+            <a:ext cx="8228880" cy="856440"/>
+          </a:xfrm>
+          <a:prstGeom prst="rect">
+            <a:avLst/>
+          </a:prstGeom>
+        </p:spPr>
+        <p:txBody>
+          <a:bodyPr lIns="0" rIns="0" tIns="0" bIns="0" anchor="ctr"/>
+          <a:p>
+            <a:pPr algn="ctr"/>
+            <a:endParaRPr/>
+          </a:p>
+        </p:txBody>
+      </p:sp>
+      <p:sp>
+        <p:nvSpPr>
+          <p:cNvPr id="99" name="PlaceHolder 2"/>
+          <p:cNvSpPr>
+            <a:spLocks noGrp="1"/>
+          </p:cNvSpPr>
+          <p:nvPr>
+            <p:ph type="body"/>
+          </p:nvPr>
+        </p:nvSpPr>
+        <p:spPr>
+          <a:xfrm>
+            <a:off x="457200" y="1200240"/>
+            <a:ext cx="4015440" cy="1776600"/>
+          </a:xfrm>
+          <a:prstGeom prst="rect">
+            <a:avLst/>
+          </a:prstGeom>
+        </p:spPr>
+        <p:txBody>
+          <a:bodyPr lIns="0" rIns="0" tIns="0" bIns="0"/>
+          <a:p>
+            <a:endParaRPr/>
+          </a:p>
+        </p:txBody>
+      </p:sp>
+      <p:sp>
+        <p:nvSpPr>
+          <p:cNvPr id="100" name="PlaceHolder 3"/>
+          <p:cNvSpPr>
+            <a:spLocks noGrp="1"/>
+          </p:cNvSpPr>
+          <p:nvPr>
+            <p:ph type="body"/>
+          </p:nvPr>
+        </p:nvSpPr>
+        <p:spPr>
+          <a:xfrm>
+            <a:off x="4673880" y="1200240"/>
+            <a:ext cx="4015440" cy="1776600"/>
+          </a:xfrm>
+          <a:prstGeom prst="rect">
+            <a:avLst/>
+          </a:prstGeom>
+        </p:spPr>
+        <p:txBody>
+          <a:bodyPr lIns="0" rIns="0" tIns="0" bIns="0"/>
+          <a:p>
+            <a:endParaRPr/>
+          </a:p>
+        </p:txBody>
+      </p:sp>
+      <p:sp>
+        <p:nvSpPr>
+          <p:cNvPr id="101" name="PlaceHolder 4"/>
+          <p:cNvSpPr>
+            <a:spLocks noGrp="1"/>
+          </p:cNvSpPr>
+          <p:nvPr>
+            <p:ph type="body"/>
+          </p:nvPr>
+        </p:nvSpPr>
+        <p:spPr>
+          <a:xfrm>
+            <a:off x="4673880" y="3146040"/>
+            <a:ext cx="4015440" cy="1776600"/>
+          </a:xfrm>
+          <a:prstGeom prst="rect">
+            <a:avLst/>
+          </a:prstGeom>
+        </p:spPr>
+        <p:txBody>
+          <a:bodyPr lIns="0" rIns="0" tIns="0" bIns="0"/>
+          <a:p>
+            <a:endParaRPr/>
+          </a:p>
+        </p:txBody>
+      </p:sp>
+      <p:sp>
+        <p:nvSpPr>
+          <p:cNvPr id="102" name="PlaceHolder 5"/>
+          <p:cNvSpPr>
+            <a:spLocks noGrp="1"/>
+          </p:cNvSpPr>
+          <p:nvPr>
+            <p:ph type="body"/>
+          </p:nvPr>
+        </p:nvSpPr>
+        <p:spPr>
+          <a:xfrm>
+            <a:off x="457200" y="3146040"/>
+            <a:ext cx="4015440" cy="1776600"/>
+          </a:xfrm>
+          <a:prstGeom prst="rect">
+            <a:avLst/>
+          </a:prstGeom>
+        </p:spPr>
+        <p:txBody>
+          <a:bodyPr lIns="0" rIns="0" tIns="0" bIns="0"/>
+          <a:p>
+            <a:endParaRPr/>
+          </a:p>
+        </p:txBody>
+      </p:sp>
+    </p:spTree>
+  </p:cSld>
+</p:sldLayout>
+</file>
+
+<file path=ppt/slideLayouts/slideLayout36.xml><?xml version="1.0" encoding="utf-8"?>
+<p:sldLayout xmlns:a="http://schemas.openxmlformats.org/drawingml/2006/main" xmlns:p="http://schemas.openxmlformats.org/presentationml/2006/main" xmlns:r="http://schemas.openxmlformats.org/officeDocument/2006/relationships" type="blank" preserve="1">
+  <p:cSld name="Title, 6 Content">
+    <p:spTree>
+      <p:nvGrpSpPr>
+        <p:cNvPr id="1" name=""/>
+        <p:cNvGrpSpPr/>
+        <p:nvPr/>
+      </p:nvGrpSpPr>
+      <p:grpSpPr>
+        <a:xfrm>
+          <a:off x="0" y="0"/>
+          <a:ext cx="0" cy="0"/>
+          <a:chOff x="0" y="0"/>
+          <a:chExt cx="0" cy="0"/>
+        </a:xfrm>
+      </p:grpSpPr>
+      <p:sp>
+        <p:nvSpPr>
+          <p:cNvPr id="103" name="PlaceHolder 1"/>
+          <p:cNvSpPr>
+            <a:spLocks noGrp="1"/>
+          </p:cNvSpPr>
+          <p:nvPr>
+            <p:ph type="title"/>
+          </p:nvPr>
+        </p:nvSpPr>
+        <p:spPr>
+          <a:xfrm>
+            <a:off x="457200" y="205920"/>
+            <a:ext cx="8228880" cy="856440"/>
+          </a:xfrm>
+          <a:prstGeom prst="rect">
+            <a:avLst/>
+          </a:prstGeom>
+        </p:spPr>
+        <p:txBody>
+          <a:bodyPr lIns="0" rIns="0" tIns="0" bIns="0" anchor="ctr"/>
+          <a:p>
+            <a:pPr algn="ctr"/>
+            <a:endParaRPr/>
+          </a:p>
+        </p:txBody>
+      </p:sp>
+      <p:sp>
+        <p:nvSpPr>
+          <p:cNvPr id="104" name="PlaceHolder 2"/>
+          <p:cNvSpPr>
+            <a:spLocks noGrp="1"/>
+          </p:cNvSpPr>
+          <p:nvPr>
+            <p:ph type="body"/>
+          </p:nvPr>
+        </p:nvSpPr>
+        <p:spPr>
+          <a:xfrm>
+            <a:off x="457200" y="1200240"/>
+            <a:ext cx="8228880" cy="3724920"/>
+          </a:xfrm>
+          <a:prstGeom prst="rect">
+            <a:avLst/>
+          </a:prstGeom>
+        </p:spPr>
+        <p:txBody>
+          <a:bodyPr lIns="0" rIns="0" tIns="0" bIns="0"/>
+          <a:p>
+            <a:endParaRPr/>
+          </a:p>
+        </p:txBody>
+      </p:sp>
+      <p:sp>
+        <p:nvSpPr>
+          <p:cNvPr id="105" name="PlaceHolder 3"/>
+          <p:cNvSpPr>
+            <a:spLocks noGrp="1"/>
+          </p:cNvSpPr>
+          <p:nvPr>
+            <p:ph type="body"/>
+          </p:nvPr>
+        </p:nvSpPr>
+        <p:spPr>
+          <a:xfrm>
+            <a:off x="457200" y="1200240"/>
+            <a:ext cx="8228880" cy="3724920"/>
+          </a:xfrm>
+          <a:prstGeom prst="rect">
+            <a:avLst/>
+          </a:prstGeom>
+        </p:spPr>
+        <p:txBody>
+          <a:bodyPr lIns="0" rIns="0" tIns="0" bIns="0"/>
+          <a:p>
+            <a:endParaRPr/>
+          </a:p>
+        </p:txBody>
+      </p:sp>
+      <p:pic>
+        <p:nvPicPr>
+          <p:cNvPr id="106" name="" descr=""/>
+          <p:cNvPicPr/>
+          <p:nvPr/>
+        </p:nvPicPr>
+        <p:blipFill>
+          <a:blip r:embed="rId2"/>
+          <a:stretch/>
+        </p:blipFill>
+        <p:spPr>
+          <a:xfrm>
+            <a:off x="2237400" y="1199880"/>
+            <a:ext cx="4668480" cy="3724920"/>
+          </a:xfrm>
+          <a:prstGeom prst="rect">
+            <a:avLst/>
+          </a:prstGeom>
+          <a:ln>
+            <a:noFill/>
+          </a:ln>
+        </p:spPr>
+      </p:pic>
+      <p:pic>
+        <p:nvPicPr>
+          <p:cNvPr id="107" name="" descr=""/>
+          <p:cNvPicPr/>
+          <p:nvPr/>
+        </p:nvPicPr>
+        <p:blipFill>
+          <a:blip r:embed="rId3"/>
+          <a:stretch/>
+        </p:blipFill>
+        <p:spPr>
+          <a:xfrm>
+            <a:off x="2237400" y="1199880"/>
+            <a:ext cx="4668480" cy="3724920"/>
+          </a:xfrm>
+          <a:prstGeom prst="rect">
+            <a:avLst/>
+          </a:prstGeom>
+          <a:ln>
+            <a:noFill/>
+          </a:ln>
+        </p:spPr>
+      </p:pic>
     </p:spTree>
   </p:cSld>
 </p:sldLayout>
@@ -1776,8 +2932,8 @@
         </p:nvSpPr>
         <p:spPr>
           <a:xfrm>
-            <a:off x="457200" y="205200"/>
-            <a:ext cx="8229240" cy="858600"/>
+            <a:off x="457200" y="205920"/>
+            <a:ext cx="8228880" cy="856440"/>
           </a:xfrm>
           <a:prstGeom prst="rect">
             <a:avLst/>
@@ -1803,8 +2959,8 @@
         </p:nvSpPr>
         <p:spPr>
           <a:xfrm>
-            <a:off x="457200" y="1203480"/>
-            <a:ext cx="4015800" cy="2982960"/>
+            <a:off x="457200" y="1200240"/>
+            <a:ext cx="4015440" cy="3724920"/>
           </a:xfrm>
           <a:prstGeom prst="rect">
             <a:avLst/>
@@ -1829,8 +2985,8 @@
         </p:nvSpPr>
         <p:spPr>
           <a:xfrm>
-            <a:off x="4674240" y="1203480"/>
-            <a:ext cx="4015800" cy="2982960"/>
+            <a:off x="4673880" y="1200240"/>
+            <a:ext cx="4015440" cy="3724920"/>
           </a:xfrm>
           <a:prstGeom prst="rect">
             <a:avLst/>
@@ -1877,8 +3033,8 @@
         </p:nvSpPr>
         <p:spPr>
           <a:xfrm>
-            <a:off x="457200" y="205200"/>
-            <a:ext cx="8229240" cy="858600"/>
+            <a:off x="457200" y="205920"/>
+            <a:ext cx="8228880" cy="856440"/>
           </a:xfrm>
           <a:prstGeom prst="rect">
             <a:avLst/>
@@ -1926,8 +3082,8 @@
         </p:nvSpPr>
         <p:spPr>
           <a:xfrm>
-            <a:off x="457200" y="205200"/>
-            <a:ext cx="8229240" cy="3981240"/>
+            <a:off x="457200" y="205920"/>
+            <a:ext cx="8228880" cy="3971160"/>
           </a:xfrm>
           <a:prstGeom prst="rect">
             <a:avLst/>
@@ -1975,8 +3131,8 @@
         </p:nvSpPr>
         <p:spPr>
           <a:xfrm>
-            <a:off x="457200" y="205200"/>
-            <a:ext cx="8229240" cy="858600"/>
+            <a:off x="457200" y="205920"/>
+            <a:ext cx="8228880" cy="856440"/>
           </a:xfrm>
           <a:prstGeom prst="rect">
             <a:avLst/>
@@ -2002,8 +3158,8 @@
         </p:nvSpPr>
         <p:spPr>
           <a:xfrm>
-            <a:off x="457200" y="1203480"/>
-            <a:ext cx="4015800" cy="1422720"/>
+            <a:off x="457200" y="1200240"/>
+            <a:ext cx="4015440" cy="1776600"/>
           </a:xfrm>
           <a:prstGeom prst="rect">
             <a:avLst/>
@@ -2028,8 +3184,8 @@
         </p:nvSpPr>
         <p:spPr>
           <a:xfrm>
-            <a:off x="457200" y="2761920"/>
-            <a:ext cx="4015800" cy="1422720"/>
+            <a:off x="457200" y="3146040"/>
+            <a:ext cx="4015440" cy="1776600"/>
           </a:xfrm>
           <a:prstGeom prst="rect">
             <a:avLst/>
@@ -2054,8 +3210,8 @@
         </p:nvSpPr>
         <p:spPr>
           <a:xfrm>
-            <a:off x="4674240" y="1203480"/>
-            <a:ext cx="4015800" cy="2982960"/>
+            <a:off x="4673880" y="1200240"/>
+            <a:ext cx="4015440" cy="3724920"/>
           </a:xfrm>
           <a:prstGeom prst="rect">
             <a:avLst/>
@@ -2102,8 +3258,8 @@
         </p:nvSpPr>
         <p:spPr>
           <a:xfrm>
-            <a:off x="457200" y="205200"/>
-            <a:ext cx="8229240" cy="858600"/>
+            <a:off x="457200" y="205920"/>
+            <a:ext cx="8228880" cy="856440"/>
           </a:xfrm>
           <a:prstGeom prst="rect">
             <a:avLst/>
@@ -2129,8 +3285,8 @@
         </p:nvSpPr>
         <p:spPr>
           <a:xfrm>
-            <a:off x="457200" y="1203480"/>
-            <a:ext cx="4015800" cy="2982960"/>
+            <a:off x="457200" y="1200240"/>
+            <a:ext cx="4015440" cy="3724920"/>
           </a:xfrm>
           <a:prstGeom prst="rect">
             <a:avLst/>
@@ -2155,8 +3311,8 @@
         </p:nvSpPr>
         <p:spPr>
           <a:xfrm>
-            <a:off x="4674240" y="1203480"/>
-            <a:ext cx="4015800" cy="1422720"/>
+            <a:off x="4673880" y="1200240"/>
+            <a:ext cx="4015440" cy="1776600"/>
           </a:xfrm>
           <a:prstGeom prst="rect">
             <a:avLst/>
@@ -2181,8 +3337,8 @@
         </p:nvSpPr>
         <p:spPr>
           <a:xfrm>
-            <a:off x="4674240" y="2761920"/>
-            <a:ext cx="4015800" cy="1422720"/>
+            <a:off x="4673880" y="3146040"/>
+            <a:ext cx="4015440" cy="1776600"/>
           </a:xfrm>
           <a:prstGeom prst="rect">
             <a:avLst/>
@@ -2229,8 +3385,8 @@
         </p:nvSpPr>
         <p:spPr>
           <a:xfrm>
-            <a:off x="457200" y="205200"/>
-            <a:ext cx="8229240" cy="858600"/>
+            <a:off x="457200" y="205920"/>
+            <a:ext cx="8228880" cy="856440"/>
           </a:xfrm>
           <a:prstGeom prst="rect">
             <a:avLst/>
@@ -2256,8 +3412,8 @@
         </p:nvSpPr>
         <p:spPr>
           <a:xfrm>
-            <a:off x="457200" y="1203480"/>
-            <a:ext cx="4015800" cy="1422720"/>
+            <a:off x="457200" y="1200240"/>
+            <a:ext cx="4015440" cy="1776600"/>
           </a:xfrm>
           <a:prstGeom prst="rect">
             <a:avLst/>
@@ -2282,8 +3438,8 @@
         </p:nvSpPr>
         <p:spPr>
           <a:xfrm>
-            <a:off x="4674240" y="1203480"/>
-            <a:ext cx="4015800" cy="1422720"/>
+            <a:off x="4673880" y="1200240"/>
+            <a:ext cx="4015440" cy="1776600"/>
           </a:xfrm>
           <a:prstGeom prst="rect">
             <a:avLst/>
@@ -2308,8 +3464,8 @@
         </p:nvSpPr>
         <p:spPr>
           <a:xfrm>
-            <a:off x="457200" y="2761920"/>
-            <a:ext cx="8229240" cy="1422720"/>
+            <a:off x="457200" y="3146040"/>
+            <a:ext cx="8228880" cy="1776600"/>
           </a:xfrm>
           <a:prstGeom prst="rect">
             <a:avLst/>
@@ -2765,6 +3921,219 @@
 </p:sldMaster>
 </file>
 
+<file path=ppt/slideMasters/slideMaster3.xml><?xml version="1.0" encoding="utf-8"?>
+<p:sldMaster xmlns:a="http://schemas.openxmlformats.org/drawingml/2006/main" xmlns:p="http://schemas.openxmlformats.org/presentationml/2006/main" xmlns:r="http://schemas.openxmlformats.org/officeDocument/2006/relationships">
+  <p:cSld>
+    <p:bg>
+      <p:bgPr>
+        <a:solidFill>
+          <a:srgbClr val="ffffff"/>
+        </a:solidFill>
+      </p:bgPr>
+    </p:bg>
+    <p:spTree>
+      <p:nvGrpSpPr>
+        <p:cNvPr id="1" name=""/>
+        <p:cNvGrpSpPr/>
+        <p:nvPr/>
+      </p:nvGrpSpPr>
+      <p:grpSpPr>
+        <a:xfrm>
+          <a:off x="0" y="0"/>
+          <a:ext cx="0" cy="0"/>
+          <a:chOff x="0" y="0"/>
+          <a:chExt cx="0" cy="0"/>
+        </a:xfrm>
+      </p:grpSpPr>
+      <p:sp>
+        <p:nvSpPr>
+          <p:cNvPr id="72" name="PlaceHolder 1"/>
+          <p:cNvSpPr>
+            <a:spLocks noGrp="1"/>
+          </p:cNvSpPr>
+          <p:nvPr>
+            <p:ph type="title"/>
+          </p:nvPr>
+        </p:nvSpPr>
+        <p:spPr>
+          <a:xfrm>
+            <a:off x="457200" y="205920"/>
+            <a:ext cx="8228880" cy="856440"/>
+          </a:xfrm>
+          <a:prstGeom prst="rect">
+            <a:avLst/>
+          </a:prstGeom>
+        </p:spPr>
+        <p:txBody>
+          <a:bodyPr lIns="0" rIns="0" tIns="0" bIns="0" anchor="ctr"/>
+          <a:p>
+            <a:pPr algn="ctr"/>
+            <a:endParaRPr/>
+          </a:p>
+        </p:txBody>
+      </p:sp>
+      <p:sp>
+        <p:nvSpPr>
+          <p:cNvPr id="73" name="PlaceHolder 2"/>
+          <p:cNvSpPr>
+            <a:spLocks noGrp="1"/>
+          </p:cNvSpPr>
+          <p:nvPr>
+            <p:ph type="body"/>
+          </p:nvPr>
+        </p:nvSpPr>
+        <p:spPr>
+          <a:xfrm>
+            <a:off x="457200" y="1200240"/>
+            <a:ext cx="8228880" cy="3724920"/>
+          </a:xfrm>
+          <a:prstGeom prst="rect">
+            <a:avLst/>
+          </a:prstGeom>
+        </p:spPr>
+        <p:txBody>
+          <a:bodyPr lIns="0" rIns="0" tIns="0" bIns="0"/>
+          <a:p>
+            <a:pPr marL="432000" indent="-324000">
+              <a:buClr>
+                <a:srgbClr val="ffffff"/>
+              </a:buClr>
+              <a:buSzPct val="45000"/>
+              <a:buFont typeface="StarSymbol"/>
+              <a:buChar char=""/>
+            </a:pPr>
+            <a:r>
+              <a:rPr lang="en-AU" sz="1800" spc="-1">
+                <a:latin typeface="Arial"/>
+              </a:rPr>
+              <a:t>Click to edit the outline text format</a:t>
+            </a:r>
+            <a:endParaRPr/>
+          </a:p>
+          <a:p>
+            <a:pPr lvl="1" marL="864000" indent="-324000">
+              <a:buClr>
+                <a:srgbClr val="ffffff"/>
+              </a:buClr>
+              <a:buSzPct val="75000"/>
+              <a:buFont typeface="StarSymbol"/>
+              <a:buChar char=""/>
+            </a:pPr>
+            <a:r>
+              <a:rPr lang="en-AU" sz="1800" spc="-1">
+                <a:latin typeface="Arial"/>
+              </a:rPr>
+              <a:t>Second Outline Level</a:t>
+            </a:r>
+            <a:endParaRPr/>
+          </a:p>
+          <a:p>
+            <a:pPr lvl="2" marL="1296000" indent="-288000">
+              <a:buClr>
+                <a:srgbClr val="ffffff"/>
+              </a:buClr>
+              <a:buSzPct val="45000"/>
+              <a:buFont typeface="StarSymbol"/>
+              <a:buChar char=""/>
+            </a:pPr>
+            <a:r>
+              <a:rPr lang="en-AU" sz="1800" spc="-1">
+                <a:latin typeface="Arial"/>
+              </a:rPr>
+              <a:t>Third Outline Level</a:t>
+            </a:r>
+            <a:endParaRPr/>
+          </a:p>
+          <a:p>
+            <a:pPr lvl="3" marL="1728000" indent="-216000">
+              <a:buClr>
+                <a:srgbClr val="ffffff"/>
+              </a:buClr>
+              <a:buSzPct val="75000"/>
+              <a:buFont typeface="StarSymbol"/>
+              <a:buChar char=""/>
+            </a:pPr>
+            <a:r>
+              <a:rPr lang="en-AU" sz="1800" spc="-1">
+                <a:latin typeface="Arial"/>
+              </a:rPr>
+              <a:t>Fourth Outline Level</a:t>
+            </a:r>
+            <a:endParaRPr/>
+          </a:p>
+          <a:p>
+            <a:pPr lvl="4" marL="2160000" indent="-216000">
+              <a:buClr>
+                <a:srgbClr val="ffffff"/>
+              </a:buClr>
+              <a:buSzPct val="45000"/>
+              <a:buFont typeface="StarSymbol"/>
+              <a:buChar char=""/>
+            </a:pPr>
+            <a:r>
+              <a:rPr lang="en-AU" sz="1800" spc="-1">
+                <a:latin typeface="Arial"/>
+              </a:rPr>
+              <a:t>Fifth Outline Level</a:t>
+            </a:r>
+            <a:endParaRPr/>
+          </a:p>
+          <a:p>
+            <a:pPr lvl="5" marL="2592000" indent="-216000">
+              <a:buClr>
+                <a:srgbClr val="ffffff"/>
+              </a:buClr>
+              <a:buSzPct val="45000"/>
+              <a:buFont typeface="StarSymbol"/>
+              <a:buChar char=""/>
+            </a:pPr>
+            <a:r>
+              <a:rPr lang="en-AU" sz="1800" spc="-1">
+                <a:latin typeface="Arial"/>
+              </a:rPr>
+              <a:t>Sixth Outline Level</a:t>
+            </a:r>
+            <a:endParaRPr/>
+          </a:p>
+          <a:p>
+            <a:pPr lvl="6" marL="3024000" indent="-216000">
+              <a:buClr>
+                <a:srgbClr val="ffffff"/>
+              </a:buClr>
+              <a:buSzPct val="45000"/>
+              <a:buFont typeface="StarSymbol"/>
+              <a:buChar char=""/>
+            </a:pPr>
+            <a:r>
+              <a:rPr lang="en-AU" sz="1800" spc="-1">
+                <a:latin typeface="Arial"/>
+              </a:rPr>
+              <a:t>Seventh Outline Level</a:t>
+            </a:r>
+            <a:endParaRPr/>
+          </a:p>
+        </p:txBody>
+      </p:sp>
+    </p:spTree>
+  </p:cSld>
+  <p:clrMap bg1="lt1" bg2="lt2" tx1="dk1" tx2="dk2" accent1="accent1" accent2="accent2" accent3="accent3" accent4="accent4" accent5="accent5" accent6="accent6" hlink="hlink" folHlink="folHlink"/>
+  <p:sldLayoutIdLst>
+    <p:sldLayoutId id="2147483675" r:id="rId2"/>
+    <p:sldLayoutId id="2147483676" r:id="rId3"/>
+    <p:sldLayoutId id="2147483677" r:id="rId4"/>
+    <p:sldLayoutId id="2147483678" r:id="rId5"/>
+    <p:sldLayoutId id="2147483679" r:id="rId6"/>
+    <p:sldLayoutId id="2147483680" r:id="rId7"/>
+    <p:sldLayoutId id="2147483681" r:id="rId8"/>
+    <p:sldLayoutId id="2147483682" r:id="rId9"/>
+    <p:sldLayoutId id="2147483683" r:id="rId10"/>
+    <p:sldLayoutId id="2147483684" r:id="rId11"/>
+    <p:sldLayoutId id="2147483685" r:id="rId12"/>
+    <p:sldLayoutId id="2147483686" r:id="rId13"/>
+  </p:sldLayoutIdLst>
+</p:sldMaster>
+</file>
+
 <file path=ppt/slides/slide1.xml><?xml version="1.0" encoding="utf-8"?>
 <p:sld xmlns:a="http://schemas.openxmlformats.org/drawingml/2006/main" xmlns:p="http://schemas.openxmlformats.org/presentationml/2006/main" xmlns:r="http://schemas.openxmlformats.org/officeDocument/2006/relationships">
   <p:cSld>
@@ -2784,14 +4153,14 @@
       </p:grpSpPr>
       <p:sp>
         <p:nvSpPr>
-          <p:cNvPr id="72" name="CustomShape 1"/>
+          <p:cNvPr id="108" name="CustomShape 1"/>
           <p:cNvSpPr/>
           <p:nvPr/>
         </p:nvSpPr>
         <p:spPr>
           <a:xfrm>
             <a:off x="685800" y="818280"/>
-            <a:ext cx="7770960" cy="1923480"/>
+            <a:ext cx="7770600" cy="1923120"/>
           </a:xfrm>
           <a:prstGeom prst="rect">
             <a:avLst/>
@@ -2836,14 +4205,14 @@
       </p:sp>
       <p:sp>
         <p:nvSpPr>
-          <p:cNvPr id="73" name="CustomShape 2"/>
+          <p:cNvPr id="109" name="CustomShape 2"/>
           <p:cNvSpPr/>
           <p:nvPr/>
         </p:nvSpPr>
         <p:spPr>
           <a:xfrm>
             <a:off x="685800" y="2840040"/>
-            <a:ext cx="7770960" cy="783360"/>
+            <a:ext cx="7770600" cy="783000"/>
           </a:xfrm>
           <a:prstGeom prst="rect">
             <a:avLst/>
@@ -2937,14 +4306,14 @@
       </p:grpSpPr>
       <p:sp>
         <p:nvSpPr>
-          <p:cNvPr id="74" name="CustomShape 1"/>
+          <p:cNvPr id="110" name="CustomShape 1"/>
           <p:cNvSpPr/>
           <p:nvPr/>
         </p:nvSpPr>
         <p:spPr>
           <a:xfrm>
             <a:off x="457200" y="205920"/>
-            <a:ext cx="8228160" cy="856080"/>
+            <a:ext cx="8227800" cy="855720"/>
           </a:xfrm>
           <a:prstGeom prst="rect">
             <a:avLst/>
@@ -2989,14 +4358,14 @@
       </p:sp>
       <p:sp>
         <p:nvSpPr>
-          <p:cNvPr id="75" name="CustomShape 2"/>
+          <p:cNvPr id="111" name="CustomShape 2"/>
           <p:cNvSpPr/>
           <p:nvPr/>
         </p:nvSpPr>
         <p:spPr>
           <a:xfrm>
             <a:off x="457200" y="1200240"/>
-            <a:ext cx="8228160" cy="3724200"/>
+            <a:ext cx="8227800" cy="3723840"/>
           </a:xfrm>
           <a:prstGeom prst="rect">
             <a:avLst/>
@@ -3038,7 +4407,7 @@
             <a:endParaRPr/>
           </a:p>
           <a:p>
-            <a:pPr marL="216000" indent="-216000">
+            <a:pPr marL="216000" indent="-215640">
               <a:lnSpc>
                 <a:spcPct val="100000"/>
               </a:lnSpc>
@@ -3078,7 +4447,7 @@
             <a:endParaRPr/>
           </a:p>
           <a:p>
-            <a:pPr marL="216000" indent="-216000">
+            <a:pPr marL="216000" indent="-215640">
               <a:lnSpc>
                 <a:spcPct val="100000"/>
               </a:lnSpc>
@@ -3118,7 +4487,7 @@
             <a:endParaRPr/>
           </a:p>
           <a:p>
-            <a:pPr marL="216000" indent="-216000">
+            <a:pPr marL="216000" indent="-215640">
               <a:lnSpc>
                 <a:spcPct val="100000"/>
               </a:lnSpc>
@@ -3158,7 +4527,7 @@
             <a:endParaRPr/>
           </a:p>
           <a:p>
-            <a:pPr marL="216000" indent="-216000">
+            <a:pPr marL="216000" indent="-215640">
               <a:lnSpc>
                 <a:spcPct val="100000"/>
               </a:lnSpc>
@@ -3198,7 +4567,7 @@
             <a:endParaRPr/>
           </a:p>
           <a:p>
-            <a:pPr marL="216000" indent="-216000">
+            <a:pPr marL="216000" indent="-215640">
               <a:lnSpc>
                 <a:spcPct val="100000"/>
               </a:lnSpc>
@@ -3305,14 +4674,14 @@
       </p:grpSpPr>
       <p:sp>
         <p:nvSpPr>
-          <p:cNvPr id="76" name="CustomShape 1"/>
+          <p:cNvPr id="112" name="CustomShape 1"/>
           <p:cNvSpPr/>
           <p:nvPr/>
         </p:nvSpPr>
         <p:spPr>
           <a:xfrm>
             <a:off x="457200" y="205920"/>
-            <a:ext cx="8228160" cy="856080"/>
+            <a:ext cx="8227800" cy="855720"/>
           </a:xfrm>
           <a:prstGeom prst="rect">
             <a:avLst/>
@@ -3357,14 +4726,14 @@
       </p:sp>
       <p:sp>
         <p:nvSpPr>
-          <p:cNvPr id="77" name="CustomShape 2"/>
+          <p:cNvPr id="113" name="CustomShape 2"/>
           <p:cNvSpPr/>
           <p:nvPr/>
         </p:nvSpPr>
         <p:spPr>
           <a:xfrm>
             <a:off x="457200" y="1200240"/>
-            <a:ext cx="8228160" cy="3724200"/>
+            <a:ext cx="8227800" cy="3723840"/>
           </a:xfrm>
           <a:prstGeom prst="rect">
             <a:avLst/>
@@ -3520,14 +4889,14 @@
       </p:grpSpPr>
       <p:sp>
         <p:nvSpPr>
-          <p:cNvPr id="78" name="CustomShape 1"/>
+          <p:cNvPr id="114" name="CustomShape 1"/>
           <p:cNvSpPr/>
           <p:nvPr/>
         </p:nvSpPr>
         <p:spPr>
           <a:xfrm>
             <a:off x="457200" y="205920"/>
-            <a:ext cx="8228160" cy="856080"/>
+            <a:ext cx="8227800" cy="855720"/>
           </a:xfrm>
           <a:prstGeom prst="rect">
             <a:avLst/>
@@ -3572,14 +4941,14 @@
       </p:sp>
       <p:sp>
         <p:nvSpPr>
-          <p:cNvPr id="79" name="CustomShape 2"/>
+          <p:cNvPr id="115" name="CustomShape 2"/>
           <p:cNvSpPr/>
           <p:nvPr/>
         </p:nvSpPr>
         <p:spPr>
           <a:xfrm>
             <a:off x="457200" y="1200240"/>
-            <a:ext cx="8228160" cy="3724200"/>
+            <a:ext cx="8227800" cy="3723840"/>
           </a:xfrm>
           <a:prstGeom prst="rect">
             <a:avLst/>
@@ -3621,7 +4990,7 @@
             <a:endParaRPr/>
           </a:p>
           <a:p>
-            <a:pPr marL="216000" indent="-216000">
+            <a:pPr marL="216000" indent="-215640">
               <a:lnSpc>
                 <a:spcPct val="100000"/>
               </a:lnSpc>
@@ -3649,7 +5018,7 @@
             <a:endParaRPr/>
           </a:p>
           <a:p>
-            <a:pPr marL="216000" indent="-216000">
+            <a:pPr marL="216000" indent="-215640">
               <a:lnSpc>
                 <a:spcPct val="100000"/>
               </a:lnSpc>
@@ -3677,7 +5046,7 @@
             <a:endParaRPr/>
           </a:p>
           <a:p>
-            <a:pPr marL="216000" indent="-216000">
+            <a:pPr marL="216000" indent="-215640">
               <a:lnSpc>
                 <a:spcPct val="100000"/>
               </a:lnSpc>
@@ -3720,7 +5089,7 @@
             <a:endParaRPr/>
           </a:p>
           <a:p>
-            <a:pPr marL="216000" indent="-216000">
+            <a:pPr marL="216000" indent="-215640">
               <a:lnSpc>
                 <a:spcPct val="100000"/>
               </a:lnSpc>
@@ -3815,14 +5184,14 @@
       </p:grpSpPr>
       <p:sp>
         <p:nvSpPr>
-          <p:cNvPr id="80" name="CustomShape 1"/>
+          <p:cNvPr id="116" name="CustomShape 1"/>
           <p:cNvSpPr/>
           <p:nvPr/>
         </p:nvSpPr>
         <p:spPr>
           <a:xfrm>
             <a:off x="457200" y="205920"/>
-            <a:ext cx="8228160" cy="856080"/>
+            <a:ext cx="8227800" cy="855720"/>
           </a:xfrm>
           <a:prstGeom prst="rect">
             <a:avLst/>
@@ -3867,14 +5236,14 @@
       </p:sp>
       <p:sp>
         <p:nvSpPr>
-          <p:cNvPr id="81" name="CustomShape 2"/>
+          <p:cNvPr id="117" name="CustomShape 2"/>
           <p:cNvSpPr/>
           <p:nvPr/>
         </p:nvSpPr>
         <p:spPr>
           <a:xfrm>
             <a:off x="457200" y="1200240"/>
-            <a:ext cx="8228160" cy="3724200"/>
+            <a:ext cx="8227800" cy="3723840"/>
           </a:xfrm>
           <a:prstGeom prst="rect">
             <a:avLst/>
@@ -3916,7 +5285,7 @@
             <a:endParaRPr/>
           </a:p>
           <a:p>
-            <a:pPr marL="216000" indent="-216000">
+            <a:pPr marL="216000" indent="-215640">
               <a:lnSpc>
                 <a:spcPct val="100000"/>
               </a:lnSpc>
@@ -3956,7 +5325,7 @@
             <a:endParaRPr/>
           </a:p>
           <a:p>
-            <a:pPr marL="216000" indent="-216000">
+            <a:pPr marL="216000" indent="-215640">
               <a:lnSpc>
                 <a:spcPct val="100000"/>
               </a:lnSpc>
@@ -3996,7 +5365,7 @@
             <a:endParaRPr/>
           </a:p>
           <a:p>
-            <a:pPr marL="216000" indent="-216000">
+            <a:pPr marL="216000" indent="-215640">
               <a:lnSpc>
                 <a:spcPct val="100000"/>
               </a:lnSpc>
@@ -4036,7 +5405,7 @@
             <a:endParaRPr/>
           </a:p>
           <a:p>
-            <a:pPr marL="216000" indent="-216000">
+            <a:pPr marL="216000" indent="-215640">
               <a:lnSpc>
                 <a:spcPct val="100000"/>
               </a:lnSpc>
@@ -4076,7 +5445,7 @@
             <a:endParaRPr/>
           </a:p>
           <a:p>
-            <a:pPr marL="216000" indent="-216000">
+            <a:pPr marL="216000" indent="-215640">
               <a:lnSpc>
                 <a:spcPct val="100000"/>
               </a:lnSpc>
@@ -4116,7 +5485,7 @@
             <a:endParaRPr/>
           </a:p>
           <a:p>
-            <a:pPr marL="216000" indent="-216000" algn="ctr">
+            <a:pPr marL="216000" indent="-215640" algn="ctr">
               <a:lnSpc>
                 <a:spcPct val="100000"/>
               </a:lnSpc>
@@ -4193,14 +5562,14 @@
       </p:grpSpPr>
       <p:sp>
         <p:nvSpPr>
-          <p:cNvPr id="82" name="CustomShape 1"/>
+          <p:cNvPr id="118" name="CustomShape 1"/>
           <p:cNvSpPr/>
           <p:nvPr/>
         </p:nvSpPr>
         <p:spPr>
           <a:xfrm>
             <a:off x="457200" y="205920"/>
-            <a:ext cx="8228160" cy="856080"/>
+            <a:ext cx="8227800" cy="855720"/>
           </a:xfrm>
           <a:prstGeom prst="rect">
             <a:avLst/>
@@ -4245,14 +5614,14 @@
       </p:sp>
       <p:sp>
         <p:nvSpPr>
-          <p:cNvPr id="83" name="CustomShape 2"/>
+          <p:cNvPr id="119" name="CustomShape 2"/>
           <p:cNvSpPr/>
           <p:nvPr/>
         </p:nvSpPr>
         <p:spPr>
           <a:xfrm>
             <a:off x="457200" y="1200240"/>
-            <a:ext cx="8228160" cy="3724200"/>
+            <a:ext cx="8227800" cy="3723840"/>
           </a:xfrm>
           <a:prstGeom prst="rect">
             <a:avLst/>
@@ -4294,7 +5663,7 @@
             <a:endParaRPr/>
           </a:p>
           <a:p>
-            <a:pPr marL="216000" indent="-216000">
+            <a:pPr marL="216000" indent="-215640">
               <a:lnSpc>
                 <a:spcPct val="100000"/>
               </a:lnSpc>
@@ -4319,7 +5688,7 @@
             <a:endParaRPr/>
           </a:p>
           <a:p>
-            <a:pPr marL="216000" indent="-216000">
+            <a:pPr marL="216000" indent="-215640">
               <a:lnSpc>
                 <a:spcPct val="100000"/>
               </a:lnSpc>
@@ -4344,7 +5713,7 @@
             <a:endParaRPr/>
           </a:p>
           <a:p>
-            <a:pPr marL="216000" indent="-216000">
+            <a:pPr marL="216000" indent="-215640">
               <a:lnSpc>
                 <a:spcPct val="100000"/>
               </a:lnSpc>
@@ -4369,7 +5738,7 @@
             <a:endParaRPr/>
           </a:p>
           <a:p>
-            <a:pPr marL="216000" indent="-216000">
+            <a:pPr marL="216000" indent="-215640">
               <a:lnSpc>
                 <a:spcPct val="100000"/>
               </a:lnSpc>
@@ -4446,14 +5815,14 @@
       </p:grpSpPr>
       <p:sp>
         <p:nvSpPr>
-          <p:cNvPr id="84" name="CustomShape 1"/>
+          <p:cNvPr id="120" name="CustomShape 1"/>
           <p:cNvSpPr/>
           <p:nvPr/>
         </p:nvSpPr>
         <p:spPr>
           <a:xfrm>
             <a:off x="457200" y="205920"/>
-            <a:ext cx="8228160" cy="856080"/>
+            <a:ext cx="8227800" cy="855720"/>
           </a:xfrm>
           <a:prstGeom prst="rect">
             <a:avLst/>
@@ -4498,14 +5867,14 @@
       </p:sp>
       <p:sp>
         <p:nvSpPr>
-          <p:cNvPr id="85" name="CustomShape 2"/>
+          <p:cNvPr id="121" name="CustomShape 2"/>
           <p:cNvSpPr/>
           <p:nvPr/>
         </p:nvSpPr>
         <p:spPr>
           <a:xfrm>
             <a:off x="457200" y="1200240"/>
-            <a:ext cx="8228160" cy="3724200"/>
+            <a:ext cx="8227800" cy="3723840"/>
           </a:xfrm>
           <a:prstGeom prst="rect">
             <a:avLst/>
@@ -4547,7 +5916,7 @@
             <a:endParaRPr/>
           </a:p>
           <a:p>
-            <a:pPr marL="216000" indent="-216000">
+            <a:pPr marL="216000" indent="-215640">
               <a:lnSpc>
                 <a:spcPct val="100000"/>
               </a:lnSpc>
@@ -4572,7 +5941,7 @@
             <a:endParaRPr/>
           </a:p>
           <a:p>
-            <a:pPr marL="216000" indent="-216000">
+            <a:pPr marL="216000" indent="-215640">
               <a:lnSpc>
                 <a:spcPct val="100000"/>
               </a:lnSpc>
@@ -4597,7 +5966,7 @@
             <a:endParaRPr/>
           </a:p>
           <a:p>
-            <a:pPr marL="216000" indent="-216000">
+            <a:pPr marL="216000" indent="-215640">
               <a:lnSpc>
                 <a:spcPct val="100000"/>
               </a:lnSpc>
@@ -4622,7 +5991,7 @@
             <a:endParaRPr/>
           </a:p>
           <a:p>
-            <a:pPr marL="216000" indent="-216000">
+            <a:pPr marL="216000" indent="-215640">
               <a:lnSpc>
                 <a:spcPct val="100000"/>
               </a:lnSpc>
@@ -4647,7 +6016,7 @@
             <a:endParaRPr/>
           </a:p>
           <a:p>
-            <a:pPr marL="216000" indent="-216000">
+            <a:pPr marL="216000" indent="-215640">
               <a:lnSpc>
                 <a:spcPct val="100000"/>
               </a:lnSpc>
@@ -4682,6 +6051,367 @@
           <p:childTnLst>
             <p:seq>
               <p:cTn id="14" nodeType="mainSeq"/>
+              <p:prevCondLst>
+                <p:cond delay="0" evt="onPrev">
+                  <p:tgtEl>
+                    <p:sldTgt/>
+                  </p:tgtEl>
+                </p:cond>
+              </p:prevCondLst>
+              <p:nextCondLst>
+                <p:cond delay="0" evt="onNext">
+                  <p:tgtEl>
+                    <p:sldTgt/>
+                  </p:tgtEl>
+                </p:cond>
+              </p:nextCondLst>
+            </p:seq>
+          </p:childTnLst>
+        </p:cTn>
+      </p:par>
+    </p:tnLst>
+  </p:timing>
+</p:sld>
+</file>
+
+<file path=ppt/slides/slide8.xml><?xml version="1.0" encoding="utf-8"?>
+<p:sld xmlns:a="http://schemas.openxmlformats.org/drawingml/2006/main" xmlns:p="http://schemas.openxmlformats.org/presentationml/2006/main" xmlns:r="http://schemas.openxmlformats.org/officeDocument/2006/relationships">
+  <p:cSld>
+    <p:spTree>
+      <p:nvGrpSpPr>
+        <p:cNvPr id="1" name=""/>
+        <p:cNvGrpSpPr/>
+        <p:nvPr/>
+      </p:nvGrpSpPr>
+      <p:grpSpPr>
+        <a:xfrm>
+          <a:off x="0" y="0"/>
+          <a:ext cx="0" cy="0"/>
+          <a:chOff x="0" y="0"/>
+          <a:chExt cx="0" cy="0"/>
+        </a:xfrm>
+      </p:grpSpPr>
+      <p:sp>
+        <p:nvSpPr>
+          <p:cNvPr id="122" name="CustomShape 1"/>
+          <p:cNvSpPr/>
+          <p:nvPr/>
+        </p:nvSpPr>
+        <p:spPr>
+          <a:xfrm>
+            <a:off x="457200" y="205920"/>
+            <a:ext cx="8228880" cy="856800"/>
+          </a:xfrm>
+          <a:prstGeom prst="rect">
+            <a:avLst/>
+          </a:prstGeom>
+          <a:noFill/>
+          <a:ln>
+            <a:noFill/>
+          </a:ln>
+        </p:spPr>
+        <p:style>
+          <a:lnRef idx="0"/>
+          <a:fillRef idx="0"/>
+          <a:effectRef idx="0"/>
+          <a:fontRef idx="minor"/>
+        </p:style>
+        <p:txBody>
+          <a:bodyPr lIns="90000" rIns="90000" tIns="91440" bIns="91440" anchor="b"/>
+          <a:p>
+            <a:pPr>
+              <a:lnSpc>
+                <a:spcPct val="100000"/>
+              </a:lnSpc>
+            </a:pPr>
+            <a:r>
+              <a:rPr b="1" lang="en-AU" sz="3600" spc="-1" strike="noStrike">
+                <a:solidFill>
+                  <a:srgbClr val="000000"/>
+                </a:solidFill>
+                <a:uFill>
+                  <a:solidFill>
+                    <a:srgbClr val="ffffff"/>
+                  </a:solidFill>
+                </a:uFill>
+                <a:latin typeface="Arial"/>
+                <a:ea typeface="Arial"/>
+              </a:rPr>
+              <a:t>Question 7</a:t>
+            </a:r>
+            <a:endParaRPr/>
+          </a:p>
+        </p:txBody>
+      </p:sp>
+      <p:sp>
+        <p:nvSpPr>
+          <p:cNvPr id="123" name="CustomShape 2"/>
+          <p:cNvSpPr/>
+          <p:nvPr/>
+        </p:nvSpPr>
+        <p:spPr>
+          <a:xfrm>
+            <a:off x="457200" y="1200240"/>
+            <a:ext cx="8228880" cy="3724920"/>
+          </a:xfrm>
+          <a:prstGeom prst="rect">
+            <a:avLst/>
+          </a:prstGeom>
+          <a:noFill/>
+          <a:ln>
+            <a:noFill/>
+          </a:ln>
+        </p:spPr>
+        <p:style>
+          <a:lnRef idx="0"/>
+          <a:fillRef idx="0"/>
+          <a:effectRef idx="0"/>
+          <a:fontRef idx="minor"/>
+        </p:style>
+        <p:txBody>
+          <a:bodyPr lIns="90000" rIns="90000" tIns="91440" bIns="91440"/>
+          <a:p>
+            <a:pPr>
+              <a:lnSpc>
+                <a:spcPct val="120000"/>
+              </a:lnSpc>
+            </a:pPr>
+            <a:r>
+              <a:rPr lang="en-AU" sz="3000" spc="-1" strike="noStrike">
+                <a:solidFill>
+                  <a:srgbClr val="000000"/>
+                </a:solidFill>
+                <a:uFill>
+                  <a:solidFill>
+                    <a:srgbClr val="ffffff"/>
+                  </a:solidFill>
+                </a:uFill>
+                <a:latin typeface="Arial"/>
+                <a:ea typeface="Arial"/>
+              </a:rPr>
+              <a:t>When do I lose my IP number?</a:t>
+            </a:r>
+            <a:endParaRPr/>
+          </a:p>
+          <a:p>
+            <a:pPr marL="216000" indent="-216000">
+              <a:lnSpc>
+                <a:spcPct val="120000"/>
+              </a:lnSpc>
+              <a:buFont typeface="Arial"/>
+              <a:buAutoNum type="alphaUcPeriod"/>
+            </a:pPr>
+            <a:r>
+              <a:rPr lang="en-AU" sz="3000" spc="-1" strike="noStrike">
+                <a:solidFill>
+                  <a:srgbClr val="000000"/>
+                </a:solidFill>
+                <a:uFill>
+                  <a:solidFill>
+                    <a:srgbClr val="ffffff"/>
+                  </a:solidFill>
+                </a:uFill>
+                <a:latin typeface="Arial"/>
+                <a:ea typeface="Arial"/>
+              </a:rPr>
+              <a:t> </a:t>
+            </a:r>
+            <a:r>
+              <a:rPr lang="en-AU" sz="3000" spc="-1" strike="noStrike">
+                <a:solidFill>
+                  <a:srgbClr val="000000"/>
+                </a:solidFill>
+                <a:uFill>
+                  <a:solidFill>
+                    <a:srgbClr val="ffffff"/>
+                  </a:solidFill>
+                </a:uFill>
+                <a:latin typeface="Arial"/>
+                <a:ea typeface="Arial"/>
+              </a:rPr>
+              <a:t>When I do a soft reboot on my VM</a:t>
+            </a:r>
+            <a:endParaRPr/>
+          </a:p>
+          <a:p>
+            <a:pPr marL="216000" indent="-216000">
+              <a:lnSpc>
+                <a:spcPct val="120000"/>
+              </a:lnSpc>
+              <a:buFont typeface="Arial"/>
+              <a:buAutoNum type="alphaUcPeriod"/>
+            </a:pPr>
+            <a:r>
+              <a:rPr lang="en-AU" sz="3000" spc="-1" strike="noStrike">
+                <a:solidFill>
+                  <a:srgbClr val="000000"/>
+                </a:solidFill>
+                <a:uFill>
+                  <a:solidFill>
+                    <a:srgbClr val="ffffff"/>
+                  </a:solidFill>
+                </a:uFill>
+                <a:latin typeface="Arial"/>
+                <a:ea typeface="Arial"/>
+              </a:rPr>
+              <a:t> </a:t>
+            </a:r>
+            <a:r>
+              <a:rPr lang="en-AU" sz="3000" spc="-1" strike="noStrike">
+                <a:solidFill>
+                  <a:srgbClr val="000000"/>
+                </a:solidFill>
+                <a:uFill>
+                  <a:solidFill>
+                    <a:srgbClr val="ffffff"/>
+                  </a:solidFill>
+                </a:uFill>
+                <a:latin typeface="Arial"/>
+                <a:ea typeface="Arial"/>
+              </a:rPr>
+              <a:t>When I terminate my VM</a:t>
+            </a:r>
+            <a:endParaRPr/>
+          </a:p>
+          <a:p>
+            <a:pPr marL="216000" indent="-216000">
+              <a:lnSpc>
+                <a:spcPct val="120000"/>
+              </a:lnSpc>
+              <a:buFont typeface="Arial"/>
+              <a:buAutoNum type="alphaUcPeriod"/>
+            </a:pPr>
+            <a:r>
+              <a:rPr lang="en-AU" sz="3000" spc="-1" strike="noStrike">
+                <a:solidFill>
+                  <a:srgbClr val="000000"/>
+                </a:solidFill>
+                <a:uFill>
+                  <a:solidFill>
+                    <a:srgbClr val="ffffff"/>
+                  </a:solidFill>
+                </a:uFill>
+                <a:latin typeface="Arial"/>
+                <a:ea typeface="Arial"/>
+              </a:rPr>
+              <a:t> </a:t>
+            </a:r>
+            <a:r>
+              <a:rPr lang="en-AU" sz="3000" spc="-1" strike="noStrike">
+                <a:solidFill>
+                  <a:srgbClr val="000000"/>
+                </a:solidFill>
+                <a:uFill>
+                  <a:solidFill>
+                    <a:srgbClr val="ffffff"/>
+                  </a:solidFill>
+                </a:uFill>
+                <a:latin typeface="Arial"/>
+                <a:ea typeface="Arial"/>
+              </a:rPr>
+              <a:t>When I pause my VM</a:t>
+            </a:r>
+            <a:endParaRPr/>
+          </a:p>
+          <a:p>
+            <a:pPr marL="216000" indent="-216000">
+              <a:lnSpc>
+                <a:spcPct val="120000"/>
+              </a:lnSpc>
+              <a:buFont typeface="Arial"/>
+              <a:buAutoNum type="alphaUcPeriod"/>
+            </a:pPr>
+            <a:r>
+              <a:rPr lang="en-AU" sz="3000" spc="-1" strike="noStrike">
+                <a:solidFill>
+                  <a:srgbClr val="000000"/>
+                </a:solidFill>
+                <a:uFill>
+                  <a:solidFill>
+                    <a:srgbClr val="ffffff"/>
+                  </a:solidFill>
+                </a:uFill>
+                <a:latin typeface="Arial"/>
+                <a:ea typeface="Arial"/>
+              </a:rPr>
+              <a:t> </a:t>
+            </a:r>
+            <a:r>
+              <a:rPr lang="en-AU" sz="3000" spc="-1" strike="noStrike">
+                <a:solidFill>
+                  <a:srgbClr val="000000"/>
+                </a:solidFill>
+                <a:uFill>
+                  <a:solidFill>
+                    <a:srgbClr val="ffffff"/>
+                  </a:solidFill>
+                </a:uFill>
+                <a:latin typeface="Arial"/>
+                <a:ea typeface="Arial"/>
+              </a:rPr>
+              <a:t>When I stop my VM</a:t>
+            </a:r>
+            <a:endParaRPr/>
+          </a:p>
+          <a:p>
+            <a:pPr marL="216000" indent="-216000">
+              <a:lnSpc>
+                <a:spcPct val="115000"/>
+              </a:lnSpc>
+              <a:buFont typeface="Arial"/>
+              <a:buAutoNum type="alphaUcPeriod"/>
+            </a:pPr>
+            <a:r>
+              <a:rPr lang="en-AU" sz="3000" spc="-1" strike="noStrike">
+                <a:solidFill>
+                  <a:srgbClr val="000000"/>
+                </a:solidFill>
+                <a:uFill>
+                  <a:solidFill>
+                    <a:srgbClr val="ffffff"/>
+                  </a:solidFill>
+                </a:uFill>
+                <a:latin typeface="Arial"/>
+                <a:ea typeface="Arial"/>
+              </a:rPr>
+              <a:t> </a:t>
+            </a:r>
+            <a:r>
+              <a:rPr lang="en-AU" sz="3000" spc="-1" strike="noStrike">
+                <a:solidFill>
+                  <a:srgbClr val="000000"/>
+                </a:solidFill>
+                <a:uFill>
+                  <a:solidFill>
+                    <a:srgbClr val="ffffff"/>
+                  </a:solidFill>
+                </a:uFill>
+                <a:latin typeface="Arial"/>
+                <a:ea typeface="Arial"/>
+              </a:rPr>
+              <a:t>When I do a hard reboot on my VM</a:t>
+            </a:r>
+            <a:endParaRPr/>
+          </a:p>
+          <a:p>
+            <a:pPr>
+              <a:lnSpc>
+                <a:spcPct val="100000"/>
+              </a:lnSpc>
+            </a:pPr>
+            <a:endParaRPr/>
+          </a:p>
+        </p:txBody>
+      </p:sp>
+    </p:spTree>
+  </p:cSld>
+  <p:timing>
+    <p:tnLst>
+      <p:par>
+        <p:cTn id="15" dur="indefinite" restart="never" nodeType="tmRoot">
+          <p:childTnLst>
+            <p:seq>
+              <p:cTn id="16" nodeType="mainSeq"/>
               <p:prevCondLst>
                 <p:cond delay="0" evt="onPrev">
                   <p:tgtEl>
@@ -5149,4 +6879,227 @@
     </a:fmtScheme>
   </a:themeElements>
 </a:theme>
+</file>
+
+<file path=ppt/theme/theme3.xml><?xml version="1.0" encoding="utf-8"?>
+<a:theme xmlns:a="http://schemas.openxmlformats.org/drawingml/2006/main" name="Office Theme">
+  <a:themeElements>
+    <a:clrScheme name="Office">
+      <a:dk1>
+        <a:sysClr val="windowText" lastClr="000000"/>
+      </a:dk1>
+      <a:lt1>
+        <a:sysClr val="window" lastClr="FFFFFF"/>
+      </a:lt1>
+      <a:dk2>
+        <a:srgbClr val="1F497D"/>
+      </a:dk2>
+      <a:lt2>
+        <a:srgbClr val="EEECE1"/>
+      </a:lt2>
+      <a:accent1>
+        <a:srgbClr val="4F81BD"/>
+      </a:accent1>
+      <a:accent2>
+        <a:srgbClr val="C0504D"/>
+      </a:accent2>
+      <a:accent3>
+        <a:srgbClr val="9BBB59"/>
+      </a:accent3>
+      <a:accent4>
+        <a:srgbClr val="8064A2"/>
+      </a:accent4>
+      <a:accent5>
+        <a:srgbClr val="4BACC6"/>
+      </a:accent5>
+      <a:accent6>
+        <a:srgbClr val="F79646"/>
+      </a:accent6>
+      <a:hlink>
+        <a:srgbClr val="0000FF"/>
+      </a:hlink>
+      <a:folHlink>
+        <a:srgbClr val="800080"/>
+      </a:folHlink>
+    </a:clrScheme>
+    <a:fontScheme name="Office">
+      <a:majorFont>
+        <a:latin typeface="Arial"/>
+        <a:ea typeface="DejaVu Sans"/>
+        <a:cs typeface="DejaVu Sans"/>
+      </a:majorFont>
+      <a:minorFont>
+        <a:latin typeface="Arial"/>
+        <a:ea typeface="DejaVu Sans"/>
+        <a:cs typeface="DejaVu Sans"/>
+      </a:minorFont>
+    </a:fontScheme>
+    <a:fmtScheme name="Office">
+      <a:fillStyleLst>
+        <a:solidFill>
+          <a:schemeClr val="phClr"/>
+        </a:solidFill>
+        <a:gradFill rotWithShape="1">
+          <a:gsLst>
+            <a:gs pos="0">
+              <a:schemeClr val="phClr">
+                <a:tint val="50000"/>
+                <a:satMod val="300000"/>
+              </a:schemeClr>
+            </a:gs>
+            <a:gs pos="35000">
+              <a:schemeClr val="phClr">
+                <a:tint val="37000"/>
+                <a:satMod val="300000"/>
+              </a:schemeClr>
+            </a:gs>
+            <a:gs pos="100000">
+              <a:schemeClr val="phClr">
+                <a:tint val="15000"/>
+                <a:satMod val="350000"/>
+              </a:schemeClr>
+            </a:gs>
+          </a:gsLst>
+          <a:lin ang="16200000" scaled="1"/>
+        </a:gradFill>
+        <a:gradFill rotWithShape="1">
+          <a:gsLst>
+            <a:gs pos="0">
+              <a:schemeClr val="phClr">
+                <a:shade val="51000"/>
+                <a:satMod val="130000"/>
+              </a:schemeClr>
+            </a:gs>
+            <a:gs pos="80000">
+              <a:schemeClr val="phClr">
+                <a:shade val="93000"/>
+                <a:satMod val="130000"/>
+              </a:schemeClr>
+            </a:gs>
+            <a:gs pos="100000">
+              <a:schemeClr val="phClr">
+                <a:shade val="94000"/>
+                <a:satMod val="135000"/>
+              </a:schemeClr>
+            </a:gs>
+          </a:gsLst>
+          <a:lin ang="16200000" scaled="0"/>
+        </a:gradFill>
+      </a:fillStyleLst>
+      <a:lnStyleLst>
+        <a:ln w="9525" cap="flat" cmpd="sng" algn="ctr">
+          <a:solidFill>
+            <a:schemeClr val="phClr">
+              <a:shade val="95000"/>
+              <a:satMod val="105000"/>
+            </a:schemeClr>
+          </a:solidFill>
+          <a:prstDash val="solid"/>
+        </a:ln>
+        <a:ln w="25400" cap="flat" cmpd="sng" algn="ctr">
+          <a:solidFill>
+            <a:schemeClr val="phClr"/>
+          </a:solidFill>
+          <a:prstDash val="solid"/>
+        </a:ln>
+        <a:ln w="38100" cap="flat" cmpd="sng" algn="ctr">
+          <a:solidFill>
+            <a:schemeClr val="phClr"/>
+          </a:solidFill>
+          <a:prstDash val="solid"/>
+        </a:ln>
+      </a:lnStyleLst>
+      <a:effectStyleLst>
+        <a:effectStyle>
+          <a:effectLst>
+            <a:outerShdw blurRad="40000" dist="20000" dir="5400000" rotWithShape="0">
+              <a:srgbClr val="000000">
+                <a:alpha val="38000"/>
+              </a:srgbClr>
+            </a:outerShdw>
+          </a:effectLst>
+        </a:effectStyle>
+        <a:effectStyle>
+          <a:effectLst>
+            <a:outerShdw blurRad="40000" dist="23000" dir="5400000" rotWithShape="0">
+              <a:srgbClr val="000000">
+                <a:alpha val="35000"/>
+              </a:srgbClr>
+            </a:outerShdw>
+          </a:effectLst>
+        </a:effectStyle>
+        <a:effectStyle>
+          <a:effectLst>
+            <a:outerShdw blurRad="40000" dist="23000" dir="5400000" rotWithShape="0">
+              <a:srgbClr val="000000">
+                <a:alpha val="35000"/>
+              </a:srgbClr>
+            </a:outerShdw>
+          </a:effectLst>
+          <a:scene3d>
+            <a:camera prst="orthographicFront">
+              <a:rot lat="0" lon="0" rev="0"/>
+            </a:camera>
+            <a:lightRig rig="threePt" dir="t">
+              <a:rot lat="0" lon="0" rev="1200000"/>
+            </a:lightRig>
+          </a:scene3d>
+          <a:sp3d>
+            <a:bevelT w="63500" h="25400"/>
+          </a:sp3d>
+        </a:effectStyle>
+      </a:effectStyleLst>
+      <a:bgFillStyleLst>
+        <a:solidFill>
+          <a:schemeClr val="phClr"/>
+        </a:solidFill>
+        <a:gradFill rotWithShape="1">
+          <a:gsLst>
+            <a:gs pos="0">
+              <a:schemeClr val="phClr">
+                <a:tint val="40000"/>
+                <a:satMod val="350000"/>
+              </a:schemeClr>
+            </a:gs>
+            <a:gs pos="40000">
+              <a:schemeClr val="phClr">
+                <a:tint val="45000"/>
+                <a:shade val="99000"/>
+                <a:satMod val="350000"/>
+              </a:schemeClr>
+            </a:gs>
+            <a:gs pos="100000">
+              <a:schemeClr val="phClr">
+                <a:shade val="20000"/>
+                <a:satMod val="255000"/>
+              </a:schemeClr>
+            </a:gs>
+          </a:gsLst>
+          <a:path path="circle">
+            <a:fillToRect l="50000" t="-80000" r="50000" b="180000"/>
+          </a:path>
+        </a:gradFill>
+        <a:gradFill rotWithShape="1">
+          <a:gsLst>
+            <a:gs pos="0">
+              <a:schemeClr val="phClr">
+                <a:tint val="80000"/>
+                <a:satMod val="300000"/>
+              </a:schemeClr>
+            </a:gs>
+            <a:gs pos="100000">
+              <a:schemeClr val="phClr">
+                <a:shade val="30000"/>
+                <a:satMod val="200000"/>
+              </a:schemeClr>
+            </a:gs>
+          </a:gsLst>
+          <a:path path="circle">
+            <a:fillToRect l="50000" t="50000" r="50000" b="50000"/>
+          </a:path>
+        </a:gradFill>
+      </a:bgFillStyleLst>
+    </a:fmtScheme>
+  </a:themeElements>
+</a:theme>
 </file>
</xml_diff>

<commit_message>
Updated question as per feedback from walk through
</commit_message>
<xml_diff>
--- a/Lessons/Lesson_I/Lesson_I_Questions.pptx
+++ b/Lessons/Lesson_I/Lesson_I_Questions.pptx
@@ -72,8 +72,8 @@
         </p:nvSpPr>
         <p:spPr>
           <a:xfrm>
-            <a:off x="457200" y="205920"/>
-            <a:ext cx="8228880" cy="856440"/>
+            <a:off x="457200" y="205200"/>
+            <a:ext cx="8229240" cy="858600"/>
           </a:xfrm>
           <a:prstGeom prst="rect">
             <a:avLst/>
@@ -99,8 +99,8 @@
         </p:nvSpPr>
         <p:spPr>
           <a:xfrm>
-            <a:off x="457200" y="1200240"/>
-            <a:ext cx="8228880" cy="1776600"/>
+            <a:off x="457200" y="1203480"/>
+            <a:ext cx="8229240" cy="1422720"/>
           </a:xfrm>
           <a:prstGeom prst="rect">
             <a:avLst/>
@@ -125,8 +125,8 @@
         </p:nvSpPr>
         <p:spPr>
           <a:xfrm>
-            <a:off x="457200" y="3146040"/>
-            <a:ext cx="8228880" cy="1776600"/>
+            <a:off x="457200" y="2761920"/>
+            <a:ext cx="8229240" cy="1422720"/>
           </a:xfrm>
           <a:prstGeom prst="rect">
             <a:avLst/>
@@ -173,8 +173,8 @@
         </p:nvSpPr>
         <p:spPr>
           <a:xfrm>
-            <a:off x="457200" y="205920"/>
-            <a:ext cx="8228880" cy="856440"/>
+            <a:off x="457200" y="205200"/>
+            <a:ext cx="8229240" cy="858600"/>
           </a:xfrm>
           <a:prstGeom prst="rect">
             <a:avLst/>
@@ -200,8 +200,8 @@
         </p:nvSpPr>
         <p:spPr>
           <a:xfrm>
-            <a:off x="457200" y="1200240"/>
-            <a:ext cx="4015440" cy="1776600"/>
+            <a:off x="457200" y="1203480"/>
+            <a:ext cx="4015800" cy="1422720"/>
           </a:xfrm>
           <a:prstGeom prst="rect">
             <a:avLst/>
@@ -226,8 +226,8 @@
         </p:nvSpPr>
         <p:spPr>
           <a:xfrm>
-            <a:off x="4673880" y="1200240"/>
-            <a:ext cx="4015440" cy="1776600"/>
+            <a:off x="4674240" y="1203480"/>
+            <a:ext cx="4015800" cy="1422720"/>
           </a:xfrm>
           <a:prstGeom prst="rect">
             <a:avLst/>
@@ -252,8 +252,8 @@
         </p:nvSpPr>
         <p:spPr>
           <a:xfrm>
-            <a:off x="4673880" y="3146040"/>
-            <a:ext cx="4015440" cy="1776600"/>
+            <a:off x="4674240" y="2761920"/>
+            <a:ext cx="4015800" cy="1422720"/>
           </a:xfrm>
           <a:prstGeom prst="rect">
             <a:avLst/>
@@ -278,8 +278,8 @@
         </p:nvSpPr>
         <p:spPr>
           <a:xfrm>
-            <a:off x="457200" y="3146040"/>
-            <a:ext cx="4015440" cy="1776600"/>
+            <a:off x="457200" y="2761920"/>
+            <a:ext cx="4015800" cy="1422720"/>
           </a:xfrm>
           <a:prstGeom prst="rect">
             <a:avLst/>
@@ -326,8 +326,8 @@
         </p:nvSpPr>
         <p:spPr>
           <a:xfrm>
-            <a:off x="457200" y="205920"/>
-            <a:ext cx="8228880" cy="856440"/>
+            <a:off x="457200" y="205200"/>
+            <a:ext cx="8229240" cy="858600"/>
           </a:xfrm>
           <a:prstGeom prst="rect">
             <a:avLst/>
@@ -353,8 +353,8 @@
         </p:nvSpPr>
         <p:spPr>
           <a:xfrm>
-            <a:off x="457200" y="1200240"/>
-            <a:ext cx="8228880" cy="3724920"/>
+            <a:off x="457200" y="1203480"/>
+            <a:ext cx="8229240" cy="2982960"/>
           </a:xfrm>
           <a:prstGeom prst="rect">
             <a:avLst/>
@@ -379,8 +379,8 @@
         </p:nvSpPr>
         <p:spPr>
           <a:xfrm>
-            <a:off x="457200" y="1200240"/>
-            <a:ext cx="8228880" cy="3724920"/>
+            <a:off x="457200" y="1203480"/>
+            <a:ext cx="8229240" cy="2982960"/>
           </a:xfrm>
           <a:prstGeom prst="rect">
             <a:avLst/>
@@ -405,8 +405,8 @@
         </p:blipFill>
         <p:spPr>
           <a:xfrm>
-            <a:off x="2237400" y="1199880"/>
-            <a:ext cx="4668480" cy="3724920"/>
+            <a:off x="2702160" y="1203480"/>
+            <a:ext cx="3738600" cy="2982960"/>
           </a:xfrm>
           <a:prstGeom prst="rect">
             <a:avLst/>
@@ -428,8 +428,8 @@
         </p:blipFill>
         <p:spPr>
           <a:xfrm>
-            <a:off x="2237400" y="1199880"/>
-            <a:ext cx="4668480" cy="3724920"/>
+            <a:off x="2702160" y="1203480"/>
+            <a:ext cx="3738600" cy="2982960"/>
           </a:xfrm>
           <a:prstGeom prst="rect">
             <a:avLst/>
@@ -495,8 +495,8 @@
         </p:nvSpPr>
         <p:spPr>
           <a:xfrm>
-            <a:off x="457200" y="205920"/>
-            <a:ext cx="8228880" cy="856440"/>
+            <a:off x="457200" y="205200"/>
+            <a:ext cx="8229240" cy="858600"/>
           </a:xfrm>
           <a:prstGeom prst="rect">
             <a:avLst/>
@@ -522,8 +522,8 @@
         </p:nvSpPr>
         <p:spPr>
           <a:xfrm>
-            <a:off x="457200" y="1200240"/>
-            <a:ext cx="8228880" cy="3724920"/>
+            <a:off x="457200" y="1203480"/>
+            <a:ext cx="8229240" cy="2982960"/>
           </a:xfrm>
           <a:prstGeom prst="rect">
             <a:avLst/>
@@ -571,8 +571,8 @@
         </p:nvSpPr>
         <p:spPr>
           <a:xfrm>
-            <a:off x="457200" y="205920"/>
-            <a:ext cx="8228880" cy="856440"/>
+            <a:off x="457200" y="205200"/>
+            <a:ext cx="8229240" cy="858600"/>
           </a:xfrm>
           <a:prstGeom prst="rect">
             <a:avLst/>
@@ -598,8 +598,8 @@
         </p:nvSpPr>
         <p:spPr>
           <a:xfrm>
-            <a:off x="457200" y="1200240"/>
-            <a:ext cx="8228880" cy="3724920"/>
+            <a:off x="457200" y="1203480"/>
+            <a:ext cx="8229240" cy="2982960"/>
           </a:xfrm>
           <a:prstGeom prst="rect">
             <a:avLst/>
@@ -646,8 +646,8 @@
         </p:nvSpPr>
         <p:spPr>
           <a:xfrm>
-            <a:off x="457200" y="205920"/>
-            <a:ext cx="8228880" cy="856440"/>
+            <a:off x="457200" y="205200"/>
+            <a:ext cx="8229240" cy="858600"/>
           </a:xfrm>
           <a:prstGeom prst="rect">
             <a:avLst/>
@@ -673,8 +673,8 @@
         </p:nvSpPr>
         <p:spPr>
           <a:xfrm>
-            <a:off x="457200" y="1200240"/>
-            <a:ext cx="4015440" cy="3724920"/>
+            <a:off x="457200" y="1203480"/>
+            <a:ext cx="4015800" cy="2982960"/>
           </a:xfrm>
           <a:prstGeom prst="rect">
             <a:avLst/>
@@ -699,8 +699,8 @@
         </p:nvSpPr>
         <p:spPr>
           <a:xfrm>
-            <a:off x="4673880" y="1200240"/>
-            <a:ext cx="4015440" cy="3724920"/>
+            <a:off x="4674240" y="1203480"/>
+            <a:ext cx="4015800" cy="2982960"/>
           </a:xfrm>
           <a:prstGeom prst="rect">
             <a:avLst/>
@@ -747,8 +747,8 @@
         </p:nvSpPr>
         <p:spPr>
           <a:xfrm>
-            <a:off x="457200" y="205920"/>
-            <a:ext cx="8228880" cy="856440"/>
+            <a:off x="457200" y="205200"/>
+            <a:ext cx="8229240" cy="858600"/>
           </a:xfrm>
           <a:prstGeom prst="rect">
             <a:avLst/>
@@ -796,8 +796,8 @@
         </p:nvSpPr>
         <p:spPr>
           <a:xfrm>
-            <a:off x="457200" y="205920"/>
-            <a:ext cx="8228880" cy="3971160"/>
+            <a:off x="457200" y="205200"/>
+            <a:ext cx="8229240" cy="3981240"/>
           </a:xfrm>
           <a:prstGeom prst="rect">
             <a:avLst/>
@@ -845,8 +845,8 @@
         </p:nvSpPr>
         <p:spPr>
           <a:xfrm>
-            <a:off x="457200" y="205920"/>
-            <a:ext cx="8228880" cy="856440"/>
+            <a:off x="457200" y="205200"/>
+            <a:ext cx="8229240" cy="858600"/>
           </a:xfrm>
           <a:prstGeom prst="rect">
             <a:avLst/>
@@ -872,8 +872,8 @@
         </p:nvSpPr>
         <p:spPr>
           <a:xfrm>
-            <a:off x="457200" y="1200240"/>
-            <a:ext cx="4015440" cy="1776600"/>
+            <a:off x="457200" y="1203480"/>
+            <a:ext cx="4015800" cy="1422720"/>
           </a:xfrm>
           <a:prstGeom prst="rect">
             <a:avLst/>
@@ -898,8 +898,8 @@
         </p:nvSpPr>
         <p:spPr>
           <a:xfrm>
-            <a:off x="457200" y="3146040"/>
-            <a:ext cx="4015440" cy="1776600"/>
+            <a:off x="457200" y="2761920"/>
+            <a:ext cx="4015800" cy="1422720"/>
           </a:xfrm>
           <a:prstGeom prst="rect">
             <a:avLst/>
@@ -924,8 +924,8 @@
         </p:nvSpPr>
         <p:spPr>
           <a:xfrm>
-            <a:off x="4673880" y="1200240"/>
-            <a:ext cx="4015440" cy="3724920"/>
+            <a:off x="4674240" y="1203480"/>
+            <a:ext cx="4015800" cy="2982960"/>
           </a:xfrm>
           <a:prstGeom prst="rect">
             <a:avLst/>
@@ -972,8 +972,8 @@
         </p:nvSpPr>
         <p:spPr>
           <a:xfrm>
-            <a:off x="457200" y="205920"/>
-            <a:ext cx="8228880" cy="856440"/>
+            <a:off x="457200" y="205200"/>
+            <a:ext cx="8229240" cy="858600"/>
           </a:xfrm>
           <a:prstGeom prst="rect">
             <a:avLst/>
@@ -999,8 +999,8 @@
         </p:nvSpPr>
         <p:spPr>
           <a:xfrm>
-            <a:off x="457200" y="1200240"/>
-            <a:ext cx="8228880" cy="3724920"/>
+            <a:off x="457200" y="1203480"/>
+            <a:ext cx="8229240" cy="2982960"/>
           </a:xfrm>
           <a:prstGeom prst="rect">
             <a:avLst/>
@@ -1048,8 +1048,8 @@
         </p:nvSpPr>
         <p:spPr>
           <a:xfrm>
-            <a:off x="457200" y="205920"/>
-            <a:ext cx="8228880" cy="856440"/>
+            <a:off x="457200" y="205200"/>
+            <a:ext cx="8229240" cy="858600"/>
           </a:xfrm>
           <a:prstGeom prst="rect">
             <a:avLst/>
@@ -1075,8 +1075,8 @@
         </p:nvSpPr>
         <p:spPr>
           <a:xfrm>
-            <a:off x="457200" y="1200240"/>
-            <a:ext cx="4015440" cy="3724920"/>
+            <a:off x="457200" y="1203480"/>
+            <a:ext cx="4015800" cy="2982960"/>
           </a:xfrm>
           <a:prstGeom prst="rect">
             <a:avLst/>
@@ -1101,8 +1101,8 @@
         </p:nvSpPr>
         <p:spPr>
           <a:xfrm>
-            <a:off x="4673880" y="1200240"/>
-            <a:ext cx="4015440" cy="1776600"/>
+            <a:off x="4674240" y="1203480"/>
+            <a:ext cx="4015800" cy="1422720"/>
           </a:xfrm>
           <a:prstGeom prst="rect">
             <a:avLst/>
@@ -1127,8 +1127,8 @@
         </p:nvSpPr>
         <p:spPr>
           <a:xfrm>
-            <a:off x="4673880" y="3146040"/>
-            <a:ext cx="4015440" cy="1776600"/>
+            <a:off x="4674240" y="2761920"/>
+            <a:ext cx="4015800" cy="1422720"/>
           </a:xfrm>
           <a:prstGeom prst="rect">
             <a:avLst/>
@@ -1175,8 +1175,8 @@
         </p:nvSpPr>
         <p:spPr>
           <a:xfrm>
-            <a:off x="457200" y="205920"/>
-            <a:ext cx="8228880" cy="856440"/>
+            <a:off x="457200" y="205200"/>
+            <a:ext cx="8229240" cy="858600"/>
           </a:xfrm>
           <a:prstGeom prst="rect">
             <a:avLst/>
@@ -1202,8 +1202,8 @@
         </p:nvSpPr>
         <p:spPr>
           <a:xfrm>
-            <a:off x="457200" y="1200240"/>
-            <a:ext cx="4015440" cy="1776600"/>
+            <a:off x="457200" y="1203480"/>
+            <a:ext cx="4015800" cy="1422720"/>
           </a:xfrm>
           <a:prstGeom prst="rect">
             <a:avLst/>
@@ -1228,8 +1228,8 @@
         </p:nvSpPr>
         <p:spPr>
           <a:xfrm>
-            <a:off x="4673880" y="1200240"/>
-            <a:ext cx="4015440" cy="1776600"/>
+            <a:off x="4674240" y="1203480"/>
+            <a:ext cx="4015800" cy="1422720"/>
           </a:xfrm>
           <a:prstGeom prst="rect">
             <a:avLst/>
@@ -1254,8 +1254,8 @@
         </p:nvSpPr>
         <p:spPr>
           <a:xfrm>
-            <a:off x="457200" y="3146040"/>
-            <a:ext cx="8228880" cy="1776600"/>
+            <a:off x="457200" y="2761920"/>
+            <a:ext cx="8229240" cy="1422720"/>
           </a:xfrm>
           <a:prstGeom prst="rect">
             <a:avLst/>
@@ -1302,8 +1302,8 @@
         </p:nvSpPr>
         <p:spPr>
           <a:xfrm>
-            <a:off x="457200" y="205920"/>
-            <a:ext cx="8228880" cy="856440"/>
+            <a:off x="457200" y="205200"/>
+            <a:ext cx="8229240" cy="858600"/>
           </a:xfrm>
           <a:prstGeom prst="rect">
             <a:avLst/>
@@ -1329,8 +1329,8 @@
         </p:nvSpPr>
         <p:spPr>
           <a:xfrm>
-            <a:off x="457200" y="1200240"/>
-            <a:ext cx="8228880" cy="1776600"/>
+            <a:off x="457200" y="1203480"/>
+            <a:ext cx="8229240" cy="1422720"/>
           </a:xfrm>
           <a:prstGeom prst="rect">
             <a:avLst/>
@@ -1355,8 +1355,8 @@
         </p:nvSpPr>
         <p:spPr>
           <a:xfrm>
-            <a:off x="457200" y="3146040"/>
-            <a:ext cx="8228880" cy="1776600"/>
+            <a:off x="457200" y="2761920"/>
+            <a:ext cx="8229240" cy="1422720"/>
           </a:xfrm>
           <a:prstGeom prst="rect">
             <a:avLst/>
@@ -1403,8 +1403,8 @@
         </p:nvSpPr>
         <p:spPr>
           <a:xfrm>
-            <a:off x="457200" y="205920"/>
-            <a:ext cx="8228880" cy="856440"/>
+            <a:off x="457200" y="205200"/>
+            <a:ext cx="8229240" cy="858600"/>
           </a:xfrm>
           <a:prstGeom prst="rect">
             <a:avLst/>
@@ -1430,8 +1430,8 @@
         </p:nvSpPr>
         <p:spPr>
           <a:xfrm>
-            <a:off x="457200" y="1200240"/>
-            <a:ext cx="4015440" cy="1776600"/>
+            <a:off x="457200" y="1203480"/>
+            <a:ext cx="4015800" cy="1422720"/>
           </a:xfrm>
           <a:prstGeom prst="rect">
             <a:avLst/>
@@ -1456,8 +1456,8 @@
         </p:nvSpPr>
         <p:spPr>
           <a:xfrm>
-            <a:off x="4673880" y="1200240"/>
-            <a:ext cx="4015440" cy="1776600"/>
+            <a:off x="4674240" y="1203480"/>
+            <a:ext cx="4015800" cy="1422720"/>
           </a:xfrm>
           <a:prstGeom prst="rect">
             <a:avLst/>
@@ -1482,8 +1482,8 @@
         </p:nvSpPr>
         <p:spPr>
           <a:xfrm>
-            <a:off x="4673880" y="3146040"/>
-            <a:ext cx="4015440" cy="1776600"/>
+            <a:off x="4674240" y="2761920"/>
+            <a:ext cx="4015800" cy="1422720"/>
           </a:xfrm>
           <a:prstGeom prst="rect">
             <a:avLst/>
@@ -1508,8 +1508,8 @@
         </p:nvSpPr>
         <p:spPr>
           <a:xfrm>
-            <a:off x="457200" y="3146040"/>
-            <a:ext cx="4015440" cy="1776600"/>
+            <a:off x="457200" y="2761920"/>
+            <a:ext cx="4015800" cy="1422720"/>
           </a:xfrm>
           <a:prstGeom prst="rect">
             <a:avLst/>
@@ -1556,8 +1556,8 @@
         </p:nvSpPr>
         <p:spPr>
           <a:xfrm>
-            <a:off x="457200" y="205920"/>
-            <a:ext cx="8228880" cy="856440"/>
+            <a:off x="457200" y="205200"/>
+            <a:ext cx="8229240" cy="858600"/>
           </a:xfrm>
           <a:prstGeom prst="rect">
             <a:avLst/>
@@ -1583,8 +1583,8 @@
         </p:nvSpPr>
         <p:spPr>
           <a:xfrm>
-            <a:off x="457200" y="1200240"/>
-            <a:ext cx="8228880" cy="3724920"/>
+            <a:off x="457200" y="1203480"/>
+            <a:ext cx="8229240" cy="2982960"/>
           </a:xfrm>
           <a:prstGeom prst="rect">
             <a:avLst/>
@@ -1609,8 +1609,8 @@
         </p:nvSpPr>
         <p:spPr>
           <a:xfrm>
-            <a:off x="457200" y="1200240"/>
-            <a:ext cx="8228880" cy="3724920"/>
+            <a:off x="457200" y="1203480"/>
+            <a:ext cx="8229240" cy="2982960"/>
           </a:xfrm>
           <a:prstGeom prst="rect">
             <a:avLst/>
@@ -1635,8 +1635,8 @@
         </p:blipFill>
         <p:spPr>
           <a:xfrm>
-            <a:off x="2237400" y="1199880"/>
-            <a:ext cx="4668480" cy="3724920"/>
+            <a:off x="2702160" y="1203480"/>
+            <a:ext cx="3738600" cy="2982960"/>
           </a:xfrm>
           <a:prstGeom prst="rect">
             <a:avLst/>
@@ -1658,8 +1658,8 @@
         </p:blipFill>
         <p:spPr>
           <a:xfrm>
-            <a:off x="2237400" y="1199880"/>
-            <a:ext cx="4668480" cy="3724920"/>
+            <a:off x="2702160" y="1203480"/>
+            <a:ext cx="3738600" cy="2982960"/>
           </a:xfrm>
           <a:prstGeom prst="rect">
             <a:avLst/>
@@ -1725,8 +1725,8 @@
         </p:nvSpPr>
         <p:spPr>
           <a:xfrm>
-            <a:off x="457200" y="205920"/>
-            <a:ext cx="8228880" cy="856440"/>
+            <a:off x="457200" y="205200"/>
+            <a:ext cx="8229240" cy="858600"/>
           </a:xfrm>
           <a:prstGeom prst="rect">
             <a:avLst/>
@@ -1752,8 +1752,8 @@
         </p:nvSpPr>
         <p:spPr>
           <a:xfrm>
-            <a:off x="457200" y="1200240"/>
-            <a:ext cx="8228880" cy="3724920"/>
+            <a:off x="457200" y="1203480"/>
+            <a:ext cx="8229240" cy="2982960"/>
           </a:xfrm>
           <a:prstGeom prst="rect">
             <a:avLst/>
@@ -1801,8 +1801,8 @@
         </p:nvSpPr>
         <p:spPr>
           <a:xfrm>
-            <a:off x="457200" y="205920"/>
-            <a:ext cx="8228880" cy="856440"/>
+            <a:off x="457200" y="205200"/>
+            <a:ext cx="8229240" cy="858600"/>
           </a:xfrm>
           <a:prstGeom prst="rect">
             <a:avLst/>
@@ -1828,8 +1828,8 @@
         </p:nvSpPr>
         <p:spPr>
           <a:xfrm>
-            <a:off x="457200" y="1200240"/>
-            <a:ext cx="8228880" cy="3724920"/>
+            <a:off x="457200" y="1203480"/>
+            <a:ext cx="8229240" cy="2982960"/>
           </a:xfrm>
           <a:prstGeom prst="rect">
             <a:avLst/>
@@ -1876,8 +1876,8 @@
         </p:nvSpPr>
         <p:spPr>
           <a:xfrm>
-            <a:off x="457200" y="205920"/>
-            <a:ext cx="8228880" cy="856440"/>
+            <a:off x="457200" y="205200"/>
+            <a:ext cx="8229240" cy="858600"/>
           </a:xfrm>
           <a:prstGeom prst="rect">
             <a:avLst/>
@@ -1903,8 +1903,8 @@
         </p:nvSpPr>
         <p:spPr>
           <a:xfrm>
-            <a:off x="457200" y="1200240"/>
-            <a:ext cx="4015440" cy="3724920"/>
+            <a:off x="457200" y="1203480"/>
+            <a:ext cx="4015800" cy="2982960"/>
           </a:xfrm>
           <a:prstGeom prst="rect">
             <a:avLst/>
@@ -1929,8 +1929,8 @@
         </p:nvSpPr>
         <p:spPr>
           <a:xfrm>
-            <a:off x="4673880" y="1200240"/>
-            <a:ext cx="4015440" cy="3724920"/>
+            <a:off x="4674240" y="1203480"/>
+            <a:ext cx="4015800" cy="2982960"/>
           </a:xfrm>
           <a:prstGeom prst="rect">
             <a:avLst/>
@@ -1977,8 +1977,8 @@
         </p:nvSpPr>
         <p:spPr>
           <a:xfrm>
-            <a:off x="457200" y="205920"/>
-            <a:ext cx="8228880" cy="856440"/>
+            <a:off x="457200" y="205200"/>
+            <a:ext cx="8229240" cy="858600"/>
           </a:xfrm>
           <a:prstGeom prst="rect">
             <a:avLst/>
@@ -2026,8 +2026,8 @@
         </p:nvSpPr>
         <p:spPr>
           <a:xfrm>
-            <a:off x="457200" y="205920"/>
-            <a:ext cx="8228880" cy="856440"/>
+            <a:off x="457200" y="205200"/>
+            <a:ext cx="8229240" cy="858600"/>
           </a:xfrm>
           <a:prstGeom prst="rect">
             <a:avLst/>
@@ -2053,8 +2053,8 @@
         </p:nvSpPr>
         <p:spPr>
           <a:xfrm>
-            <a:off x="457200" y="1200240"/>
-            <a:ext cx="8228880" cy="3724920"/>
+            <a:off x="457200" y="1203480"/>
+            <a:ext cx="8229240" cy="2982960"/>
           </a:xfrm>
           <a:prstGeom prst="rect">
             <a:avLst/>
@@ -2101,8 +2101,8 @@
         </p:nvSpPr>
         <p:spPr>
           <a:xfrm>
-            <a:off x="457200" y="205920"/>
-            <a:ext cx="8228880" cy="3971160"/>
+            <a:off x="457200" y="205200"/>
+            <a:ext cx="8229240" cy="3981240"/>
           </a:xfrm>
           <a:prstGeom prst="rect">
             <a:avLst/>
@@ -2150,8 +2150,8 @@
         </p:nvSpPr>
         <p:spPr>
           <a:xfrm>
-            <a:off x="457200" y="205920"/>
-            <a:ext cx="8228880" cy="856440"/>
+            <a:off x="457200" y="205200"/>
+            <a:ext cx="8229240" cy="858600"/>
           </a:xfrm>
           <a:prstGeom prst="rect">
             <a:avLst/>
@@ -2177,8 +2177,8 @@
         </p:nvSpPr>
         <p:spPr>
           <a:xfrm>
-            <a:off x="457200" y="1200240"/>
-            <a:ext cx="4015440" cy="1776600"/>
+            <a:off x="457200" y="1203480"/>
+            <a:ext cx="4015800" cy="1422720"/>
           </a:xfrm>
           <a:prstGeom prst="rect">
             <a:avLst/>
@@ -2203,8 +2203,8 @@
         </p:nvSpPr>
         <p:spPr>
           <a:xfrm>
-            <a:off x="457200" y="3146040"/>
-            <a:ext cx="4015440" cy="1776600"/>
+            <a:off x="457200" y="2761920"/>
+            <a:ext cx="4015800" cy="1422720"/>
           </a:xfrm>
           <a:prstGeom prst="rect">
             <a:avLst/>
@@ -2229,8 +2229,8 @@
         </p:nvSpPr>
         <p:spPr>
           <a:xfrm>
-            <a:off x="4673880" y="1200240"/>
-            <a:ext cx="4015440" cy="3724920"/>
+            <a:off x="4674240" y="1203480"/>
+            <a:ext cx="4015800" cy="2982960"/>
           </a:xfrm>
           <a:prstGeom prst="rect">
             <a:avLst/>
@@ -2277,8 +2277,8 @@
         </p:nvSpPr>
         <p:spPr>
           <a:xfrm>
-            <a:off x="457200" y="205920"/>
-            <a:ext cx="8228880" cy="856440"/>
+            <a:off x="457200" y="205200"/>
+            <a:ext cx="8229240" cy="858600"/>
           </a:xfrm>
           <a:prstGeom prst="rect">
             <a:avLst/>
@@ -2304,8 +2304,8 @@
         </p:nvSpPr>
         <p:spPr>
           <a:xfrm>
-            <a:off x="457200" y="1200240"/>
-            <a:ext cx="4015440" cy="3724920"/>
+            <a:off x="457200" y="1203480"/>
+            <a:ext cx="4015800" cy="2982960"/>
           </a:xfrm>
           <a:prstGeom prst="rect">
             <a:avLst/>
@@ -2330,8 +2330,8 @@
         </p:nvSpPr>
         <p:spPr>
           <a:xfrm>
-            <a:off x="4673880" y="1200240"/>
-            <a:ext cx="4015440" cy="1776600"/>
+            <a:off x="4674240" y="1203480"/>
+            <a:ext cx="4015800" cy="1422720"/>
           </a:xfrm>
           <a:prstGeom prst="rect">
             <a:avLst/>
@@ -2356,8 +2356,8 @@
         </p:nvSpPr>
         <p:spPr>
           <a:xfrm>
-            <a:off x="4673880" y="3146040"/>
-            <a:ext cx="4015440" cy="1776600"/>
+            <a:off x="4674240" y="2761920"/>
+            <a:ext cx="4015800" cy="1422720"/>
           </a:xfrm>
           <a:prstGeom prst="rect">
             <a:avLst/>
@@ -2404,8 +2404,8 @@
         </p:nvSpPr>
         <p:spPr>
           <a:xfrm>
-            <a:off x="457200" y="205920"/>
-            <a:ext cx="8228880" cy="856440"/>
+            <a:off x="457200" y="205200"/>
+            <a:ext cx="8229240" cy="858600"/>
           </a:xfrm>
           <a:prstGeom prst="rect">
             <a:avLst/>
@@ -2431,8 +2431,8 @@
         </p:nvSpPr>
         <p:spPr>
           <a:xfrm>
-            <a:off x="457200" y="1200240"/>
-            <a:ext cx="4015440" cy="1776600"/>
+            <a:off x="457200" y="1203480"/>
+            <a:ext cx="4015800" cy="1422720"/>
           </a:xfrm>
           <a:prstGeom prst="rect">
             <a:avLst/>
@@ -2457,8 +2457,8 @@
         </p:nvSpPr>
         <p:spPr>
           <a:xfrm>
-            <a:off x="4673880" y="1200240"/>
-            <a:ext cx="4015440" cy="1776600"/>
+            <a:off x="4674240" y="1203480"/>
+            <a:ext cx="4015800" cy="1422720"/>
           </a:xfrm>
           <a:prstGeom prst="rect">
             <a:avLst/>
@@ -2483,8 +2483,8 @@
         </p:nvSpPr>
         <p:spPr>
           <a:xfrm>
-            <a:off x="457200" y="3146040"/>
-            <a:ext cx="8228880" cy="1776600"/>
+            <a:off x="457200" y="2761920"/>
+            <a:ext cx="8229240" cy="1422720"/>
           </a:xfrm>
           <a:prstGeom prst="rect">
             <a:avLst/>
@@ -2531,8 +2531,8 @@
         </p:nvSpPr>
         <p:spPr>
           <a:xfrm>
-            <a:off x="457200" y="205920"/>
-            <a:ext cx="8228880" cy="856440"/>
+            <a:off x="457200" y="205200"/>
+            <a:ext cx="8229240" cy="858600"/>
           </a:xfrm>
           <a:prstGeom prst="rect">
             <a:avLst/>
@@ -2558,8 +2558,8 @@
         </p:nvSpPr>
         <p:spPr>
           <a:xfrm>
-            <a:off x="457200" y="1200240"/>
-            <a:ext cx="8228880" cy="1776600"/>
+            <a:off x="457200" y="1203480"/>
+            <a:ext cx="8229240" cy="1422720"/>
           </a:xfrm>
           <a:prstGeom prst="rect">
             <a:avLst/>
@@ -2584,8 +2584,8 @@
         </p:nvSpPr>
         <p:spPr>
           <a:xfrm>
-            <a:off x="457200" y="3146040"/>
-            <a:ext cx="8228880" cy="1776600"/>
+            <a:off x="457200" y="2761920"/>
+            <a:ext cx="8229240" cy="1422720"/>
           </a:xfrm>
           <a:prstGeom prst="rect">
             <a:avLst/>
@@ -2632,8 +2632,8 @@
         </p:nvSpPr>
         <p:spPr>
           <a:xfrm>
-            <a:off x="457200" y="205920"/>
-            <a:ext cx="8228880" cy="856440"/>
+            <a:off x="457200" y="205200"/>
+            <a:ext cx="8229240" cy="858600"/>
           </a:xfrm>
           <a:prstGeom prst="rect">
             <a:avLst/>
@@ -2659,8 +2659,8 @@
         </p:nvSpPr>
         <p:spPr>
           <a:xfrm>
-            <a:off x="457200" y="1200240"/>
-            <a:ext cx="4015440" cy="1776600"/>
+            <a:off x="457200" y="1203480"/>
+            <a:ext cx="4015800" cy="1422720"/>
           </a:xfrm>
           <a:prstGeom prst="rect">
             <a:avLst/>
@@ -2685,8 +2685,8 @@
         </p:nvSpPr>
         <p:spPr>
           <a:xfrm>
-            <a:off x="4673880" y="1200240"/>
-            <a:ext cx="4015440" cy="1776600"/>
+            <a:off x="4674240" y="1203480"/>
+            <a:ext cx="4015800" cy="1422720"/>
           </a:xfrm>
           <a:prstGeom prst="rect">
             <a:avLst/>
@@ -2711,8 +2711,8 @@
         </p:nvSpPr>
         <p:spPr>
           <a:xfrm>
-            <a:off x="4673880" y="3146040"/>
-            <a:ext cx="4015440" cy="1776600"/>
+            <a:off x="4674240" y="2761920"/>
+            <a:ext cx="4015800" cy="1422720"/>
           </a:xfrm>
           <a:prstGeom prst="rect">
             <a:avLst/>
@@ -2737,8 +2737,8 @@
         </p:nvSpPr>
         <p:spPr>
           <a:xfrm>
-            <a:off x="457200" y="3146040"/>
-            <a:ext cx="4015440" cy="1776600"/>
+            <a:off x="457200" y="2761920"/>
+            <a:ext cx="4015800" cy="1422720"/>
           </a:xfrm>
           <a:prstGeom prst="rect">
             <a:avLst/>
@@ -2785,8 +2785,8 @@
         </p:nvSpPr>
         <p:spPr>
           <a:xfrm>
-            <a:off x="457200" y="205920"/>
-            <a:ext cx="8228880" cy="856440"/>
+            <a:off x="457200" y="205200"/>
+            <a:ext cx="8229240" cy="858600"/>
           </a:xfrm>
           <a:prstGeom prst="rect">
             <a:avLst/>
@@ -2812,8 +2812,8 @@
         </p:nvSpPr>
         <p:spPr>
           <a:xfrm>
-            <a:off x="457200" y="1200240"/>
-            <a:ext cx="8228880" cy="3724920"/>
+            <a:off x="457200" y="1203480"/>
+            <a:ext cx="8229240" cy="2982960"/>
           </a:xfrm>
           <a:prstGeom prst="rect">
             <a:avLst/>
@@ -2838,8 +2838,8 @@
         </p:nvSpPr>
         <p:spPr>
           <a:xfrm>
-            <a:off x="457200" y="1200240"/>
-            <a:ext cx="8228880" cy="3724920"/>
+            <a:off x="457200" y="1203480"/>
+            <a:ext cx="8229240" cy="2982960"/>
           </a:xfrm>
           <a:prstGeom prst="rect">
             <a:avLst/>
@@ -2864,8 +2864,8 @@
         </p:blipFill>
         <p:spPr>
           <a:xfrm>
-            <a:off x="2237400" y="1199880"/>
-            <a:ext cx="4668480" cy="3724920"/>
+            <a:off x="2702160" y="1203480"/>
+            <a:ext cx="3738600" cy="2982960"/>
           </a:xfrm>
           <a:prstGeom prst="rect">
             <a:avLst/>
@@ -2887,8 +2887,8 @@
         </p:blipFill>
         <p:spPr>
           <a:xfrm>
-            <a:off x="2237400" y="1199880"/>
-            <a:ext cx="4668480" cy="3724920"/>
+            <a:off x="2702160" y="1203480"/>
+            <a:ext cx="3738600" cy="2982960"/>
           </a:xfrm>
           <a:prstGeom prst="rect">
             <a:avLst/>
@@ -2932,8 +2932,8 @@
         </p:nvSpPr>
         <p:spPr>
           <a:xfrm>
-            <a:off x="457200" y="205920"/>
-            <a:ext cx="8228880" cy="856440"/>
+            <a:off x="457200" y="205200"/>
+            <a:ext cx="8229240" cy="858600"/>
           </a:xfrm>
           <a:prstGeom prst="rect">
             <a:avLst/>
@@ -2959,8 +2959,8 @@
         </p:nvSpPr>
         <p:spPr>
           <a:xfrm>
-            <a:off x="457200" y="1200240"/>
-            <a:ext cx="4015440" cy="3724920"/>
+            <a:off x="457200" y="1203480"/>
+            <a:ext cx="4015800" cy="2982960"/>
           </a:xfrm>
           <a:prstGeom prst="rect">
             <a:avLst/>
@@ -2985,8 +2985,8 @@
         </p:nvSpPr>
         <p:spPr>
           <a:xfrm>
-            <a:off x="4673880" y="1200240"/>
-            <a:ext cx="4015440" cy="3724920"/>
+            <a:off x="4674240" y="1203480"/>
+            <a:ext cx="4015800" cy="2982960"/>
           </a:xfrm>
           <a:prstGeom prst="rect">
             <a:avLst/>
@@ -3033,8 +3033,8 @@
         </p:nvSpPr>
         <p:spPr>
           <a:xfrm>
-            <a:off x="457200" y="205920"/>
-            <a:ext cx="8228880" cy="856440"/>
+            <a:off x="457200" y="205200"/>
+            <a:ext cx="8229240" cy="858600"/>
           </a:xfrm>
           <a:prstGeom prst="rect">
             <a:avLst/>
@@ -3082,8 +3082,8 @@
         </p:nvSpPr>
         <p:spPr>
           <a:xfrm>
-            <a:off x="457200" y="205920"/>
-            <a:ext cx="8228880" cy="3971160"/>
+            <a:off x="457200" y="205200"/>
+            <a:ext cx="8229240" cy="3981240"/>
           </a:xfrm>
           <a:prstGeom prst="rect">
             <a:avLst/>
@@ -3131,8 +3131,8 @@
         </p:nvSpPr>
         <p:spPr>
           <a:xfrm>
-            <a:off x="457200" y="205920"/>
-            <a:ext cx="8228880" cy="856440"/>
+            <a:off x="457200" y="205200"/>
+            <a:ext cx="8229240" cy="858600"/>
           </a:xfrm>
           <a:prstGeom prst="rect">
             <a:avLst/>
@@ -3158,8 +3158,8 @@
         </p:nvSpPr>
         <p:spPr>
           <a:xfrm>
-            <a:off x="457200" y="1200240"/>
-            <a:ext cx="4015440" cy="1776600"/>
+            <a:off x="457200" y="1203480"/>
+            <a:ext cx="4015800" cy="1422720"/>
           </a:xfrm>
           <a:prstGeom prst="rect">
             <a:avLst/>
@@ -3184,8 +3184,8 @@
         </p:nvSpPr>
         <p:spPr>
           <a:xfrm>
-            <a:off x="457200" y="3146040"/>
-            <a:ext cx="4015440" cy="1776600"/>
+            <a:off x="457200" y="2761920"/>
+            <a:ext cx="4015800" cy="1422720"/>
           </a:xfrm>
           <a:prstGeom prst="rect">
             <a:avLst/>
@@ -3210,8 +3210,8 @@
         </p:nvSpPr>
         <p:spPr>
           <a:xfrm>
-            <a:off x="4673880" y="1200240"/>
-            <a:ext cx="4015440" cy="3724920"/>
+            <a:off x="4674240" y="1203480"/>
+            <a:ext cx="4015800" cy="2982960"/>
           </a:xfrm>
           <a:prstGeom prst="rect">
             <a:avLst/>
@@ -3258,8 +3258,8 @@
         </p:nvSpPr>
         <p:spPr>
           <a:xfrm>
-            <a:off x="457200" y="205920"/>
-            <a:ext cx="8228880" cy="856440"/>
+            <a:off x="457200" y="205200"/>
+            <a:ext cx="8229240" cy="858600"/>
           </a:xfrm>
           <a:prstGeom prst="rect">
             <a:avLst/>
@@ -3285,8 +3285,8 @@
         </p:nvSpPr>
         <p:spPr>
           <a:xfrm>
-            <a:off x="457200" y="1200240"/>
-            <a:ext cx="4015440" cy="3724920"/>
+            <a:off x="457200" y="1203480"/>
+            <a:ext cx="4015800" cy="2982960"/>
           </a:xfrm>
           <a:prstGeom prst="rect">
             <a:avLst/>
@@ -3311,8 +3311,8 @@
         </p:nvSpPr>
         <p:spPr>
           <a:xfrm>
-            <a:off x="4673880" y="1200240"/>
-            <a:ext cx="4015440" cy="1776600"/>
+            <a:off x="4674240" y="1203480"/>
+            <a:ext cx="4015800" cy="1422720"/>
           </a:xfrm>
           <a:prstGeom prst="rect">
             <a:avLst/>
@@ -3337,8 +3337,8 @@
         </p:nvSpPr>
         <p:spPr>
           <a:xfrm>
-            <a:off x="4673880" y="3146040"/>
-            <a:ext cx="4015440" cy="1776600"/>
+            <a:off x="4674240" y="2761920"/>
+            <a:ext cx="4015800" cy="1422720"/>
           </a:xfrm>
           <a:prstGeom prst="rect">
             <a:avLst/>
@@ -3385,8 +3385,8 @@
         </p:nvSpPr>
         <p:spPr>
           <a:xfrm>
-            <a:off x="457200" y="205920"/>
-            <a:ext cx="8228880" cy="856440"/>
+            <a:off x="457200" y="205200"/>
+            <a:ext cx="8229240" cy="858600"/>
           </a:xfrm>
           <a:prstGeom prst="rect">
             <a:avLst/>
@@ -3412,8 +3412,8 @@
         </p:nvSpPr>
         <p:spPr>
           <a:xfrm>
-            <a:off x="457200" y="1200240"/>
-            <a:ext cx="4015440" cy="1776600"/>
+            <a:off x="457200" y="1203480"/>
+            <a:ext cx="4015800" cy="1422720"/>
           </a:xfrm>
           <a:prstGeom prst="rect">
             <a:avLst/>
@@ -3438,8 +3438,8 @@
         </p:nvSpPr>
         <p:spPr>
           <a:xfrm>
-            <a:off x="4673880" y="1200240"/>
-            <a:ext cx="4015440" cy="1776600"/>
+            <a:off x="4674240" y="1203480"/>
+            <a:ext cx="4015800" cy="1422720"/>
           </a:xfrm>
           <a:prstGeom prst="rect">
             <a:avLst/>
@@ -3464,8 +3464,8 @@
         </p:nvSpPr>
         <p:spPr>
           <a:xfrm>
-            <a:off x="457200" y="3146040"/>
-            <a:ext cx="8228880" cy="1776600"/>
+            <a:off x="457200" y="2761920"/>
+            <a:ext cx="8229240" cy="1422720"/>
           </a:xfrm>
           <a:prstGeom prst="rect">
             <a:avLst/>
@@ -3957,8 +3957,8 @@
         </p:nvSpPr>
         <p:spPr>
           <a:xfrm>
-            <a:off x="457200" y="205920"/>
-            <a:ext cx="8228880" cy="856440"/>
+            <a:off x="457200" y="205200"/>
+            <a:ext cx="8229240" cy="858600"/>
           </a:xfrm>
           <a:prstGeom prst="rect">
             <a:avLst/>
@@ -3968,6 +3968,12 @@
           <a:bodyPr lIns="0" rIns="0" tIns="0" bIns="0" anchor="ctr"/>
           <a:p>
             <a:pPr algn="ctr"/>
+            <a:r>
+              <a:rPr lang="en-AU" sz="4400" spc="-1">
+                <a:latin typeface="Arial"/>
+              </a:rPr>
+              <a:t>Click to edit the title text format</a:t>
+            </a:r>
             <a:endParaRPr/>
           </a:p>
         </p:txBody>
@@ -3984,8 +3990,8 @@
         </p:nvSpPr>
         <p:spPr>
           <a:xfrm>
-            <a:off x="457200" y="1200240"/>
-            <a:ext cx="8228880" cy="3724920"/>
+            <a:off x="457200" y="1203480"/>
+            <a:ext cx="8229240" cy="2982960"/>
           </a:xfrm>
           <a:prstGeom prst="rect">
             <a:avLst/>
@@ -4003,7 +4009,7 @@
               <a:buChar char=""/>
             </a:pPr>
             <a:r>
-              <a:rPr lang="en-AU" sz="1800" spc="-1">
+              <a:rPr lang="en-AU" sz="3200" spc="-1">
                 <a:latin typeface="Arial"/>
               </a:rPr>
               <a:t>Click to edit the outline text format</a:t>
@@ -4020,7 +4026,7 @@
               <a:buChar char=""/>
             </a:pPr>
             <a:r>
-              <a:rPr lang="en-AU" sz="1800" spc="-1">
+              <a:rPr lang="en-AU" sz="2800" spc="-1">
                 <a:latin typeface="Arial"/>
               </a:rPr>
               <a:t>Second Outline Level</a:t>
@@ -4037,7 +4043,7 @@
               <a:buChar char=""/>
             </a:pPr>
             <a:r>
-              <a:rPr lang="en-AU" sz="1800" spc="-1">
+              <a:rPr lang="en-AU" sz="2400" spc="-1">
                 <a:latin typeface="Arial"/>
               </a:rPr>
               <a:t>Third Outline Level</a:t>
@@ -4054,7 +4060,7 @@
               <a:buChar char=""/>
             </a:pPr>
             <a:r>
-              <a:rPr lang="en-AU" sz="1800" spc="-1">
+              <a:rPr lang="en-AU" sz="2000" spc="-1">
                 <a:latin typeface="Arial"/>
               </a:rPr>
               <a:t>Fourth Outline Level</a:t>
@@ -4071,7 +4077,7 @@
               <a:buChar char=""/>
             </a:pPr>
             <a:r>
-              <a:rPr lang="en-AU" sz="1800" spc="-1">
+              <a:rPr lang="en-AU" sz="2000" spc="-1">
                 <a:latin typeface="Arial"/>
               </a:rPr>
               <a:t>Fifth Outline Level</a:t>
@@ -4088,7 +4094,7 @@
               <a:buChar char=""/>
             </a:pPr>
             <a:r>
-              <a:rPr lang="en-AU" sz="1800" spc="-1">
+              <a:rPr lang="en-AU" sz="2000" spc="-1">
                 <a:latin typeface="Arial"/>
               </a:rPr>
               <a:t>Sixth Outline Level</a:t>
@@ -4105,7 +4111,7 @@
               <a:buChar char=""/>
             </a:pPr>
             <a:r>
-              <a:rPr lang="en-AU" sz="1800" spc="-1">
+              <a:rPr lang="en-AU" sz="2000" spc="-1">
                 <a:latin typeface="Arial"/>
               </a:rPr>
               <a:t>Seventh Outline Level</a:t>
@@ -4160,7 +4166,7 @@
         <p:spPr>
           <a:xfrm>
             <a:off x="685800" y="818280"/>
-            <a:ext cx="7770600" cy="1923120"/>
+            <a:ext cx="7770240" cy="1922760"/>
           </a:xfrm>
           <a:prstGeom prst="rect">
             <a:avLst/>
@@ -4212,7 +4218,7 @@
         <p:spPr>
           <a:xfrm>
             <a:off x="685800" y="2840040"/>
-            <a:ext cx="7770600" cy="783000"/>
+            <a:ext cx="7770240" cy="782640"/>
           </a:xfrm>
           <a:prstGeom prst="rect">
             <a:avLst/>
@@ -4313,7 +4319,7 @@
         <p:spPr>
           <a:xfrm>
             <a:off x="457200" y="205920"/>
-            <a:ext cx="8227800" cy="855720"/>
+            <a:ext cx="8227440" cy="855360"/>
           </a:xfrm>
           <a:prstGeom prst="rect">
             <a:avLst/>
@@ -4365,7 +4371,7 @@
         <p:spPr>
           <a:xfrm>
             <a:off x="457200" y="1200240"/>
-            <a:ext cx="8227800" cy="3723840"/>
+            <a:ext cx="8227440" cy="3723480"/>
           </a:xfrm>
           <a:prstGeom prst="rect">
             <a:avLst/>
@@ -4407,7 +4413,7 @@
             <a:endParaRPr/>
           </a:p>
           <a:p>
-            <a:pPr marL="216000" indent="-215640">
+            <a:pPr marL="216000" indent="-215280">
               <a:lnSpc>
                 <a:spcPct val="100000"/>
               </a:lnSpc>
@@ -4447,7 +4453,7 @@
             <a:endParaRPr/>
           </a:p>
           <a:p>
-            <a:pPr marL="216000" indent="-215640">
+            <a:pPr marL="216000" indent="-215280">
               <a:lnSpc>
                 <a:spcPct val="100000"/>
               </a:lnSpc>
@@ -4487,7 +4493,7 @@
             <a:endParaRPr/>
           </a:p>
           <a:p>
-            <a:pPr marL="216000" indent="-215640">
+            <a:pPr marL="216000" indent="-215280">
               <a:lnSpc>
                 <a:spcPct val="100000"/>
               </a:lnSpc>
@@ -4527,7 +4533,7 @@
             <a:endParaRPr/>
           </a:p>
           <a:p>
-            <a:pPr marL="216000" indent="-215640">
+            <a:pPr marL="216000" indent="-215280">
               <a:lnSpc>
                 <a:spcPct val="100000"/>
               </a:lnSpc>
@@ -4567,7 +4573,7 @@
             <a:endParaRPr/>
           </a:p>
           <a:p>
-            <a:pPr marL="216000" indent="-215640">
+            <a:pPr marL="216000" indent="-215280">
               <a:lnSpc>
                 <a:spcPct val="100000"/>
               </a:lnSpc>
@@ -4681,7 +4687,7 @@
         <p:spPr>
           <a:xfrm>
             <a:off x="457200" y="205920"/>
-            <a:ext cx="8227800" cy="855720"/>
+            <a:ext cx="8227440" cy="855360"/>
           </a:xfrm>
           <a:prstGeom prst="rect">
             <a:avLst/>
@@ -4733,7 +4739,7 @@
         <p:spPr>
           <a:xfrm>
             <a:off x="457200" y="1200240"/>
-            <a:ext cx="8227800" cy="3723840"/>
+            <a:ext cx="8227440" cy="3723480"/>
           </a:xfrm>
           <a:prstGeom prst="rect">
             <a:avLst/>
@@ -4896,7 +4902,7 @@
         <p:spPr>
           <a:xfrm>
             <a:off x="457200" y="205920"/>
-            <a:ext cx="8227800" cy="855720"/>
+            <a:ext cx="8227440" cy="855360"/>
           </a:xfrm>
           <a:prstGeom prst="rect">
             <a:avLst/>
@@ -4948,7 +4954,7 @@
         <p:spPr>
           <a:xfrm>
             <a:off x="457200" y="1200240"/>
-            <a:ext cx="8227800" cy="3723840"/>
+            <a:ext cx="8227440" cy="3723480"/>
           </a:xfrm>
           <a:prstGeom prst="rect">
             <a:avLst/>
@@ -4990,7 +4996,7 @@
             <a:endParaRPr/>
           </a:p>
           <a:p>
-            <a:pPr marL="216000" indent="-215640">
+            <a:pPr marL="216000" indent="-215280">
               <a:lnSpc>
                 <a:spcPct val="100000"/>
               </a:lnSpc>
@@ -5018,7 +5024,7 @@
             <a:endParaRPr/>
           </a:p>
           <a:p>
-            <a:pPr marL="216000" indent="-215640">
+            <a:pPr marL="216000" indent="-215280">
               <a:lnSpc>
                 <a:spcPct val="100000"/>
               </a:lnSpc>
@@ -5041,12 +5047,12 @@
                 <a:latin typeface="Arial"/>
                 <a:ea typeface="Arial"/>
               </a:rPr>
-              <a:t>please_please_help_me@rc.nectar.org.au</a:t>
-            </a:r>
-            <a:endParaRPr/>
-          </a:p>
-          <a:p>
-            <a:pPr marL="216000" indent="-215640">
+              <a:t>help_me@rc.nectar.org.au</a:t>
+            </a:r>
+            <a:endParaRPr/>
+          </a:p>
+          <a:p>
+            <a:pPr marL="216000" indent="-215280">
               <a:lnSpc>
                 <a:spcPct val="100000"/>
               </a:lnSpc>
@@ -5089,7 +5095,7 @@
             <a:endParaRPr/>
           </a:p>
           <a:p>
-            <a:pPr marL="216000" indent="-215640">
+            <a:pPr marL="216000" indent="-215280">
               <a:lnSpc>
                 <a:spcPct val="100000"/>
               </a:lnSpc>
@@ -5191,7 +5197,7 @@
         <p:spPr>
           <a:xfrm>
             <a:off x="457200" y="205920"/>
-            <a:ext cx="8227800" cy="855720"/>
+            <a:ext cx="8227440" cy="855360"/>
           </a:xfrm>
           <a:prstGeom prst="rect">
             <a:avLst/>
@@ -5243,7 +5249,7 @@
         <p:spPr>
           <a:xfrm>
             <a:off x="457200" y="1200240"/>
-            <a:ext cx="8227800" cy="3723840"/>
+            <a:ext cx="8227440" cy="3723480"/>
           </a:xfrm>
           <a:prstGeom prst="rect">
             <a:avLst/>
@@ -5285,7 +5291,7 @@
             <a:endParaRPr/>
           </a:p>
           <a:p>
-            <a:pPr marL="216000" indent="-215640">
+            <a:pPr marL="216000" indent="-215280">
               <a:lnSpc>
                 <a:spcPct val="100000"/>
               </a:lnSpc>
@@ -5325,7 +5331,7 @@
             <a:endParaRPr/>
           </a:p>
           <a:p>
-            <a:pPr marL="216000" indent="-215640">
+            <a:pPr marL="216000" indent="-215280">
               <a:lnSpc>
                 <a:spcPct val="100000"/>
               </a:lnSpc>
@@ -5365,7 +5371,7 @@
             <a:endParaRPr/>
           </a:p>
           <a:p>
-            <a:pPr marL="216000" indent="-215640">
+            <a:pPr marL="216000" indent="-215280">
               <a:lnSpc>
                 <a:spcPct val="100000"/>
               </a:lnSpc>
@@ -5405,7 +5411,7 @@
             <a:endParaRPr/>
           </a:p>
           <a:p>
-            <a:pPr marL="216000" indent="-215640">
+            <a:pPr marL="216000" indent="-215280">
               <a:lnSpc>
                 <a:spcPct val="100000"/>
               </a:lnSpc>
@@ -5445,7 +5451,7 @@
             <a:endParaRPr/>
           </a:p>
           <a:p>
-            <a:pPr marL="216000" indent="-215640">
+            <a:pPr marL="216000" indent="-215280">
               <a:lnSpc>
                 <a:spcPct val="100000"/>
               </a:lnSpc>
@@ -5485,7 +5491,7 @@
             <a:endParaRPr/>
           </a:p>
           <a:p>
-            <a:pPr marL="216000" indent="-215640" algn="ctr">
+            <a:pPr marL="216000" indent="-215280" algn="ctr">
               <a:lnSpc>
                 <a:spcPct val="100000"/>
               </a:lnSpc>
@@ -5569,7 +5575,7 @@
         <p:spPr>
           <a:xfrm>
             <a:off x="457200" y="205920"/>
-            <a:ext cx="8227800" cy="855720"/>
+            <a:ext cx="8227440" cy="855360"/>
           </a:xfrm>
           <a:prstGeom prst="rect">
             <a:avLst/>
@@ -5621,7 +5627,7 @@
         <p:spPr>
           <a:xfrm>
             <a:off x="457200" y="1200240"/>
-            <a:ext cx="8227800" cy="3723840"/>
+            <a:ext cx="8227440" cy="3723480"/>
           </a:xfrm>
           <a:prstGeom prst="rect">
             <a:avLst/>
@@ -5663,7 +5669,7 @@
             <a:endParaRPr/>
           </a:p>
           <a:p>
-            <a:pPr marL="216000" indent="-215640">
+            <a:pPr marL="216000" indent="-215280">
               <a:lnSpc>
                 <a:spcPct val="100000"/>
               </a:lnSpc>
@@ -5688,7 +5694,7 @@
             <a:endParaRPr/>
           </a:p>
           <a:p>
-            <a:pPr marL="216000" indent="-215640">
+            <a:pPr marL="216000" indent="-215280">
               <a:lnSpc>
                 <a:spcPct val="100000"/>
               </a:lnSpc>
@@ -5713,7 +5719,7 @@
             <a:endParaRPr/>
           </a:p>
           <a:p>
-            <a:pPr marL="216000" indent="-215640">
+            <a:pPr marL="216000" indent="-215280">
               <a:lnSpc>
                 <a:spcPct val="100000"/>
               </a:lnSpc>
@@ -5738,7 +5744,7 @@
             <a:endParaRPr/>
           </a:p>
           <a:p>
-            <a:pPr marL="216000" indent="-215640">
+            <a:pPr marL="216000" indent="-215280">
               <a:lnSpc>
                 <a:spcPct val="100000"/>
               </a:lnSpc>
@@ -5822,7 +5828,7 @@
         <p:spPr>
           <a:xfrm>
             <a:off x="457200" y="205920"/>
-            <a:ext cx="8227800" cy="855720"/>
+            <a:ext cx="8227440" cy="855360"/>
           </a:xfrm>
           <a:prstGeom prst="rect">
             <a:avLst/>
@@ -5874,7 +5880,7 @@
         <p:spPr>
           <a:xfrm>
             <a:off x="457200" y="1200240"/>
-            <a:ext cx="8227800" cy="3723840"/>
+            <a:ext cx="8227440" cy="3723480"/>
           </a:xfrm>
           <a:prstGeom prst="rect">
             <a:avLst/>
@@ -5911,12 +5917,12 @@
                 <a:latin typeface="Arial"/>
                 <a:ea typeface="Arial"/>
               </a:rPr>
-              <a:t>When does my ephemeral drive get wiped?</a:t>
-            </a:r>
-            <a:endParaRPr/>
-          </a:p>
-          <a:p>
-            <a:pPr marL="216000" indent="-215640">
+              <a:t>When does my free PC on the NeCTAR cloud get destroyed (along with all its data)?</a:t>
+            </a:r>
+            <a:endParaRPr/>
+          </a:p>
+          <a:p>
+            <a:pPr marL="216000" indent="-215280">
               <a:lnSpc>
                 <a:spcPct val="100000"/>
               </a:lnSpc>
@@ -5941,7 +5947,7 @@
             <a:endParaRPr/>
           </a:p>
           <a:p>
-            <a:pPr marL="216000" indent="-215640">
+            <a:pPr marL="216000" indent="-215280">
               <a:lnSpc>
                 <a:spcPct val="100000"/>
               </a:lnSpc>
@@ -5966,7 +5972,7 @@
             <a:endParaRPr/>
           </a:p>
           <a:p>
-            <a:pPr marL="216000" indent="-215640">
+            <a:pPr marL="216000" indent="-215280">
               <a:lnSpc>
                 <a:spcPct val="100000"/>
               </a:lnSpc>
@@ -5991,7 +5997,7 @@
             <a:endParaRPr/>
           </a:p>
           <a:p>
-            <a:pPr marL="216000" indent="-215640">
+            <a:pPr marL="216000" indent="-215280">
               <a:lnSpc>
                 <a:spcPct val="100000"/>
               </a:lnSpc>
@@ -6016,7 +6022,7 @@
             <a:endParaRPr/>
           </a:p>
           <a:p>
-            <a:pPr marL="216000" indent="-215640">
+            <a:pPr marL="216000" indent="-215280">
               <a:lnSpc>
                 <a:spcPct val="100000"/>
               </a:lnSpc>
@@ -6100,7 +6106,7 @@
         <p:spPr>
           <a:xfrm>
             <a:off x="457200" y="205920"/>
-            <a:ext cx="8228880" cy="856800"/>
+            <a:ext cx="8228520" cy="856440"/>
           </a:xfrm>
           <a:prstGeom prst="rect">
             <a:avLst/>
@@ -6152,7 +6158,7 @@
         <p:spPr>
           <a:xfrm>
             <a:off x="457200" y="1200240"/>
-            <a:ext cx="8228880" cy="3724920"/>
+            <a:ext cx="8228520" cy="3724560"/>
           </a:xfrm>
           <a:prstGeom prst="rect">
             <a:avLst/>
@@ -6194,7 +6200,7 @@
             <a:endParaRPr/>
           </a:p>
           <a:p>
-            <a:pPr marL="216000" indent="-216000">
+            <a:pPr marL="216000" indent="-215640">
               <a:lnSpc>
                 <a:spcPct val="120000"/>
               </a:lnSpc>
@@ -6234,7 +6240,7 @@
             <a:endParaRPr/>
           </a:p>
           <a:p>
-            <a:pPr marL="216000" indent="-216000">
+            <a:pPr marL="216000" indent="-215640">
               <a:lnSpc>
                 <a:spcPct val="120000"/>
               </a:lnSpc>
@@ -6274,7 +6280,7 @@
             <a:endParaRPr/>
           </a:p>
           <a:p>
-            <a:pPr marL="216000" indent="-216000">
+            <a:pPr marL="216000" indent="-215640">
               <a:lnSpc>
                 <a:spcPct val="120000"/>
               </a:lnSpc>
@@ -6314,7 +6320,7 @@
             <a:endParaRPr/>
           </a:p>
           <a:p>
-            <a:pPr marL="216000" indent="-216000">
+            <a:pPr marL="216000" indent="-215640">
               <a:lnSpc>
                 <a:spcPct val="120000"/>
               </a:lnSpc>
@@ -6354,7 +6360,7 @@
             <a:endParaRPr/>
           </a:p>
           <a:p>
-            <a:pPr marL="216000" indent="-216000">
+            <a:pPr marL="216000" indent="-215640">
               <a:lnSpc>
                 <a:spcPct val="115000"/>
               </a:lnSpc>

</xml_diff>

<commit_message>
Updated with new questions
</commit_message>
<xml_diff>
--- a/Lessons/Lesson_I/Lesson_I_Questions.pptx
+++ b/Lessons/Lesson_I/Lesson_I_Questions.pptx
@@ -15,6 +15,7 @@
     <p:sldId id="261" r:id="rId10"/>
     <p:sldId id="262" r:id="rId11"/>
     <p:sldId id="263" r:id="rId12"/>
+    <p:sldId id="264" r:id="rId13"/>
   </p:sldIdLst>
   <p:sldSz cx="9144000" cy="5143500"/>
   <p:notesSz cx="7559675" cy="10691812"/>
@@ -4166,7 +4167,7 @@
         <p:spPr>
           <a:xfrm>
             <a:off x="685800" y="818280"/>
-            <a:ext cx="7770240" cy="1922760"/>
+            <a:ext cx="7769520" cy="1922040"/>
           </a:xfrm>
           <a:prstGeom prst="rect">
             <a:avLst/>
@@ -4203,7 +4204,7 @@
                 <a:latin typeface="Arial"/>
                 <a:ea typeface="Arial"/>
               </a:rPr>
-              <a:t>Roll up to the NeCTAR mystery tour!</a:t>
+              <a:t>Roll up to the Research Cloud mystery tour!</a:t>
             </a:r>
             <a:endParaRPr/>
           </a:p>
@@ -4218,7 +4219,7 @@
         <p:spPr>
           <a:xfrm>
             <a:off x="685800" y="2840040"/>
-            <a:ext cx="7770240" cy="782640"/>
+            <a:ext cx="7769520" cy="781920"/>
           </a:xfrm>
           <a:prstGeom prst="rect">
             <a:avLst/>
@@ -4319,7 +4320,7 @@
         <p:spPr>
           <a:xfrm>
             <a:off x="457200" y="205920"/>
-            <a:ext cx="8227440" cy="855360"/>
+            <a:ext cx="8226720" cy="854640"/>
           </a:xfrm>
           <a:prstGeom prst="rect">
             <a:avLst/>
@@ -4371,7 +4372,7 @@
         <p:spPr>
           <a:xfrm>
             <a:off x="457200" y="1200240"/>
-            <a:ext cx="8227440" cy="3723480"/>
+            <a:ext cx="8226720" cy="3722760"/>
           </a:xfrm>
           <a:prstGeom prst="rect">
             <a:avLst/>
@@ -4408,12 +4409,12 @@
                 <a:latin typeface="Arial"/>
                 <a:ea typeface="Arial"/>
               </a:rPr>
-              <a:t>Currently, how much does it cost a researcher to use the NeCTAR cloud?</a:t>
-            </a:r>
-            <a:endParaRPr/>
-          </a:p>
-          <a:p>
-            <a:pPr marL="216000" indent="-215280">
+              <a:t>Currently, how much does it cost a researcher to use the Research Cloud?</a:t>
+            </a:r>
+            <a:endParaRPr/>
+          </a:p>
+          <a:p>
+            <a:pPr marL="216000" indent="-214560">
               <a:lnSpc>
                 <a:spcPct val="100000"/>
               </a:lnSpc>
@@ -4453,7 +4454,7 @@
             <a:endParaRPr/>
           </a:p>
           <a:p>
-            <a:pPr marL="216000" indent="-215280">
+            <a:pPr marL="216000" indent="-214560">
               <a:lnSpc>
                 <a:spcPct val="100000"/>
               </a:lnSpc>
@@ -4493,7 +4494,7 @@
             <a:endParaRPr/>
           </a:p>
           <a:p>
-            <a:pPr marL="216000" indent="-215280">
+            <a:pPr marL="216000" indent="-214560">
               <a:lnSpc>
                 <a:spcPct val="100000"/>
               </a:lnSpc>
@@ -4533,7 +4534,7 @@
             <a:endParaRPr/>
           </a:p>
           <a:p>
-            <a:pPr marL="216000" indent="-215280">
+            <a:pPr marL="216000" indent="-214560">
               <a:lnSpc>
                 <a:spcPct val="100000"/>
               </a:lnSpc>
@@ -4573,7 +4574,7 @@
             <a:endParaRPr/>
           </a:p>
           <a:p>
-            <a:pPr marL="216000" indent="-215280">
+            <a:pPr marL="216000" indent="-214560">
               <a:lnSpc>
                 <a:spcPct val="100000"/>
               </a:lnSpc>
@@ -4687,7 +4688,7 @@
         <p:spPr>
           <a:xfrm>
             <a:off x="457200" y="205920"/>
-            <a:ext cx="8227440" cy="855360"/>
+            <a:ext cx="8226720" cy="854640"/>
           </a:xfrm>
           <a:prstGeom prst="rect">
             <a:avLst/>
@@ -4739,7 +4740,7 @@
         <p:spPr>
           <a:xfrm>
             <a:off x="457200" y="1200240"/>
-            <a:ext cx="8227440" cy="3723480"/>
+            <a:ext cx="8226720" cy="3722760"/>
           </a:xfrm>
           <a:prstGeom prst="rect">
             <a:avLst/>
@@ -4902,7 +4903,7 @@
         <p:spPr>
           <a:xfrm>
             <a:off x="457200" y="205920"/>
-            <a:ext cx="8227440" cy="855360"/>
+            <a:ext cx="8226720" cy="854640"/>
           </a:xfrm>
           <a:prstGeom prst="rect">
             <a:avLst/>
@@ -4954,7 +4955,7 @@
         <p:spPr>
           <a:xfrm>
             <a:off x="457200" y="1200240"/>
-            <a:ext cx="8227440" cy="3723480"/>
+            <a:ext cx="8226720" cy="3722760"/>
           </a:xfrm>
           <a:prstGeom prst="rect">
             <a:avLst/>
@@ -4996,7 +4997,7 @@
             <a:endParaRPr/>
           </a:p>
           <a:p>
-            <a:pPr marL="216000" indent="-215280">
+            <a:pPr marL="216000" indent="-214560">
               <a:lnSpc>
                 <a:spcPct val="100000"/>
               </a:lnSpc>
@@ -5024,7 +5025,7 @@
             <a:endParaRPr/>
           </a:p>
           <a:p>
-            <a:pPr marL="216000" indent="-215280">
+            <a:pPr marL="216000" indent="-214560">
               <a:lnSpc>
                 <a:spcPct val="100000"/>
               </a:lnSpc>
@@ -5052,7 +5053,7 @@
             <a:endParaRPr/>
           </a:p>
           <a:p>
-            <a:pPr marL="216000" indent="-215280">
+            <a:pPr marL="216000" indent="-214560">
               <a:lnSpc>
                 <a:spcPct val="100000"/>
               </a:lnSpc>
@@ -5095,7 +5096,7 @@
             <a:endParaRPr/>
           </a:p>
           <a:p>
-            <a:pPr marL="216000" indent="-215280">
+            <a:pPr marL="216000" indent="-214560">
               <a:lnSpc>
                 <a:spcPct val="100000"/>
               </a:lnSpc>
@@ -5197,7 +5198,7 @@
         <p:spPr>
           <a:xfrm>
             <a:off x="457200" y="205920"/>
-            <a:ext cx="8227440" cy="855360"/>
+            <a:ext cx="8226720" cy="854640"/>
           </a:xfrm>
           <a:prstGeom prst="rect">
             <a:avLst/>
@@ -5249,7 +5250,7 @@
         <p:spPr>
           <a:xfrm>
             <a:off x="457200" y="1200240"/>
-            <a:ext cx="8227440" cy="3723480"/>
+            <a:ext cx="8226720" cy="3722760"/>
           </a:xfrm>
           <a:prstGeom prst="rect">
             <a:avLst/>
@@ -5291,7 +5292,7 @@
             <a:endParaRPr/>
           </a:p>
           <a:p>
-            <a:pPr marL="216000" indent="-215280">
+            <a:pPr marL="216000" indent="-214560">
               <a:lnSpc>
                 <a:spcPct val="100000"/>
               </a:lnSpc>
@@ -5331,7 +5332,7 @@
             <a:endParaRPr/>
           </a:p>
           <a:p>
-            <a:pPr marL="216000" indent="-215280">
+            <a:pPr marL="216000" indent="-214560">
               <a:lnSpc>
                 <a:spcPct val="100000"/>
               </a:lnSpc>
@@ -5371,7 +5372,7 @@
             <a:endParaRPr/>
           </a:p>
           <a:p>
-            <a:pPr marL="216000" indent="-215280">
+            <a:pPr marL="216000" indent="-214560">
               <a:lnSpc>
                 <a:spcPct val="100000"/>
               </a:lnSpc>
@@ -5411,7 +5412,7 @@
             <a:endParaRPr/>
           </a:p>
           <a:p>
-            <a:pPr marL="216000" indent="-215280">
+            <a:pPr marL="216000" indent="-214560">
               <a:lnSpc>
                 <a:spcPct val="100000"/>
               </a:lnSpc>
@@ -5451,7 +5452,7 @@
             <a:endParaRPr/>
           </a:p>
           <a:p>
-            <a:pPr marL="216000" indent="-215280">
+            <a:pPr marL="216000" indent="-214560">
               <a:lnSpc>
                 <a:spcPct val="100000"/>
               </a:lnSpc>
@@ -5486,12 +5487,12 @@
                 <a:latin typeface="Arial"/>
                 <a:ea typeface="Arial"/>
               </a:rPr>
-              <a:t>Find the NeCTAR documentation site</a:t>
-            </a:r>
-            <a:endParaRPr/>
-          </a:p>
-          <a:p>
-            <a:pPr marL="216000" indent="-215280" algn="ctr">
+              <a:t>Find the documentation site</a:t>
+            </a:r>
+            <a:endParaRPr/>
+          </a:p>
+          <a:p>
+            <a:pPr marL="216000" indent="-214560" algn="ctr">
               <a:lnSpc>
                 <a:spcPct val="100000"/>
               </a:lnSpc>
@@ -5575,7 +5576,7 @@
         <p:spPr>
           <a:xfrm>
             <a:off x="457200" y="205920"/>
-            <a:ext cx="8227440" cy="855360"/>
+            <a:ext cx="8226720" cy="854640"/>
           </a:xfrm>
           <a:prstGeom prst="rect">
             <a:avLst/>
@@ -5627,7 +5628,7 @@
         <p:spPr>
           <a:xfrm>
             <a:off x="457200" y="1200240"/>
-            <a:ext cx="8227440" cy="3723480"/>
+            <a:ext cx="8226720" cy="3722760"/>
           </a:xfrm>
           <a:prstGeom prst="rect">
             <a:avLst/>
@@ -5652,7 +5653,7 @@
               </a:lnSpc>
             </a:pPr>
             <a:r>
-              <a:rPr lang="en-AU" sz="3000" spc="-1" strike="noStrike">
+              <a:rPr lang="en-AU" sz="2600" spc="-1" strike="noStrike">
                 <a:solidFill>
                   <a:srgbClr val="000000"/>
                 </a:solidFill>
@@ -5664,12 +5665,12 @@
                 <a:latin typeface="Arial"/>
                 <a:ea typeface="Arial"/>
               </a:rPr>
-              <a:t>What happens to your hard drive when you terminate your Virtual Machine (VM)?</a:t>
-            </a:r>
-            <a:endParaRPr/>
-          </a:p>
-          <a:p>
-            <a:pPr marL="216000" indent="-215280">
+              <a:t>If you change your password under the settings drop down:</a:t>
+            </a:r>
+            <a:endParaRPr/>
+          </a:p>
+          <a:p>
+            <a:pPr marL="216000" indent="-214560">
               <a:lnSpc>
                 <a:spcPct val="100000"/>
               </a:lnSpc>
@@ -5677,7 +5678,7 @@
               <a:buAutoNum type="alphaUcPeriod"/>
             </a:pPr>
             <a:r>
-              <a:rPr lang="en-AU" sz="3000" spc="-1" strike="noStrike">
+              <a:rPr lang="en-AU" sz="2600" spc="-1" strike="noStrike">
                 <a:solidFill>
                   <a:srgbClr val="000000"/>
                 </a:solidFill>
@@ -5689,12 +5690,27 @@
                 <a:latin typeface="Arial"/>
                 <a:ea typeface="Arial"/>
               </a:rPr>
-              <a:t>It gets copied back to the image store</a:t>
-            </a:r>
-            <a:endParaRPr/>
-          </a:p>
-          <a:p>
-            <a:pPr marL="216000" indent="-215280">
+              <a:t> </a:t>
+            </a:r>
+            <a:r>
+              <a:rPr lang="en-AU" sz="2600" spc="-1" strike="noStrike">
+                <a:solidFill>
+                  <a:srgbClr val="000000"/>
+                </a:solidFill>
+                <a:uFill>
+                  <a:solidFill>
+                    <a:srgbClr val="ffffff"/>
+                  </a:solidFill>
+                </a:uFill>
+                <a:latin typeface="Arial"/>
+                <a:ea typeface="Arial"/>
+              </a:rPr>
+              <a:t>You are free of the AAF requirement!</a:t>
+            </a:r>
+            <a:endParaRPr/>
+          </a:p>
+          <a:p>
+            <a:pPr marL="216000" indent="-214560">
               <a:lnSpc>
                 <a:spcPct val="100000"/>
               </a:lnSpc>
@@ -5702,7 +5718,7 @@
               <a:buAutoNum type="alphaUcPeriod"/>
             </a:pPr>
             <a:r>
-              <a:rPr lang="en-AU" sz="3000" spc="-1" strike="noStrike">
+              <a:rPr lang="en-AU" sz="2600" spc="-1" strike="noStrike">
                 <a:solidFill>
                   <a:srgbClr val="000000"/>
                 </a:solidFill>
@@ -5714,12 +5730,27 @@
                 <a:latin typeface="Arial"/>
                 <a:ea typeface="Arial"/>
               </a:rPr>
-              <a:t>It gets ‘snapshotted’ for me to use again</a:t>
-            </a:r>
-            <a:endParaRPr/>
-          </a:p>
-          <a:p>
-            <a:pPr marL="216000" indent="-215280">
+              <a:t> </a:t>
+            </a:r>
+            <a:r>
+              <a:rPr lang="en-AU" sz="2600" spc="-1" strike="noStrike">
+                <a:solidFill>
+                  <a:srgbClr val="000000"/>
+                </a:solidFill>
+                <a:uFill>
+                  <a:solidFill>
+                    <a:srgbClr val="ffffff"/>
+                  </a:solidFill>
+                </a:uFill>
+                <a:latin typeface="Arial"/>
+                <a:ea typeface="Arial"/>
+              </a:rPr>
+              <a:t>Your AAF password is changed</a:t>
+            </a:r>
+            <a:endParaRPr/>
+          </a:p>
+          <a:p>
+            <a:pPr marL="216000" indent="-214560">
               <a:lnSpc>
                 <a:spcPct val="100000"/>
               </a:lnSpc>
@@ -5727,7 +5758,7 @@
               <a:buAutoNum type="alphaUcPeriod"/>
             </a:pPr>
             <a:r>
-              <a:rPr lang="en-AU" sz="3000" spc="-1" strike="noStrike">
+              <a:rPr lang="en-AU" sz="2600" spc="-1" strike="noStrike">
                 <a:solidFill>
                   <a:srgbClr val="000000"/>
                 </a:solidFill>
@@ -5739,12 +5770,27 @@
                 <a:latin typeface="Arial"/>
                 <a:ea typeface="Arial"/>
               </a:rPr>
-              <a:t>It’s left on the host server, for me to use when I next launch a machine</a:t>
-            </a:r>
-            <a:endParaRPr/>
-          </a:p>
-          <a:p>
-            <a:pPr marL="216000" indent="-215280">
+              <a:t> </a:t>
+            </a:r>
+            <a:r>
+              <a:rPr lang="en-AU" sz="2600" spc="-1" strike="noStrike">
+                <a:solidFill>
+                  <a:srgbClr val="000000"/>
+                </a:solidFill>
+                <a:uFill>
+                  <a:solidFill>
+                    <a:srgbClr val="ffffff"/>
+                  </a:solidFill>
+                </a:uFill>
+                <a:latin typeface="Arial"/>
+                <a:ea typeface="Arial"/>
+              </a:rPr>
+              <a:t>Your institutions password is changed!</a:t>
+            </a:r>
+            <a:endParaRPr/>
+          </a:p>
+          <a:p>
+            <a:pPr marL="216000" indent="-214560">
               <a:lnSpc>
                 <a:spcPct val="100000"/>
               </a:lnSpc>
@@ -5752,7 +5798,7 @@
               <a:buAutoNum type="alphaUcPeriod"/>
             </a:pPr>
             <a:r>
-              <a:rPr lang="en-AU" sz="3000" spc="-1" strike="noStrike">
+              <a:rPr lang="en-AU" sz="2600" spc="-1" strike="noStrike">
                 <a:solidFill>
                   <a:srgbClr val="000000"/>
                 </a:solidFill>
@@ -5764,7 +5810,87 @@
                 <a:latin typeface="Arial"/>
                 <a:ea typeface="Arial"/>
               </a:rPr>
-              <a:t>It gets destroyed. Wiped. Cleaned. Gone!</a:t>
+              <a:t> </a:t>
+            </a:r>
+            <a:r>
+              <a:rPr lang="en-AU" sz="2600" spc="-1" strike="noStrike">
+                <a:solidFill>
+                  <a:srgbClr val="000000"/>
+                </a:solidFill>
+                <a:uFill>
+                  <a:solidFill>
+                    <a:srgbClr val="ffffff"/>
+                  </a:solidFill>
+                </a:uFill>
+                <a:latin typeface="Arial"/>
+                <a:ea typeface="Arial"/>
+              </a:rPr>
+              <a:t>Tools that interface with the cloud will be affected </a:t>
+            </a:r>
+            <a:endParaRPr/>
+          </a:p>
+          <a:p>
+            <a:pPr marL="216000" indent="-214560">
+              <a:lnSpc>
+                <a:spcPct val="100000"/>
+              </a:lnSpc>
+              <a:buFont typeface="Arial"/>
+              <a:buAutoNum type="alphaUcPeriod"/>
+            </a:pPr>
+            <a:r>
+              <a:rPr lang="en-AU" sz="2600" spc="-1" strike="noStrike">
+                <a:solidFill>
+                  <a:srgbClr val="000000"/>
+                </a:solidFill>
+                <a:uFill>
+                  <a:solidFill>
+                    <a:srgbClr val="ffffff"/>
+                  </a:solidFill>
+                </a:uFill>
+                <a:latin typeface="Arial"/>
+                <a:ea typeface="Arial"/>
+              </a:rPr>
+              <a:t>  </a:t>
+            </a:r>
+            <a:r>
+              <a:rPr lang="en-AU" sz="2600" spc="-1" strike="noStrike">
+                <a:solidFill>
+                  <a:srgbClr val="000000"/>
+                </a:solidFill>
+                <a:uFill>
+                  <a:solidFill>
+                    <a:srgbClr val="ffffff"/>
+                  </a:solidFill>
+                </a:uFill>
+                <a:latin typeface="Arial"/>
+                <a:ea typeface="Arial"/>
+              </a:rPr>
+              <a:t>None of the above</a:t>
+            </a:r>
+            <a:endParaRPr/>
+          </a:p>
+          <a:p>
+            <a:pPr marL="216000" indent="-214560" algn="ctr">
+              <a:lnSpc>
+                <a:spcPct val="100000"/>
+              </a:lnSpc>
+              <a:buFont typeface="Arial"/>
+              <a:buAutoNum type="alphaUcPeriod"/>
+            </a:pPr>
+            <a:r>
+              <a:rPr lang="en-AU" sz="2600" spc="-1" strike="noStrike">
+                <a:solidFill>
+                  <a:srgbClr val="000000"/>
+                </a:solidFill>
+                <a:uFill>
+                  <a:solidFill>
+                    <a:srgbClr val="ffffff"/>
+                  </a:solidFill>
+                </a:uFill>
+                <a:latin typeface="Arial"/>
+                <a:ea typeface="Arial"/>
+              </a:rPr>
+              <a:t>?</a:t>
             </a:r>
             <a:endParaRPr/>
           </a:p>
@@ -5828,7 +5954,7 @@
         <p:spPr>
           <a:xfrm>
             <a:off x="457200" y="205920"/>
-            <a:ext cx="8227440" cy="855360"/>
+            <a:ext cx="8226720" cy="854640"/>
           </a:xfrm>
           <a:prstGeom prst="rect">
             <a:avLst/>
@@ -5880,7 +6006,7 @@
         <p:spPr>
           <a:xfrm>
             <a:off x="457200" y="1200240"/>
-            <a:ext cx="8227440" cy="3723480"/>
+            <a:ext cx="8226720" cy="3722760"/>
           </a:xfrm>
           <a:prstGeom prst="rect">
             <a:avLst/>
@@ -5917,12 +6043,12 @@
                 <a:latin typeface="Arial"/>
                 <a:ea typeface="Arial"/>
               </a:rPr>
-              <a:t>When does my free PC on the NeCTAR cloud get destroyed (along with all its data)?</a:t>
-            </a:r>
-            <a:endParaRPr/>
-          </a:p>
-          <a:p>
-            <a:pPr marL="216000" indent="-215280">
+              <a:t>What happens to your hard drive when you terminate your Virtual Machine (VM)?</a:t>
+            </a:r>
+            <a:endParaRPr/>
+          </a:p>
+          <a:p>
+            <a:pPr marL="216000" indent="-214560">
               <a:lnSpc>
                 <a:spcPct val="100000"/>
               </a:lnSpc>
@@ -5942,12 +6068,12 @@
                 <a:latin typeface="Arial"/>
                 <a:ea typeface="Arial"/>
               </a:rPr>
-              <a:t>When I do a soft reboot on my VM</a:t>
-            </a:r>
-            <a:endParaRPr/>
-          </a:p>
-          <a:p>
-            <a:pPr marL="216000" indent="-215280">
+              <a:t>It gets copied back to the image store</a:t>
+            </a:r>
+            <a:endParaRPr/>
+          </a:p>
+          <a:p>
+            <a:pPr marL="216000" indent="-214560">
               <a:lnSpc>
                 <a:spcPct val="100000"/>
               </a:lnSpc>
@@ -5967,12 +6093,12 @@
                 <a:latin typeface="Arial"/>
                 <a:ea typeface="Arial"/>
               </a:rPr>
-              <a:t>When I terminate my VM</a:t>
-            </a:r>
-            <a:endParaRPr/>
-          </a:p>
-          <a:p>
-            <a:pPr marL="216000" indent="-215280">
+              <a:t>It gets ‘snapshotted’ for me to use again</a:t>
+            </a:r>
+            <a:endParaRPr/>
+          </a:p>
+          <a:p>
+            <a:pPr marL="216000" indent="-214560">
               <a:lnSpc>
                 <a:spcPct val="100000"/>
               </a:lnSpc>
@@ -5992,12 +6118,12 @@
                 <a:latin typeface="Arial"/>
                 <a:ea typeface="Arial"/>
               </a:rPr>
-              <a:t>When I pause my VM</a:t>
-            </a:r>
-            <a:endParaRPr/>
-          </a:p>
-          <a:p>
-            <a:pPr marL="216000" indent="-215280">
+              <a:t>It’s left on the host server, for me to use when I next launch a machine</a:t>
+            </a:r>
+            <a:endParaRPr/>
+          </a:p>
+          <a:p>
+            <a:pPr marL="216000" indent="-214560">
               <a:lnSpc>
                 <a:spcPct val="100000"/>
               </a:lnSpc>
@@ -6017,32 +6143,7 @@
                 <a:latin typeface="Arial"/>
                 <a:ea typeface="Arial"/>
               </a:rPr>
-              <a:t>When I stop my VM</a:t>
-            </a:r>
-            <a:endParaRPr/>
-          </a:p>
-          <a:p>
-            <a:pPr marL="216000" indent="-215280">
-              <a:lnSpc>
-                <a:spcPct val="100000"/>
-              </a:lnSpc>
-              <a:buFont typeface="Arial"/>
-              <a:buAutoNum type="alphaUcPeriod"/>
-            </a:pPr>
-            <a:r>
-              <a:rPr lang="en-AU" sz="3000" spc="-1" strike="noStrike">
-                <a:solidFill>
-                  <a:srgbClr val="000000"/>
-                </a:solidFill>
-                <a:uFill>
-                  <a:solidFill>
-                    <a:srgbClr val="ffffff"/>
-                  </a:solidFill>
-                </a:uFill>
-                <a:latin typeface="Arial"/>
-                <a:ea typeface="Arial"/>
-              </a:rPr>
-              <a:t>When I do a hard reboot on my VM</a:t>
+              <a:t>It gets destroyed. Wiped. Cleaned. Gone!</a:t>
             </a:r>
             <a:endParaRPr/>
           </a:p>
@@ -6106,7 +6207,7 @@
         <p:spPr>
           <a:xfrm>
             <a:off x="457200" y="205920"/>
-            <a:ext cx="8228520" cy="856440"/>
+            <a:ext cx="8226720" cy="854640"/>
           </a:xfrm>
           <a:prstGeom prst="rect">
             <a:avLst/>
@@ -6158,7 +6259,7 @@
         <p:spPr>
           <a:xfrm>
             <a:off x="457200" y="1200240"/>
-            <a:ext cx="8228520" cy="3724560"/>
+            <a:ext cx="8226720" cy="3722760"/>
           </a:xfrm>
           <a:prstGeom prst="rect">
             <a:avLst/>
@@ -6179,7 +6280,7 @@
           <a:p>
             <a:pPr>
               <a:lnSpc>
-                <a:spcPct val="120000"/>
+                <a:spcPct val="100000"/>
               </a:lnSpc>
             </a:pPr>
             <a:r>
@@ -6195,14 +6296,14 @@
                 <a:latin typeface="Arial"/>
                 <a:ea typeface="Arial"/>
               </a:rPr>
-              <a:t>When do I lose my IP number?</a:t>
-            </a:r>
-            <a:endParaRPr/>
-          </a:p>
-          <a:p>
-            <a:pPr marL="216000" indent="-215640">
+              <a:t>When does my free PC on the Research Cloud get destroyed (along with all its data)?</a:t>
+            </a:r>
+            <a:endParaRPr/>
+          </a:p>
+          <a:p>
+            <a:pPr marL="216000" indent="-214560">
               <a:lnSpc>
-                <a:spcPct val="120000"/>
+                <a:spcPct val="100000"/>
               </a:lnSpc>
               <a:buFont typeface="Arial"/>
               <a:buAutoNum type="alphaUcPeriod"/>
@@ -6220,29 +6321,14 @@
                 <a:latin typeface="Arial"/>
                 <a:ea typeface="Arial"/>
               </a:rPr>
-              <a:t> </a:t>
-            </a:r>
-            <a:r>
-              <a:rPr lang="en-AU" sz="3000" spc="-1" strike="noStrike">
-                <a:solidFill>
-                  <a:srgbClr val="000000"/>
-                </a:solidFill>
-                <a:uFill>
-                  <a:solidFill>
-                    <a:srgbClr val="ffffff"/>
-                  </a:solidFill>
-                </a:uFill>
-                <a:latin typeface="Arial"/>
-                <a:ea typeface="Arial"/>
-              </a:rPr>
               <a:t>When I do a soft reboot on my VM</a:t>
             </a:r>
             <a:endParaRPr/>
           </a:p>
           <a:p>
-            <a:pPr marL="216000" indent="-215640">
+            <a:pPr marL="216000" indent="-214560">
               <a:lnSpc>
-                <a:spcPct val="120000"/>
+                <a:spcPct val="100000"/>
               </a:lnSpc>
               <a:buFont typeface="Arial"/>
               <a:buAutoNum type="alphaUcPeriod"/>
@@ -6260,29 +6346,14 @@
                 <a:latin typeface="Arial"/>
                 <a:ea typeface="Arial"/>
               </a:rPr>
-              <a:t> </a:t>
-            </a:r>
-            <a:r>
-              <a:rPr lang="en-AU" sz="3000" spc="-1" strike="noStrike">
-                <a:solidFill>
-                  <a:srgbClr val="000000"/>
-                </a:solidFill>
-                <a:uFill>
-                  <a:solidFill>
-                    <a:srgbClr val="ffffff"/>
-                  </a:solidFill>
-                </a:uFill>
-                <a:latin typeface="Arial"/>
-                <a:ea typeface="Arial"/>
-              </a:rPr>
               <a:t>When I terminate my VM</a:t>
             </a:r>
             <a:endParaRPr/>
           </a:p>
           <a:p>
-            <a:pPr marL="216000" indent="-215640">
+            <a:pPr marL="216000" indent="-214560">
               <a:lnSpc>
-                <a:spcPct val="120000"/>
+                <a:spcPct val="100000"/>
               </a:lnSpc>
               <a:buFont typeface="Arial"/>
               <a:buAutoNum type="alphaUcPeriod"/>
@@ -6300,29 +6371,14 @@
                 <a:latin typeface="Arial"/>
                 <a:ea typeface="Arial"/>
               </a:rPr>
-              <a:t> </a:t>
-            </a:r>
-            <a:r>
-              <a:rPr lang="en-AU" sz="3000" spc="-1" strike="noStrike">
-                <a:solidFill>
-                  <a:srgbClr val="000000"/>
-                </a:solidFill>
-                <a:uFill>
-                  <a:solidFill>
-                    <a:srgbClr val="ffffff"/>
-                  </a:solidFill>
-                </a:uFill>
-                <a:latin typeface="Arial"/>
-                <a:ea typeface="Arial"/>
-              </a:rPr>
               <a:t>When I pause my VM</a:t>
             </a:r>
             <a:endParaRPr/>
           </a:p>
           <a:p>
-            <a:pPr marL="216000" indent="-215640">
+            <a:pPr marL="216000" indent="-214560">
               <a:lnSpc>
-                <a:spcPct val="120000"/>
+                <a:spcPct val="100000"/>
               </a:lnSpc>
               <a:buFont typeface="Arial"/>
               <a:buAutoNum type="alphaUcPeriod"/>
@@ -6340,29 +6396,14 @@
                 <a:latin typeface="Arial"/>
                 <a:ea typeface="Arial"/>
               </a:rPr>
-              <a:t> </a:t>
-            </a:r>
-            <a:r>
-              <a:rPr lang="en-AU" sz="3000" spc="-1" strike="noStrike">
-                <a:solidFill>
-                  <a:srgbClr val="000000"/>
-                </a:solidFill>
-                <a:uFill>
-                  <a:solidFill>
-                    <a:srgbClr val="ffffff"/>
-                  </a:solidFill>
-                </a:uFill>
-                <a:latin typeface="Arial"/>
-                <a:ea typeface="Arial"/>
-              </a:rPr>
               <a:t>When I stop my VM</a:t>
             </a:r>
             <a:endParaRPr/>
           </a:p>
           <a:p>
-            <a:pPr marL="216000" indent="-215640">
+            <a:pPr marL="216000" indent="-214560">
               <a:lnSpc>
-                <a:spcPct val="115000"/>
+                <a:spcPct val="100000"/>
               </a:lnSpc>
               <a:buFont typeface="Arial"/>
               <a:buAutoNum type="alphaUcPeriod"/>
@@ -6380,31 +6421,8 @@
                 <a:latin typeface="Arial"/>
                 <a:ea typeface="Arial"/>
               </a:rPr>
-              <a:t> </a:t>
-            </a:r>
-            <a:r>
-              <a:rPr lang="en-AU" sz="3000" spc="-1" strike="noStrike">
-                <a:solidFill>
-                  <a:srgbClr val="000000"/>
-                </a:solidFill>
-                <a:uFill>
-                  <a:solidFill>
-                    <a:srgbClr val="ffffff"/>
-                  </a:solidFill>
-                </a:uFill>
-                <a:latin typeface="Arial"/>
-                <a:ea typeface="Arial"/>
-              </a:rPr>
               <a:t>When I do a hard reboot on my VM</a:t>
             </a:r>
-            <a:endParaRPr/>
-          </a:p>
-          <a:p>
-            <a:pPr>
-              <a:lnSpc>
-                <a:spcPct val="100000"/>
-              </a:lnSpc>
-            </a:pPr>
             <a:endParaRPr/>
           </a:p>
         </p:txBody>
@@ -6418,6 +6436,367 @@
           <p:childTnLst>
             <p:seq>
               <p:cTn id="16" nodeType="mainSeq"/>
+              <p:prevCondLst>
+                <p:cond delay="0" evt="onPrev">
+                  <p:tgtEl>
+                    <p:sldTgt/>
+                  </p:tgtEl>
+                </p:cond>
+              </p:prevCondLst>
+              <p:nextCondLst>
+                <p:cond delay="0" evt="onNext">
+                  <p:tgtEl>
+                    <p:sldTgt/>
+                  </p:tgtEl>
+                </p:cond>
+              </p:nextCondLst>
+            </p:seq>
+          </p:childTnLst>
+        </p:cTn>
+      </p:par>
+    </p:tnLst>
+  </p:timing>
+</p:sld>
+</file>
+
+<file path=ppt/slides/slide9.xml><?xml version="1.0" encoding="utf-8"?>
+<p:sld xmlns:a="http://schemas.openxmlformats.org/drawingml/2006/main" xmlns:p="http://schemas.openxmlformats.org/presentationml/2006/main" xmlns:r="http://schemas.openxmlformats.org/officeDocument/2006/relationships">
+  <p:cSld>
+    <p:spTree>
+      <p:nvGrpSpPr>
+        <p:cNvPr id="1" name=""/>
+        <p:cNvGrpSpPr/>
+        <p:nvPr/>
+      </p:nvGrpSpPr>
+      <p:grpSpPr>
+        <a:xfrm>
+          <a:off x="0" y="0"/>
+          <a:ext cx="0" cy="0"/>
+          <a:chOff x="0" y="0"/>
+          <a:chExt cx="0" cy="0"/>
+        </a:xfrm>
+      </p:grpSpPr>
+      <p:sp>
+        <p:nvSpPr>
+          <p:cNvPr id="124" name="CustomShape 1"/>
+          <p:cNvSpPr/>
+          <p:nvPr/>
+        </p:nvSpPr>
+        <p:spPr>
+          <a:xfrm>
+            <a:off x="457200" y="205920"/>
+            <a:ext cx="8227800" cy="855720"/>
+          </a:xfrm>
+          <a:prstGeom prst="rect">
+            <a:avLst/>
+          </a:prstGeom>
+          <a:noFill/>
+          <a:ln>
+            <a:noFill/>
+          </a:ln>
+        </p:spPr>
+        <p:style>
+          <a:lnRef idx="0"/>
+          <a:fillRef idx="0"/>
+          <a:effectRef idx="0"/>
+          <a:fontRef idx="minor"/>
+        </p:style>
+        <p:txBody>
+          <a:bodyPr lIns="90000" rIns="90000" tIns="91440" bIns="91440" anchor="b"/>
+          <a:p>
+            <a:pPr>
+              <a:lnSpc>
+                <a:spcPct val="100000"/>
+              </a:lnSpc>
+            </a:pPr>
+            <a:r>
+              <a:rPr b="1" lang="en-AU" sz="3600" spc="-1" strike="noStrike">
+                <a:solidFill>
+                  <a:srgbClr val="000000"/>
+                </a:solidFill>
+                <a:uFill>
+                  <a:solidFill>
+                    <a:srgbClr val="ffffff"/>
+                  </a:solidFill>
+                </a:uFill>
+                <a:latin typeface="Arial"/>
+                <a:ea typeface="Arial"/>
+              </a:rPr>
+              <a:t>Question 8</a:t>
+            </a:r>
+            <a:endParaRPr/>
+          </a:p>
+        </p:txBody>
+      </p:sp>
+      <p:sp>
+        <p:nvSpPr>
+          <p:cNvPr id="125" name="CustomShape 2"/>
+          <p:cNvSpPr/>
+          <p:nvPr/>
+        </p:nvSpPr>
+        <p:spPr>
+          <a:xfrm>
+            <a:off x="457200" y="1200240"/>
+            <a:ext cx="8227800" cy="3723840"/>
+          </a:xfrm>
+          <a:prstGeom prst="rect">
+            <a:avLst/>
+          </a:prstGeom>
+          <a:noFill/>
+          <a:ln>
+            <a:noFill/>
+          </a:ln>
+        </p:spPr>
+        <p:style>
+          <a:lnRef idx="0"/>
+          <a:fillRef idx="0"/>
+          <a:effectRef idx="0"/>
+          <a:fontRef idx="minor"/>
+        </p:style>
+        <p:txBody>
+          <a:bodyPr lIns="90000" rIns="90000" tIns="91440" bIns="91440"/>
+          <a:p>
+            <a:pPr>
+              <a:lnSpc>
+                <a:spcPct val="120000"/>
+              </a:lnSpc>
+            </a:pPr>
+            <a:r>
+              <a:rPr lang="en-AU" sz="3000" spc="-1" strike="noStrike">
+                <a:solidFill>
+                  <a:srgbClr val="000000"/>
+                </a:solidFill>
+                <a:uFill>
+                  <a:solidFill>
+                    <a:srgbClr val="ffffff"/>
+                  </a:solidFill>
+                </a:uFill>
+                <a:latin typeface="Arial"/>
+                <a:ea typeface="Arial"/>
+              </a:rPr>
+              <a:t>When do I lose my IP number?</a:t>
+            </a:r>
+            <a:endParaRPr/>
+          </a:p>
+          <a:p>
+            <a:pPr marL="216000" indent="-214920">
+              <a:lnSpc>
+                <a:spcPct val="120000"/>
+              </a:lnSpc>
+              <a:buFont typeface="Arial"/>
+              <a:buAutoNum type="alphaUcPeriod"/>
+            </a:pPr>
+            <a:r>
+              <a:rPr lang="en-AU" sz="3000" spc="-1" strike="noStrike">
+                <a:solidFill>
+                  <a:srgbClr val="000000"/>
+                </a:solidFill>
+                <a:uFill>
+                  <a:solidFill>
+                    <a:srgbClr val="ffffff"/>
+                  </a:solidFill>
+                </a:uFill>
+                <a:latin typeface="Arial"/>
+                <a:ea typeface="Arial"/>
+              </a:rPr>
+              <a:t> </a:t>
+            </a:r>
+            <a:r>
+              <a:rPr lang="en-AU" sz="3000" spc="-1" strike="noStrike">
+                <a:solidFill>
+                  <a:srgbClr val="000000"/>
+                </a:solidFill>
+                <a:uFill>
+                  <a:solidFill>
+                    <a:srgbClr val="ffffff"/>
+                  </a:solidFill>
+                </a:uFill>
+                <a:latin typeface="Arial"/>
+                <a:ea typeface="Arial"/>
+              </a:rPr>
+              <a:t>When I do a soft reboot on my VM</a:t>
+            </a:r>
+            <a:endParaRPr/>
+          </a:p>
+          <a:p>
+            <a:pPr marL="216000" indent="-214920">
+              <a:lnSpc>
+                <a:spcPct val="120000"/>
+              </a:lnSpc>
+              <a:buFont typeface="Arial"/>
+              <a:buAutoNum type="alphaUcPeriod"/>
+            </a:pPr>
+            <a:r>
+              <a:rPr lang="en-AU" sz="3000" spc="-1" strike="noStrike">
+                <a:solidFill>
+                  <a:srgbClr val="000000"/>
+                </a:solidFill>
+                <a:uFill>
+                  <a:solidFill>
+                    <a:srgbClr val="ffffff"/>
+                  </a:solidFill>
+                </a:uFill>
+                <a:latin typeface="Arial"/>
+                <a:ea typeface="Arial"/>
+              </a:rPr>
+              <a:t> </a:t>
+            </a:r>
+            <a:r>
+              <a:rPr lang="en-AU" sz="3000" spc="-1" strike="noStrike">
+                <a:solidFill>
+                  <a:srgbClr val="000000"/>
+                </a:solidFill>
+                <a:uFill>
+                  <a:solidFill>
+                    <a:srgbClr val="ffffff"/>
+                  </a:solidFill>
+                </a:uFill>
+                <a:latin typeface="Arial"/>
+                <a:ea typeface="Arial"/>
+              </a:rPr>
+              <a:t>When I terminate my VM</a:t>
+            </a:r>
+            <a:endParaRPr/>
+          </a:p>
+          <a:p>
+            <a:pPr marL="216000" indent="-214920">
+              <a:lnSpc>
+                <a:spcPct val="120000"/>
+              </a:lnSpc>
+              <a:buFont typeface="Arial"/>
+              <a:buAutoNum type="alphaUcPeriod"/>
+            </a:pPr>
+            <a:r>
+              <a:rPr lang="en-AU" sz="3000" spc="-1" strike="noStrike">
+                <a:solidFill>
+                  <a:srgbClr val="000000"/>
+                </a:solidFill>
+                <a:uFill>
+                  <a:solidFill>
+                    <a:srgbClr val="ffffff"/>
+                  </a:solidFill>
+                </a:uFill>
+                <a:latin typeface="Arial"/>
+                <a:ea typeface="Arial"/>
+              </a:rPr>
+              <a:t> </a:t>
+            </a:r>
+            <a:r>
+              <a:rPr lang="en-AU" sz="3000" spc="-1" strike="noStrike">
+                <a:solidFill>
+                  <a:srgbClr val="000000"/>
+                </a:solidFill>
+                <a:uFill>
+                  <a:solidFill>
+                    <a:srgbClr val="ffffff"/>
+                  </a:solidFill>
+                </a:uFill>
+                <a:latin typeface="Arial"/>
+                <a:ea typeface="Arial"/>
+              </a:rPr>
+              <a:t>When I pause my VM</a:t>
+            </a:r>
+            <a:endParaRPr/>
+          </a:p>
+          <a:p>
+            <a:pPr marL="216000" indent="-214920">
+              <a:lnSpc>
+                <a:spcPct val="120000"/>
+              </a:lnSpc>
+              <a:buFont typeface="Arial"/>
+              <a:buAutoNum type="alphaUcPeriod"/>
+            </a:pPr>
+            <a:r>
+              <a:rPr lang="en-AU" sz="3000" spc="-1" strike="noStrike">
+                <a:solidFill>
+                  <a:srgbClr val="000000"/>
+                </a:solidFill>
+                <a:uFill>
+                  <a:solidFill>
+                    <a:srgbClr val="ffffff"/>
+                  </a:solidFill>
+                </a:uFill>
+                <a:latin typeface="Arial"/>
+                <a:ea typeface="Arial"/>
+              </a:rPr>
+              <a:t> </a:t>
+            </a:r>
+            <a:r>
+              <a:rPr lang="en-AU" sz="3000" spc="-1" strike="noStrike">
+                <a:solidFill>
+                  <a:srgbClr val="000000"/>
+                </a:solidFill>
+                <a:uFill>
+                  <a:solidFill>
+                    <a:srgbClr val="ffffff"/>
+                  </a:solidFill>
+                </a:uFill>
+                <a:latin typeface="Arial"/>
+                <a:ea typeface="Arial"/>
+              </a:rPr>
+              <a:t>When I stop my VM</a:t>
+            </a:r>
+            <a:endParaRPr/>
+          </a:p>
+          <a:p>
+            <a:pPr marL="216000" indent="-214920">
+              <a:lnSpc>
+                <a:spcPct val="115000"/>
+              </a:lnSpc>
+              <a:buFont typeface="Arial"/>
+              <a:buAutoNum type="alphaUcPeriod"/>
+            </a:pPr>
+            <a:r>
+              <a:rPr lang="en-AU" sz="3000" spc="-1" strike="noStrike">
+                <a:solidFill>
+                  <a:srgbClr val="000000"/>
+                </a:solidFill>
+                <a:uFill>
+                  <a:solidFill>
+                    <a:srgbClr val="ffffff"/>
+                  </a:solidFill>
+                </a:uFill>
+                <a:latin typeface="Arial"/>
+                <a:ea typeface="Arial"/>
+              </a:rPr>
+              <a:t> </a:t>
+            </a:r>
+            <a:r>
+              <a:rPr lang="en-AU" sz="3000" spc="-1" strike="noStrike">
+                <a:solidFill>
+                  <a:srgbClr val="000000"/>
+                </a:solidFill>
+                <a:uFill>
+                  <a:solidFill>
+                    <a:srgbClr val="ffffff"/>
+                  </a:solidFill>
+                </a:uFill>
+                <a:latin typeface="Arial"/>
+                <a:ea typeface="Arial"/>
+              </a:rPr>
+              <a:t>When I do a hard reboot on my VM</a:t>
+            </a:r>
+            <a:endParaRPr/>
+          </a:p>
+          <a:p>
+            <a:pPr>
+              <a:lnSpc>
+                <a:spcPct val="100000"/>
+              </a:lnSpc>
+            </a:pPr>
+            <a:endParaRPr/>
+          </a:p>
+        </p:txBody>
+      </p:sp>
+    </p:spTree>
+  </p:cSld>
+  <p:timing>
+    <p:tnLst>
+      <p:par>
+        <p:cTn id="17" dur="indefinite" restart="never" nodeType="tmRoot">
+          <p:childTnLst>
+            <p:seq>
+              <p:cTn id="18" nodeType="mainSeq"/>
               <p:prevCondLst>
                 <p:cond delay="0" evt="onPrev">
                   <p:tgtEl>

</xml_diff>